<commit_message>
Echo Noise Cancellation image added
</commit_message>
<xml_diff>
--- a/Images/Echo_Noise_Cancellation.pptx
+++ b/Images/Echo_Noise_Cancellation.pptx
@@ -129,7 +129,7 @@
           <p:cNvPr id="2" name="Titel 1">
             <a:extLst>
               <a:ext uri="{FF2B5EF4-FFF2-40B4-BE49-F238E27FC236}">
-                <a16:creationId xmlns:a16="http://schemas.microsoft.com/office/drawing/2014/main" id="{2B506413-A10A-DCE7-BDB2-72B776CDBF9E}"/>
+                <a16:creationId xmlns:a16="http://schemas.microsoft.com/office/drawing/2014/main" xmlns="" id="{2B506413-A10A-DCE7-BDB2-72B776CDBF9E}"/>
               </a:ext>
             </a:extLst>
           </p:cNvPr>
@@ -166,7 +166,7 @@
           <p:cNvPr id="3" name="Untertitel 2">
             <a:extLst>
               <a:ext uri="{FF2B5EF4-FFF2-40B4-BE49-F238E27FC236}">
-                <a16:creationId xmlns:a16="http://schemas.microsoft.com/office/drawing/2014/main" id="{E3C52979-2251-B899-EF30-2A19438575D8}"/>
+                <a16:creationId xmlns:a16="http://schemas.microsoft.com/office/drawing/2014/main" xmlns="" id="{E3C52979-2251-B899-EF30-2A19438575D8}"/>
               </a:ext>
             </a:extLst>
           </p:cNvPr>
@@ -236,7 +236,7 @@
           <p:cNvPr id="4" name="Datumsplatzhalter 3">
             <a:extLst>
               <a:ext uri="{FF2B5EF4-FFF2-40B4-BE49-F238E27FC236}">
-                <a16:creationId xmlns:a16="http://schemas.microsoft.com/office/drawing/2014/main" id="{4659B1BE-F6BC-9E84-C540-ECF05CC37ABE}"/>
+                <a16:creationId xmlns:a16="http://schemas.microsoft.com/office/drawing/2014/main" xmlns="" id="{4659B1BE-F6BC-9E84-C540-ECF05CC37ABE}"/>
               </a:ext>
             </a:extLst>
           </p:cNvPr>
@@ -254,6 +254,7 @@
           <a:p>
             <a:fld id="{E5F54BAF-9E58-40B9-ADDC-0022BA13B894}" type="datetimeFigureOut">
               <a:rPr lang="de-DE" smtClean="0"/>
+              <a:pPr/>
               <a:t>08.11.2023</a:t>
             </a:fld>
             <a:endParaRPr lang="de-DE"/>
@@ -265,7 +266,7 @@
           <p:cNvPr id="5" name="Fußzeilenplatzhalter 4">
             <a:extLst>
               <a:ext uri="{FF2B5EF4-FFF2-40B4-BE49-F238E27FC236}">
-                <a16:creationId xmlns:a16="http://schemas.microsoft.com/office/drawing/2014/main" id="{F00A5C17-5C97-6BFA-FA25-D601AD8C26E7}"/>
+                <a16:creationId xmlns:a16="http://schemas.microsoft.com/office/drawing/2014/main" xmlns="" id="{F00A5C17-5C97-6BFA-FA25-D601AD8C26E7}"/>
               </a:ext>
             </a:extLst>
           </p:cNvPr>
@@ -290,7 +291,7 @@
           <p:cNvPr id="6" name="Foliennummernplatzhalter 5">
             <a:extLst>
               <a:ext uri="{FF2B5EF4-FFF2-40B4-BE49-F238E27FC236}">
-                <a16:creationId xmlns:a16="http://schemas.microsoft.com/office/drawing/2014/main" id="{A6792619-4C74-9FA2-C330-0BA28679E865}"/>
+                <a16:creationId xmlns:a16="http://schemas.microsoft.com/office/drawing/2014/main" xmlns="" id="{A6792619-4C74-9FA2-C330-0BA28679E865}"/>
               </a:ext>
             </a:extLst>
           </p:cNvPr>
@@ -308,6 +309,7 @@
           <a:p>
             <a:fld id="{495E8233-3489-41B6-97A2-856DBC1D1605}" type="slidenum">
               <a:rPr lang="de-DE" smtClean="0"/>
+              <a:pPr/>
               <a:t>‹Nr.›</a:t>
             </a:fld>
             <a:endParaRPr lang="de-DE"/>
@@ -317,7 +319,7 @@
     </p:spTree>
     <p:extLst>
       <p:ext uri="{BB962C8B-B14F-4D97-AF65-F5344CB8AC3E}">
-        <p14:creationId xmlns:p14="http://schemas.microsoft.com/office/powerpoint/2010/main" val="2757137543"/>
+        <p14:creationId xmlns:p14="http://schemas.microsoft.com/office/powerpoint/2010/main" xmlns="" val="2757137543"/>
       </p:ext>
     </p:extLst>
   </p:cSld>
@@ -349,7 +351,7 @@
           <p:cNvPr id="2" name="Titel 1">
             <a:extLst>
               <a:ext uri="{FF2B5EF4-FFF2-40B4-BE49-F238E27FC236}">
-                <a16:creationId xmlns:a16="http://schemas.microsoft.com/office/drawing/2014/main" id="{6FD33A35-6585-63F4-7744-6EC57C2D5B20}"/>
+                <a16:creationId xmlns:a16="http://schemas.microsoft.com/office/drawing/2014/main" xmlns="" id="{6FD33A35-6585-63F4-7744-6EC57C2D5B20}"/>
               </a:ext>
             </a:extLst>
           </p:cNvPr>
@@ -377,7 +379,7 @@
           <p:cNvPr id="3" name="Vertikaler Textplatzhalter 2">
             <a:extLst>
               <a:ext uri="{FF2B5EF4-FFF2-40B4-BE49-F238E27FC236}">
-                <a16:creationId xmlns:a16="http://schemas.microsoft.com/office/drawing/2014/main" id="{0819AAC6-7176-AE02-C1EE-7BAFE066FDC2}"/>
+                <a16:creationId xmlns:a16="http://schemas.microsoft.com/office/drawing/2014/main" xmlns="" id="{0819AAC6-7176-AE02-C1EE-7BAFE066FDC2}"/>
               </a:ext>
             </a:extLst>
           </p:cNvPr>
@@ -434,7 +436,7 @@
           <p:cNvPr id="4" name="Datumsplatzhalter 3">
             <a:extLst>
               <a:ext uri="{FF2B5EF4-FFF2-40B4-BE49-F238E27FC236}">
-                <a16:creationId xmlns:a16="http://schemas.microsoft.com/office/drawing/2014/main" id="{CBFBF88C-2E06-6739-B558-4D1F225D6BE0}"/>
+                <a16:creationId xmlns:a16="http://schemas.microsoft.com/office/drawing/2014/main" xmlns="" id="{CBFBF88C-2E06-6739-B558-4D1F225D6BE0}"/>
               </a:ext>
             </a:extLst>
           </p:cNvPr>
@@ -452,6 +454,7 @@
           <a:p>
             <a:fld id="{E5F54BAF-9E58-40B9-ADDC-0022BA13B894}" type="datetimeFigureOut">
               <a:rPr lang="de-DE" smtClean="0"/>
+              <a:pPr/>
               <a:t>08.11.2023</a:t>
             </a:fld>
             <a:endParaRPr lang="de-DE"/>
@@ -463,7 +466,7 @@
           <p:cNvPr id="5" name="Fußzeilenplatzhalter 4">
             <a:extLst>
               <a:ext uri="{FF2B5EF4-FFF2-40B4-BE49-F238E27FC236}">
-                <a16:creationId xmlns:a16="http://schemas.microsoft.com/office/drawing/2014/main" id="{ED6A594A-C831-7E42-55A4-AA31FA5B5383}"/>
+                <a16:creationId xmlns:a16="http://schemas.microsoft.com/office/drawing/2014/main" xmlns="" id="{ED6A594A-C831-7E42-55A4-AA31FA5B5383}"/>
               </a:ext>
             </a:extLst>
           </p:cNvPr>
@@ -488,7 +491,7 @@
           <p:cNvPr id="6" name="Foliennummernplatzhalter 5">
             <a:extLst>
               <a:ext uri="{FF2B5EF4-FFF2-40B4-BE49-F238E27FC236}">
-                <a16:creationId xmlns:a16="http://schemas.microsoft.com/office/drawing/2014/main" id="{EE8816EF-A6DB-04B6-071C-3BD5572AA18C}"/>
+                <a16:creationId xmlns:a16="http://schemas.microsoft.com/office/drawing/2014/main" xmlns="" id="{EE8816EF-A6DB-04B6-071C-3BD5572AA18C}"/>
               </a:ext>
             </a:extLst>
           </p:cNvPr>
@@ -506,6 +509,7 @@
           <a:p>
             <a:fld id="{495E8233-3489-41B6-97A2-856DBC1D1605}" type="slidenum">
               <a:rPr lang="de-DE" smtClean="0"/>
+              <a:pPr/>
               <a:t>‹Nr.›</a:t>
             </a:fld>
             <a:endParaRPr lang="de-DE"/>
@@ -515,7 +519,7 @@
     </p:spTree>
     <p:extLst>
       <p:ext uri="{BB962C8B-B14F-4D97-AF65-F5344CB8AC3E}">
-        <p14:creationId xmlns:p14="http://schemas.microsoft.com/office/powerpoint/2010/main" val="727986866"/>
+        <p14:creationId xmlns:p14="http://schemas.microsoft.com/office/powerpoint/2010/main" xmlns="" val="727986866"/>
       </p:ext>
     </p:extLst>
   </p:cSld>
@@ -547,7 +551,7 @@
           <p:cNvPr id="2" name="Vertikaler Titel 1">
             <a:extLst>
               <a:ext uri="{FF2B5EF4-FFF2-40B4-BE49-F238E27FC236}">
-                <a16:creationId xmlns:a16="http://schemas.microsoft.com/office/drawing/2014/main" id="{94BAAACE-3B96-9A30-A13F-9EDEE7195661}"/>
+                <a16:creationId xmlns:a16="http://schemas.microsoft.com/office/drawing/2014/main" xmlns="" id="{94BAAACE-3B96-9A30-A13F-9EDEE7195661}"/>
               </a:ext>
             </a:extLst>
           </p:cNvPr>
@@ -580,7 +584,7 @@
           <p:cNvPr id="3" name="Vertikaler Textplatzhalter 2">
             <a:extLst>
               <a:ext uri="{FF2B5EF4-FFF2-40B4-BE49-F238E27FC236}">
-                <a16:creationId xmlns:a16="http://schemas.microsoft.com/office/drawing/2014/main" id="{FF8DDDC7-B222-C412-E11A-3354B007D707}"/>
+                <a16:creationId xmlns:a16="http://schemas.microsoft.com/office/drawing/2014/main" xmlns="" id="{FF8DDDC7-B222-C412-E11A-3354B007D707}"/>
               </a:ext>
             </a:extLst>
           </p:cNvPr>
@@ -642,7 +646,7 @@
           <p:cNvPr id="4" name="Datumsplatzhalter 3">
             <a:extLst>
               <a:ext uri="{FF2B5EF4-FFF2-40B4-BE49-F238E27FC236}">
-                <a16:creationId xmlns:a16="http://schemas.microsoft.com/office/drawing/2014/main" id="{FD727CDA-4CE2-E47C-28CE-B2E472C5749F}"/>
+                <a16:creationId xmlns:a16="http://schemas.microsoft.com/office/drawing/2014/main" xmlns="" id="{FD727CDA-4CE2-E47C-28CE-B2E472C5749F}"/>
               </a:ext>
             </a:extLst>
           </p:cNvPr>
@@ -660,6 +664,7 @@
           <a:p>
             <a:fld id="{E5F54BAF-9E58-40B9-ADDC-0022BA13B894}" type="datetimeFigureOut">
               <a:rPr lang="de-DE" smtClean="0"/>
+              <a:pPr/>
               <a:t>08.11.2023</a:t>
             </a:fld>
             <a:endParaRPr lang="de-DE"/>
@@ -671,7 +676,7 @@
           <p:cNvPr id="5" name="Fußzeilenplatzhalter 4">
             <a:extLst>
               <a:ext uri="{FF2B5EF4-FFF2-40B4-BE49-F238E27FC236}">
-                <a16:creationId xmlns:a16="http://schemas.microsoft.com/office/drawing/2014/main" id="{2C8C4806-A129-0DFC-820C-E0C7BF462C4B}"/>
+                <a16:creationId xmlns:a16="http://schemas.microsoft.com/office/drawing/2014/main" xmlns="" id="{2C8C4806-A129-0DFC-820C-E0C7BF462C4B}"/>
               </a:ext>
             </a:extLst>
           </p:cNvPr>
@@ -696,7 +701,7 @@
           <p:cNvPr id="6" name="Foliennummernplatzhalter 5">
             <a:extLst>
               <a:ext uri="{FF2B5EF4-FFF2-40B4-BE49-F238E27FC236}">
-                <a16:creationId xmlns:a16="http://schemas.microsoft.com/office/drawing/2014/main" id="{FFF6B6F1-83C8-CC25-8870-3AC6FC708C0B}"/>
+                <a16:creationId xmlns:a16="http://schemas.microsoft.com/office/drawing/2014/main" xmlns="" id="{FFF6B6F1-83C8-CC25-8870-3AC6FC708C0B}"/>
               </a:ext>
             </a:extLst>
           </p:cNvPr>
@@ -714,6 +719,7 @@
           <a:p>
             <a:fld id="{495E8233-3489-41B6-97A2-856DBC1D1605}" type="slidenum">
               <a:rPr lang="de-DE" smtClean="0"/>
+              <a:pPr/>
               <a:t>‹Nr.›</a:t>
             </a:fld>
             <a:endParaRPr lang="de-DE"/>
@@ -723,7 +729,7 @@
     </p:spTree>
     <p:extLst>
       <p:ext uri="{BB962C8B-B14F-4D97-AF65-F5344CB8AC3E}">
-        <p14:creationId xmlns:p14="http://schemas.microsoft.com/office/powerpoint/2010/main" val="907489754"/>
+        <p14:creationId xmlns:p14="http://schemas.microsoft.com/office/powerpoint/2010/main" xmlns="" val="907489754"/>
       </p:ext>
     </p:extLst>
   </p:cSld>
@@ -755,7 +761,7 @@
           <p:cNvPr id="2" name="Titel 1">
             <a:extLst>
               <a:ext uri="{FF2B5EF4-FFF2-40B4-BE49-F238E27FC236}">
-                <a16:creationId xmlns:a16="http://schemas.microsoft.com/office/drawing/2014/main" id="{686FBC05-951B-0E27-C994-A191CC85D9C3}"/>
+                <a16:creationId xmlns:a16="http://schemas.microsoft.com/office/drawing/2014/main" xmlns="" id="{686FBC05-951B-0E27-C994-A191CC85D9C3}"/>
               </a:ext>
             </a:extLst>
           </p:cNvPr>
@@ -783,7 +789,7 @@
           <p:cNvPr id="3" name="Inhaltsplatzhalter 2">
             <a:extLst>
               <a:ext uri="{FF2B5EF4-FFF2-40B4-BE49-F238E27FC236}">
-                <a16:creationId xmlns:a16="http://schemas.microsoft.com/office/drawing/2014/main" id="{8BC6EC5C-D251-7265-0932-90E22A239694}"/>
+                <a16:creationId xmlns:a16="http://schemas.microsoft.com/office/drawing/2014/main" xmlns="" id="{8BC6EC5C-D251-7265-0932-90E22A239694}"/>
               </a:ext>
             </a:extLst>
           </p:cNvPr>
@@ -840,7 +846,7 @@
           <p:cNvPr id="4" name="Datumsplatzhalter 3">
             <a:extLst>
               <a:ext uri="{FF2B5EF4-FFF2-40B4-BE49-F238E27FC236}">
-                <a16:creationId xmlns:a16="http://schemas.microsoft.com/office/drawing/2014/main" id="{B37FB6D4-F508-0985-5DFB-513640AFEFB3}"/>
+                <a16:creationId xmlns:a16="http://schemas.microsoft.com/office/drawing/2014/main" xmlns="" id="{B37FB6D4-F508-0985-5DFB-513640AFEFB3}"/>
               </a:ext>
             </a:extLst>
           </p:cNvPr>
@@ -858,6 +864,7 @@
           <a:p>
             <a:fld id="{E5F54BAF-9E58-40B9-ADDC-0022BA13B894}" type="datetimeFigureOut">
               <a:rPr lang="de-DE" smtClean="0"/>
+              <a:pPr/>
               <a:t>08.11.2023</a:t>
             </a:fld>
             <a:endParaRPr lang="de-DE"/>
@@ -869,7 +876,7 @@
           <p:cNvPr id="5" name="Fußzeilenplatzhalter 4">
             <a:extLst>
               <a:ext uri="{FF2B5EF4-FFF2-40B4-BE49-F238E27FC236}">
-                <a16:creationId xmlns:a16="http://schemas.microsoft.com/office/drawing/2014/main" id="{90126931-990B-3F61-3E0A-1CCF1A555217}"/>
+                <a16:creationId xmlns:a16="http://schemas.microsoft.com/office/drawing/2014/main" xmlns="" id="{90126931-990B-3F61-3E0A-1CCF1A555217}"/>
               </a:ext>
             </a:extLst>
           </p:cNvPr>
@@ -894,7 +901,7 @@
           <p:cNvPr id="6" name="Foliennummernplatzhalter 5">
             <a:extLst>
               <a:ext uri="{FF2B5EF4-FFF2-40B4-BE49-F238E27FC236}">
-                <a16:creationId xmlns:a16="http://schemas.microsoft.com/office/drawing/2014/main" id="{5E5D99CB-2F84-0CFE-67E2-9AD189E53EEF}"/>
+                <a16:creationId xmlns:a16="http://schemas.microsoft.com/office/drawing/2014/main" xmlns="" id="{5E5D99CB-2F84-0CFE-67E2-9AD189E53EEF}"/>
               </a:ext>
             </a:extLst>
           </p:cNvPr>
@@ -912,6 +919,7 @@
           <a:p>
             <a:fld id="{495E8233-3489-41B6-97A2-856DBC1D1605}" type="slidenum">
               <a:rPr lang="de-DE" smtClean="0"/>
+              <a:pPr/>
               <a:t>‹Nr.›</a:t>
             </a:fld>
             <a:endParaRPr lang="de-DE"/>
@@ -921,7 +929,7 @@
     </p:spTree>
     <p:extLst>
       <p:ext uri="{BB962C8B-B14F-4D97-AF65-F5344CB8AC3E}">
-        <p14:creationId xmlns:p14="http://schemas.microsoft.com/office/powerpoint/2010/main" val="1380450370"/>
+        <p14:creationId xmlns:p14="http://schemas.microsoft.com/office/powerpoint/2010/main" xmlns="" val="1380450370"/>
       </p:ext>
     </p:extLst>
   </p:cSld>
@@ -953,7 +961,7 @@
           <p:cNvPr id="2" name="Titel 1">
             <a:extLst>
               <a:ext uri="{FF2B5EF4-FFF2-40B4-BE49-F238E27FC236}">
-                <a16:creationId xmlns:a16="http://schemas.microsoft.com/office/drawing/2014/main" id="{C00C1B22-0EDC-5433-9C7A-C2E607665E71}"/>
+                <a16:creationId xmlns:a16="http://schemas.microsoft.com/office/drawing/2014/main" xmlns="" id="{C00C1B22-0EDC-5433-9C7A-C2E607665E71}"/>
               </a:ext>
             </a:extLst>
           </p:cNvPr>
@@ -990,7 +998,7 @@
           <p:cNvPr id="3" name="Textplatzhalter 2">
             <a:extLst>
               <a:ext uri="{FF2B5EF4-FFF2-40B4-BE49-F238E27FC236}">
-                <a16:creationId xmlns:a16="http://schemas.microsoft.com/office/drawing/2014/main" id="{52FD2E27-E87B-2E60-2679-6D6CF043E4FF}"/>
+                <a16:creationId xmlns:a16="http://schemas.microsoft.com/office/drawing/2014/main" xmlns="" id="{52FD2E27-E87B-2E60-2679-6D6CF043E4FF}"/>
               </a:ext>
             </a:extLst>
           </p:cNvPr>
@@ -1115,7 +1123,7 @@
           <p:cNvPr id="4" name="Datumsplatzhalter 3">
             <a:extLst>
               <a:ext uri="{FF2B5EF4-FFF2-40B4-BE49-F238E27FC236}">
-                <a16:creationId xmlns:a16="http://schemas.microsoft.com/office/drawing/2014/main" id="{8CB4B802-A55D-05DF-7877-5D41A73360B2}"/>
+                <a16:creationId xmlns:a16="http://schemas.microsoft.com/office/drawing/2014/main" xmlns="" id="{8CB4B802-A55D-05DF-7877-5D41A73360B2}"/>
               </a:ext>
             </a:extLst>
           </p:cNvPr>
@@ -1133,6 +1141,7 @@
           <a:p>
             <a:fld id="{E5F54BAF-9E58-40B9-ADDC-0022BA13B894}" type="datetimeFigureOut">
               <a:rPr lang="de-DE" smtClean="0"/>
+              <a:pPr/>
               <a:t>08.11.2023</a:t>
             </a:fld>
             <a:endParaRPr lang="de-DE"/>
@@ -1144,7 +1153,7 @@
           <p:cNvPr id="5" name="Fußzeilenplatzhalter 4">
             <a:extLst>
               <a:ext uri="{FF2B5EF4-FFF2-40B4-BE49-F238E27FC236}">
-                <a16:creationId xmlns:a16="http://schemas.microsoft.com/office/drawing/2014/main" id="{26B98E3B-85A4-888A-604B-F4FEFD9BB3E2}"/>
+                <a16:creationId xmlns:a16="http://schemas.microsoft.com/office/drawing/2014/main" xmlns="" id="{26B98E3B-85A4-888A-604B-F4FEFD9BB3E2}"/>
               </a:ext>
             </a:extLst>
           </p:cNvPr>
@@ -1169,7 +1178,7 @@
           <p:cNvPr id="6" name="Foliennummernplatzhalter 5">
             <a:extLst>
               <a:ext uri="{FF2B5EF4-FFF2-40B4-BE49-F238E27FC236}">
-                <a16:creationId xmlns:a16="http://schemas.microsoft.com/office/drawing/2014/main" id="{B366262E-8C02-E0D5-2C52-BC6C12E6886E}"/>
+                <a16:creationId xmlns:a16="http://schemas.microsoft.com/office/drawing/2014/main" xmlns="" id="{B366262E-8C02-E0D5-2C52-BC6C12E6886E}"/>
               </a:ext>
             </a:extLst>
           </p:cNvPr>
@@ -1187,6 +1196,7 @@
           <a:p>
             <a:fld id="{495E8233-3489-41B6-97A2-856DBC1D1605}" type="slidenum">
               <a:rPr lang="de-DE" smtClean="0"/>
+              <a:pPr/>
               <a:t>‹Nr.›</a:t>
             </a:fld>
             <a:endParaRPr lang="de-DE"/>
@@ -1196,7 +1206,7 @@
     </p:spTree>
     <p:extLst>
       <p:ext uri="{BB962C8B-B14F-4D97-AF65-F5344CB8AC3E}">
-        <p14:creationId xmlns:p14="http://schemas.microsoft.com/office/powerpoint/2010/main" val="3681091544"/>
+        <p14:creationId xmlns:p14="http://schemas.microsoft.com/office/powerpoint/2010/main" xmlns="" val="3681091544"/>
       </p:ext>
     </p:extLst>
   </p:cSld>
@@ -1228,7 +1238,7 @@
           <p:cNvPr id="2" name="Titel 1">
             <a:extLst>
               <a:ext uri="{FF2B5EF4-FFF2-40B4-BE49-F238E27FC236}">
-                <a16:creationId xmlns:a16="http://schemas.microsoft.com/office/drawing/2014/main" id="{47640113-A8ED-3F82-8492-AE616B6B2D15}"/>
+                <a16:creationId xmlns:a16="http://schemas.microsoft.com/office/drawing/2014/main" xmlns="" id="{47640113-A8ED-3F82-8492-AE616B6B2D15}"/>
               </a:ext>
             </a:extLst>
           </p:cNvPr>
@@ -1256,7 +1266,7 @@
           <p:cNvPr id="3" name="Inhaltsplatzhalter 2">
             <a:extLst>
               <a:ext uri="{FF2B5EF4-FFF2-40B4-BE49-F238E27FC236}">
-                <a16:creationId xmlns:a16="http://schemas.microsoft.com/office/drawing/2014/main" id="{E777AC79-EFDA-D98B-3926-F4D8EC8F1E9D}"/>
+                <a16:creationId xmlns:a16="http://schemas.microsoft.com/office/drawing/2014/main" xmlns="" id="{E777AC79-EFDA-D98B-3926-F4D8EC8F1E9D}"/>
               </a:ext>
             </a:extLst>
           </p:cNvPr>
@@ -1318,7 +1328,7 @@
           <p:cNvPr id="4" name="Inhaltsplatzhalter 3">
             <a:extLst>
               <a:ext uri="{FF2B5EF4-FFF2-40B4-BE49-F238E27FC236}">
-                <a16:creationId xmlns:a16="http://schemas.microsoft.com/office/drawing/2014/main" id="{1F350547-F73D-319E-08AA-847DB3652433}"/>
+                <a16:creationId xmlns:a16="http://schemas.microsoft.com/office/drawing/2014/main" xmlns="" id="{1F350547-F73D-319E-08AA-847DB3652433}"/>
               </a:ext>
             </a:extLst>
           </p:cNvPr>
@@ -1380,7 +1390,7 @@
           <p:cNvPr id="5" name="Datumsplatzhalter 4">
             <a:extLst>
               <a:ext uri="{FF2B5EF4-FFF2-40B4-BE49-F238E27FC236}">
-                <a16:creationId xmlns:a16="http://schemas.microsoft.com/office/drawing/2014/main" id="{F4DB2E3C-FFBD-9DA6-8DAB-40F21B4D03B3}"/>
+                <a16:creationId xmlns:a16="http://schemas.microsoft.com/office/drawing/2014/main" xmlns="" id="{F4DB2E3C-FFBD-9DA6-8DAB-40F21B4D03B3}"/>
               </a:ext>
             </a:extLst>
           </p:cNvPr>
@@ -1398,6 +1408,7 @@
           <a:p>
             <a:fld id="{E5F54BAF-9E58-40B9-ADDC-0022BA13B894}" type="datetimeFigureOut">
               <a:rPr lang="de-DE" smtClean="0"/>
+              <a:pPr/>
               <a:t>08.11.2023</a:t>
             </a:fld>
             <a:endParaRPr lang="de-DE"/>
@@ -1409,7 +1420,7 @@
           <p:cNvPr id="6" name="Fußzeilenplatzhalter 5">
             <a:extLst>
               <a:ext uri="{FF2B5EF4-FFF2-40B4-BE49-F238E27FC236}">
-                <a16:creationId xmlns:a16="http://schemas.microsoft.com/office/drawing/2014/main" id="{1C6BBAD9-DF75-13C7-9D1A-1B77C1C5F629}"/>
+                <a16:creationId xmlns:a16="http://schemas.microsoft.com/office/drawing/2014/main" xmlns="" id="{1C6BBAD9-DF75-13C7-9D1A-1B77C1C5F629}"/>
               </a:ext>
             </a:extLst>
           </p:cNvPr>
@@ -1434,7 +1445,7 @@
           <p:cNvPr id="7" name="Foliennummernplatzhalter 6">
             <a:extLst>
               <a:ext uri="{FF2B5EF4-FFF2-40B4-BE49-F238E27FC236}">
-                <a16:creationId xmlns:a16="http://schemas.microsoft.com/office/drawing/2014/main" id="{584B0844-1AE9-3281-ED32-602C54F6E429}"/>
+                <a16:creationId xmlns:a16="http://schemas.microsoft.com/office/drawing/2014/main" xmlns="" id="{584B0844-1AE9-3281-ED32-602C54F6E429}"/>
               </a:ext>
             </a:extLst>
           </p:cNvPr>
@@ -1452,6 +1463,7 @@
           <a:p>
             <a:fld id="{495E8233-3489-41B6-97A2-856DBC1D1605}" type="slidenum">
               <a:rPr lang="de-DE" smtClean="0"/>
+              <a:pPr/>
               <a:t>‹Nr.›</a:t>
             </a:fld>
             <a:endParaRPr lang="de-DE"/>
@@ -1461,7 +1473,7 @@
     </p:spTree>
     <p:extLst>
       <p:ext uri="{BB962C8B-B14F-4D97-AF65-F5344CB8AC3E}">
-        <p14:creationId xmlns:p14="http://schemas.microsoft.com/office/powerpoint/2010/main" val="1285953335"/>
+        <p14:creationId xmlns:p14="http://schemas.microsoft.com/office/powerpoint/2010/main" xmlns="" val="1285953335"/>
       </p:ext>
     </p:extLst>
   </p:cSld>
@@ -1493,7 +1505,7 @@
           <p:cNvPr id="2" name="Titel 1">
             <a:extLst>
               <a:ext uri="{FF2B5EF4-FFF2-40B4-BE49-F238E27FC236}">
-                <a16:creationId xmlns:a16="http://schemas.microsoft.com/office/drawing/2014/main" id="{A1FB4549-7970-D2BE-3E87-D6CF63157FA0}"/>
+                <a16:creationId xmlns:a16="http://schemas.microsoft.com/office/drawing/2014/main" xmlns="" id="{A1FB4549-7970-D2BE-3E87-D6CF63157FA0}"/>
               </a:ext>
             </a:extLst>
           </p:cNvPr>
@@ -1526,7 +1538,7 @@
           <p:cNvPr id="3" name="Textplatzhalter 2">
             <a:extLst>
               <a:ext uri="{FF2B5EF4-FFF2-40B4-BE49-F238E27FC236}">
-                <a16:creationId xmlns:a16="http://schemas.microsoft.com/office/drawing/2014/main" id="{26687EDF-F1E6-B632-EF40-5CA736C6F9BB}"/>
+                <a16:creationId xmlns:a16="http://schemas.microsoft.com/office/drawing/2014/main" xmlns="" id="{26687EDF-F1E6-B632-EF40-5CA736C6F9BB}"/>
               </a:ext>
             </a:extLst>
           </p:cNvPr>
@@ -1597,7 +1609,7 @@
           <p:cNvPr id="4" name="Inhaltsplatzhalter 3">
             <a:extLst>
               <a:ext uri="{FF2B5EF4-FFF2-40B4-BE49-F238E27FC236}">
-                <a16:creationId xmlns:a16="http://schemas.microsoft.com/office/drawing/2014/main" id="{C63AA7DE-19A7-A094-B69C-4579C2322299}"/>
+                <a16:creationId xmlns:a16="http://schemas.microsoft.com/office/drawing/2014/main" xmlns="" id="{C63AA7DE-19A7-A094-B69C-4579C2322299}"/>
               </a:ext>
             </a:extLst>
           </p:cNvPr>
@@ -1659,7 +1671,7 @@
           <p:cNvPr id="5" name="Textplatzhalter 4">
             <a:extLst>
               <a:ext uri="{FF2B5EF4-FFF2-40B4-BE49-F238E27FC236}">
-                <a16:creationId xmlns:a16="http://schemas.microsoft.com/office/drawing/2014/main" id="{E60C441E-8B9F-5AEC-B887-1AF4E7761DF1}"/>
+                <a16:creationId xmlns:a16="http://schemas.microsoft.com/office/drawing/2014/main" xmlns="" id="{E60C441E-8B9F-5AEC-B887-1AF4E7761DF1}"/>
               </a:ext>
             </a:extLst>
           </p:cNvPr>
@@ -1730,7 +1742,7 @@
           <p:cNvPr id="6" name="Inhaltsplatzhalter 5">
             <a:extLst>
               <a:ext uri="{FF2B5EF4-FFF2-40B4-BE49-F238E27FC236}">
-                <a16:creationId xmlns:a16="http://schemas.microsoft.com/office/drawing/2014/main" id="{54E3EA2F-BE0B-2029-9B88-12AD882D8434}"/>
+                <a16:creationId xmlns:a16="http://schemas.microsoft.com/office/drawing/2014/main" xmlns="" id="{54E3EA2F-BE0B-2029-9B88-12AD882D8434}"/>
               </a:ext>
             </a:extLst>
           </p:cNvPr>
@@ -1792,7 +1804,7 @@
           <p:cNvPr id="7" name="Datumsplatzhalter 6">
             <a:extLst>
               <a:ext uri="{FF2B5EF4-FFF2-40B4-BE49-F238E27FC236}">
-                <a16:creationId xmlns:a16="http://schemas.microsoft.com/office/drawing/2014/main" id="{C8CEC4A3-FDA4-D3FE-1909-9BB0046D707D}"/>
+                <a16:creationId xmlns:a16="http://schemas.microsoft.com/office/drawing/2014/main" xmlns="" id="{C8CEC4A3-FDA4-D3FE-1909-9BB0046D707D}"/>
               </a:ext>
             </a:extLst>
           </p:cNvPr>
@@ -1810,6 +1822,7 @@
           <a:p>
             <a:fld id="{E5F54BAF-9E58-40B9-ADDC-0022BA13B894}" type="datetimeFigureOut">
               <a:rPr lang="de-DE" smtClean="0"/>
+              <a:pPr/>
               <a:t>08.11.2023</a:t>
             </a:fld>
             <a:endParaRPr lang="de-DE"/>
@@ -1821,7 +1834,7 @@
           <p:cNvPr id="8" name="Fußzeilenplatzhalter 7">
             <a:extLst>
               <a:ext uri="{FF2B5EF4-FFF2-40B4-BE49-F238E27FC236}">
-                <a16:creationId xmlns:a16="http://schemas.microsoft.com/office/drawing/2014/main" id="{072A6F86-A52F-87E0-2648-81C9D5E98254}"/>
+                <a16:creationId xmlns:a16="http://schemas.microsoft.com/office/drawing/2014/main" xmlns="" id="{072A6F86-A52F-87E0-2648-81C9D5E98254}"/>
               </a:ext>
             </a:extLst>
           </p:cNvPr>
@@ -1846,7 +1859,7 @@
           <p:cNvPr id="9" name="Foliennummernplatzhalter 8">
             <a:extLst>
               <a:ext uri="{FF2B5EF4-FFF2-40B4-BE49-F238E27FC236}">
-                <a16:creationId xmlns:a16="http://schemas.microsoft.com/office/drawing/2014/main" id="{4BC16D6B-9AED-4971-7B51-42D6CCDD4530}"/>
+                <a16:creationId xmlns:a16="http://schemas.microsoft.com/office/drawing/2014/main" xmlns="" id="{4BC16D6B-9AED-4971-7B51-42D6CCDD4530}"/>
               </a:ext>
             </a:extLst>
           </p:cNvPr>
@@ -1864,6 +1877,7 @@
           <a:p>
             <a:fld id="{495E8233-3489-41B6-97A2-856DBC1D1605}" type="slidenum">
               <a:rPr lang="de-DE" smtClean="0"/>
+              <a:pPr/>
               <a:t>‹Nr.›</a:t>
             </a:fld>
             <a:endParaRPr lang="de-DE"/>
@@ -1873,7 +1887,7 @@
     </p:spTree>
     <p:extLst>
       <p:ext uri="{BB962C8B-B14F-4D97-AF65-F5344CB8AC3E}">
-        <p14:creationId xmlns:p14="http://schemas.microsoft.com/office/powerpoint/2010/main" val="1194677618"/>
+        <p14:creationId xmlns:p14="http://schemas.microsoft.com/office/powerpoint/2010/main" xmlns="" val="1194677618"/>
       </p:ext>
     </p:extLst>
   </p:cSld>
@@ -1905,7 +1919,7 @@
           <p:cNvPr id="2" name="Titel 1">
             <a:extLst>
               <a:ext uri="{FF2B5EF4-FFF2-40B4-BE49-F238E27FC236}">
-                <a16:creationId xmlns:a16="http://schemas.microsoft.com/office/drawing/2014/main" id="{CDC98F07-569C-97AA-4106-5BA0119300AC}"/>
+                <a16:creationId xmlns:a16="http://schemas.microsoft.com/office/drawing/2014/main" xmlns="" id="{CDC98F07-569C-97AA-4106-5BA0119300AC}"/>
               </a:ext>
             </a:extLst>
           </p:cNvPr>
@@ -1933,7 +1947,7 @@
           <p:cNvPr id="3" name="Datumsplatzhalter 2">
             <a:extLst>
               <a:ext uri="{FF2B5EF4-FFF2-40B4-BE49-F238E27FC236}">
-                <a16:creationId xmlns:a16="http://schemas.microsoft.com/office/drawing/2014/main" id="{0C819654-8727-7DC7-01D9-F999805CC61C}"/>
+                <a16:creationId xmlns:a16="http://schemas.microsoft.com/office/drawing/2014/main" xmlns="" id="{0C819654-8727-7DC7-01D9-F999805CC61C}"/>
               </a:ext>
             </a:extLst>
           </p:cNvPr>
@@ -1951,6 +1965,7 @@
           <a:p>
             <a:fld id="{E5F54BAF-9E58-40B9-ADDC-0022BA13B894}" type="datetimeFigureOut">
               <a:rPr lang="de-DE" smtClean="0"/>
+              <a:pPr/>
               <a:t>08.11.2023</a:t>
             </a:fld>
             <a:endParaRPr lang="de-DE"/>
@@ -1962,7 +1977,7 @@
           <p:cNvPr id="4" name="Fußzeilenplatzhalter 3">
             <a:extLst>
               <a:ext uri="{FF2B5EF4-FFF2-40B4-BE49-F238E27FC236}">
-                <a16:creationId xmlns:a16="http://schemas.microsoft.com/office/drawing/2014/main" id="{DF645A51-A9B8-2BC9-3E7F-E715E066D818}"/>
+                <a16:creationId xmlns:a16="http://schemas.microsoft.com/office/drawing/2014/main" xmlns="" id="{DF645A51-A9B8-2BC9-3E7F-E715E066D818}"/>
               </a:ext>
             </a:extLst>
           </p:cNvPr>
@@ -1987,7 +2002,7 @@
           <p:cNvPr id="5" name="Foliennummernplatzhalter 4">
             <a:extLst>
               <a:ext uri="{FF2B5EF4-FFF2-40B4-BE49-F238E27FC236}">
-                <a16:creationId xmlns:a16="http://schemas.microsoft.com/office/drawing/2014/main" id="{89B6C067-3A46-5D40-047D-9357DBD510F8}"/>
+                <a16:creationId xmlns:a16="http://schemas.microsoft.com/office/drawing/2014/main" xmlns="" id="{89B6C067-3A46-5D40-047D-9357DBD510F8}"/>
               </a:ext>
             </a:extLst>
           </p:cNvPr>
@@ -2005,6 +2020,7 @@
           <a:p>
             <a:fld id="{495E8233-3489-41B6-97A2-856DBC1D1605}" type="slidenum">
               <a:rPr lang="de-DE" smtClean="0"/>
+              <a:pPr/>
               <a:t>‹Nr.›</a:t>
             </a:fld>
             <a:endParaRPr lang="de-DE"/>
@@ -2014,7 +2030,7 @@
     </p:spTree>
     <p:extLst>
       <p:ext uri="{BB962C8B-B14F-4D97-AF65-F5344CB8AC3E}">
-        <p14:creationId xmlns:p14="http://schemas.microsoft.com/office/powerpoint/2010/main" val="2385503430"/>
+        <p14:creationId xmlns:p14="http://schemas.microsoft.com/office/powerpoint/2010/main" xmlns="" val="2385503430"/>
       </p:ext>
     </p:extLst>
   </p:cSld>
@@ -2046,7 +2062,7 @@
           <p:cNvPr id="2" name="Datumsplatzhalter 1">
             <a:extLst>
               <a:ext uri="{FF2B5EF4-FFF2-40B4-BE49-F238E27FC236}">
-                <a16:creationId xmlns:a16="http://schemas.microsoft.com/office/drawing/2014/main" id="{FF2AB35B-C184-F4D8-5153-6BCAE5BBB36B}"/>
+                <a16:creationId xmlns:a16="http://schemas.microsoft.com/office/drawing/2014/main" xmlns="" id="{FF2AB35B-C184-F4D8-5153-6BCAE5BBB36B}"/>
               </a:ext>
             </a:extLst>
           </p:cNvPr>
@@ -2064,6 +2080,7 @@
           <a:p>
             <a:fld id="{E5F54BAF-9E58-40B9-ADDC-0022BA13B894}" type="datetimeFigureOut">
               <a:rPr lang="de-DE" smtClean="0"/>
+              <a:pPr/>
               <a:t>08.11.2023</a:t>
             </a:fld>
             <a:endParaRPr lang="de-DE"/>
@@ -2075,7 +2092,7 @@
           <p:cNvPr id="3" name="Fußzeilenplatzhalter 2">
             <a:extLst>
               <a:ext uri="{FF2B5EF4-FFF2-40B4-BE49-F238E27FC236}">
-                <a16:creationId xmlns:a16="http://schemas.microsoft.com/office/drawing/2014/main" id="{52D3D9FC-F92E-27CA-EE08-9F763583548C}"/>
+                <a16:creationId xmlns:a16="http://schemas.microsoft.com/office/drawing/2014/main" xmlns="" id="{52D3D9FC-F92E-27CA-EE08-9F763583548C}"/>
               </a:ext>
             </a:extLst>
           </p:cNvPr>
@@ -2100,7 +2117,7 @@
           <p:cNvPr id="4" name="Foliennummernplatzhalter 3">
             <a:extLst>
               <a:ext uri="{FF2B5EF4-FFF2-40B4-BE49-F238E27FC236}">
-                <a16:creationId xmlns:a16="http://schemas.microsoft.com/office/drawing/2014/main" id="{E7E76A25-7905-B8E1-43D6-4402B3641D31}"/>
+                <a16:creationId xmlns:a16="http://schemas.microsoft.com/office/drawing/2014/main" xmlns="" id="{E7E76A25-7905-B8E1-43D6-4402B3641D31}"/>
               </a:ext>
             </a:extLst>
           </p:cNvPr>
@@ -2118,6 +2135,7 @@
           <a:p>
             <a:fld id="{495E8233-3489-41B6-97A2-856DBC1D1605}" type="slidenum">
               <a:rPr lang="de-DE" smtClean="0"/>
+              <a:pPr/>
               <a:t>‹Nr.›</a:t>
             </a:fld>
             <a:endParaRPr lang="de-DE"/>
@@ -2127,7 +2145,7 @@
     </p:spTree>
     <p:extLst>
       <p:ext uri="{BB962C8B-B14F-4D97-AF65-F5344CB8AC3E}">
-        <p14:creationId xmlns:p14="http://schemas.microsoft.com/office/powerpoint/2010/main" val="4180400202"/>
+        <p14:creationId xmlns:p14="http://schemas.microsoft.com/office/powerpoint/2010/main" xmlns="" val="4180400202"/>
       </p:ext>
     </p:extLst>
   </p:cSld>
@@ -2159,7 +2177,7 @@
           <p:cNvPr id="2" name="Titel 1">
             <a:extLst>
               <a:ext uri="{FF2B5EF4-FFF2-40B4-BE49-F238E27FC236}">
-                <a16:creationId xmlns:a16="http://schemas.microsoft.com/office/drawing/2014/main" id="{D84CA98A-BDCD-351C-66DC-9B948DCA8EF6}"/>
+                <a16:creationId xmlns:a16="http://schemas.microsoft.com/office/drawing/2014/main" xmlns="" id="{D84CA98A-BDCD-351C-66DC-9B948DCA8EF6}"/>
               </a:ext>
             </a:extLst>
           </p:cNvPr>
@@ -2196,7 +2214,7 @@
           <p:cNvPr id="3" name="Inhaltsplatzhalter 2">
             <a:extLst>
               <a:ext uri="{FF2B5EF4-FFF2-40B4-BE49-F238E27FC236}">
-                <a16:creationId xmlns:a16="http://schemas.microsoft.com/office/drawing/2014/main" id="{1BC6AC52-50E8-0735-F444-7F9321EFED82}"/>
+                <a16:creationId xmlns:a16="http://schemas.microsoft.com/office/drawing/2014/main" xmlns="" id="{1BC6AC52-50E8-0735-F444-7F9321EFED82}"/>
               </a:ext>
             </a:extLst>
           </p:cNvPr>
@@ -2286,7 +2304,7 @@
           <p:cNvPr id="4" name="Textplatzhalter 3">
             <a:extLst>
               <a:ext uri="{FF2B5EF4-FFF2-40B4-BE49-F238E27FC236}">
-                <a16:creationId xmlns:a16="http://schemas.microsoft.com/office/drawing/2014/main" id="{CBA0D2D8-90C5-77E3-22BA-21734261403A}"/>
+                <a16:creationId xmlns:a16="http://schemas.microsoft.com/office/drawing/2014/main" xmlns="" id="{CBA0D2D8-90C5-77E3-22BA-21734261403A}"/>
               </a:ext>
             </a:extLst>
           </p:cNvPr>
@@ -2357,7 +2375,7 @@
           <p:cNvPr id="5" name="Datumsplatzhalter 4">
             <a:extLst>
               <a:ext uri="{FF2B5EF4-FFF2-40B4-BE49-F238E27FC236}">
-                <a16:creationId xmlns:a16="http://schemas.microsoft.com/office/drawing/2014/main" id="{4DD81BF4-9A67-322D-DF21-E7EEB4E50A35}"/>
+                <a16:creationId xmlns:a16="http://schemas.microsoft.com/office/drawing/2014/main" xmlns="" id="{4DD81BF4-9A67-322D-DF21-E7EEB4E50A35}"/>
               </a:ext>
             </a:extLst>
           </p:cNvPr>
@@ -2375,6 +2393,7 @@
           <a:p>
             <a:fld id="{E5F54BAF-9E58-40B9-ADDC-0022BA13B894}" type="datetimeFigureOut">
               <a:rPr lang="de-DE" smtClean="0"/>
+              <a:pPr/>
               <a:t>08.11.2023</a:t>
             </a:fld>
             <a:endParaRPr lang="de-DE"/>
@@ -2386,7 +2405,7 @@
           <p:cNvPr id="6" name="Fußzeilenplatzhalter 5">
             <a:extLst>
               <a:ext uri="{FF2B5EF4-FFF2-40B4-BE49-F238E27FC236}">
-                <a16:creationId xmlns:a16="http://schemas.microsoft.com/office/drawing/2014/main" id="{370347E8-E79F-5687-86BF-AA9C53121CC6}"/>
+                <a16:creationId xmlns:a16="http://schemas.microsoft.com/office/drawing/2014/main" xmlns="" id="{370347E8-E79F-5687-86BF-AA9C53121CC6}"/>
               </a:ext>
             </a:extLst>
           </p:cNvPr>
@@ -2411,7 +2430,7 @@
           <p:cNvPr id="7" name="Foliennummernplatzhalter 6">
             <a:extLst>
               <a:ext uri="{FF2B5EF4-FFF2-40B4-BE49-F238E27FC236}">
-                <a16:creationId xmlns:a16="http://schemas.microsoft.com/office/drawing/2014/main" id="{1FDF37B6-771E-FF71-EAD9-B17FA51BE36F}"/>
+                <a16:creationId xmlns:a16="http://schemas.microsoft.com/office/drawing/2014/main" xmlns="" id="{1FDF37B6-771E-FF71-EAD9-B17FA51BE36F}"/>
               </a:ext>
             </a:extLst>
           </p:cNvPr>
@@ -2429,6 +2448,7 @@
           <a:p>
             <a:fld id="{495E8233-3489-41B6-97A2-856DBC1D1605}" type="slidenum">
               <a:rPr lang="de-DE" smtClean="0"/>
+              <a:pPr/>
               <a:t>‹Nr.›</a:t>
             </a:fld>
             <a:endParaRPr lang="de-DE"/>
@@ -2438,7 +2458,7 @@
     </p:spTree>
     <p:extLst>
       <p:ext uri="{BB962C8B-B14F-4D97-AF65-F5344CB8AC3E}">
-        <p14:creationId xmlns:p14="http://schemas.microsoft.com/office/powerpoint/2010/main" val="948628103"/>
+        <p14:creationId xmlns:p14="http://schemas.microsoft.com/office/powerpoint/2010/main" xmlns="" val="948628103"/>
       </p:ext>
     </p:extLst>
   </p:cSld>
@@ -2470,7 +2490,7 @@
           <p:cNvPr id="2" name="Titel 1">
             <a:extLst>
               <a:ext uri="{FF2B5EF4-FFF2-40B4-BE49-F238E27FC236}">
-                <a16:creationId xmlns:a16="http://schemas.microsoft.com/office/drawing/2014/main" id="{09153D9E-959E-B1E1-4573-F82979953906}"/>
+                <a16:creationId xmlns:a16="http://schemas.microsoft.com/office/drawing/2014/main" xmlns="" id="{09153D9E-959E-B1E1-4573-F82979953906}"/>
               </a:ext>
             </a:extLst>
           </p:cNvPr>
@@ -2507,7 +2527,7 @@
           <p:cNvPr id="3" name="Bildplatzhalter 2">
             <a:extLst>
               <a:ext uri="{FF2B5EF4-FFF2-40B4-BE49-F238E27FC236}">
-                <a16:creationId xmlns:a16="http://schemas.microsoft.com/office/drawing/2014/main" id="{EE5610E2-475C-F372-A2AE-6FE621E7C6E0}"/>
+                <a16:creationId xmlns:a16="http://schemas.microsoft.com/office/drawing/2014/main" xmlns="" id="{EE5610E2-475C-F372-A2AE-6FE621E7C6E0}"/>
               </a:ext>
             </a:extLst>
           </p:cNvPr>
@@ -2574,7 +2594,7 @@
           <p:cNvPr id="4" name="Textplatzhalter 3">
             <a:extLst>
               <a:ext uri="{FF2B5EF4-FFF2-40B4-BE49-F238E27FC236}">
-                <a16:creationId xmlns:a16="http://schemas.microsoft.com/office/drawing/2014/main" id="{C7255B95-02DF-6C3A-DE78-BA7D3DD17080}"/>
+                <a16:creationId xmlns:a16="http://schemas.microsoft.com/office/drawing/2014/main" xmlns="" id="{C7255B95-02DF-6C3A-DE78-BA7D3DD17080}"/>
               </a:ext>
             </a:extLst>
           </p:cNvPr>
@@ -2645,7 +2665,7 @@
           <p:cNvPr id="5" name="Datumsplatzhalter 4">
             <a:extLst>
               <a:ext uri="{FF2B5EF4-FFF2-40B4-BE49-F238E27FC236}">
-                <a16:creationId xmlns:a16="http://schemas.microsoft.com/office/drawing/2014/main" id="{01609C02-3E6F-3BDF-FCC6-046A33305A91}"/>
+                <a16:creationId xmlns:a16="http://schemas.microsoft.com/office/drawing/2014/main" xmlns="" id="{01609C02-3E6F-3BDF-FCC6-046A33305A91}"/>
               </a:ext>
             </a:extLst>
           </p:cNvPr>
@@ -2663,6 +2683,7 @@
           <a:p>
             <a:fld id="{E5F54BAF-9E58-40B9-ADDC-0022BA13B894}" type="datetimeFigureOut">
               <a:rPr lang="de-DE" smtClean="0"/>
+              <a:pPr/>
               <a:t>08.11.2023</a:t>
             </a:fld>
             <a:endParaRPr lang="de-DE"/>
@@ -2674,7 +2695,7 @@
           <p:cNvPr id="6" name="Fußzeilenplatzhalter 5">
             <a:extLst>
               <a:ext uri="{FF2B5EF4-FFF2-40B4-BE49-F238E27FC236}">
-                <a16:creationId xmlns:a16="http://schemas.microsoft.com/office/drawing/2014/main" id="{835A6352-2F53-7071-2F9B-0F0176A7F7D9}"/>
+                <a16:creationId xmlns:a16="http://schemas.microsoft.com/office/drawing/2014/main" xmlns="" id="{835A6352-2F53-7071-2F9B-0F0176A7F7D9}"/>
               </a:ext>
             </a:extLst>
           </p:cNvPr>
@@ -2699,7 +2720,7 @@
           <p:cNvPr id="7" name="Foliennummernplatzhalter 6">
             <a:extLst>
               <a:ext uri="{FF2B5EF4-FFF2-40B4-BE49-F238E27FC236}">
-                <a16:creationId xmlns:a16="http://schemas.microsoft.com/office/drawing/2014/main" id="{8ACE2366-6CF7-A792-F595-A4FD3A7CF27D}"/>
+                <a16:creationId xmlns:a16="http://schemas.microsoft.com/office/drawing/2014/main" xmlns="" id="{8ACE2366-6CF7-A792-F595-A4FD3A7CF27D}"/>
               </a:ext>
             </a:extLst>
           </p:cNvPr>
@@ -2717,6 +2738,7 @@
           <a:p>
             <a:fld id="{495E8233-3489-41B6-97A2-856DBC1D1605}" type="slidenum">
               <a:rPr lang="de-DE" smtClean="0"/>
+              <a:pPr/>
               <a:t>‹Nr.›</a:t>
             </a:fld>
             <a:endParaRPr lang="de-DE"/>
@@ -2726,7 +2748,7 @@
     </p:spTree>
     <p:extLst>
       <p:ext uri="{BB962C8B-B14F-4D97-AF65-F5344CB8AC3E}">
-        <p14:creationId xmlns:p14="http://schemas.microsoft.com/office/powerpoint/2010/main" val="4117060318"/>
+        <p14:creationId xmlns:p14="http://schemas.microsoft.com/office/powerpoint/2010/main" xmlns="" val="4117060318"/>
       </p:ext>
     </p:extLst>
   </p:cSld>
@@ -2763,7 +2785,7 @@
           <p:cNvPr id="2" name="Titelplatzhalter 1">
             <a:extLst>
               <a:ext uri="{FF2B5EF4-FFF2-40B4-BE49-F238E27FC236}">
-                <a16:creationId xmlns:a16="http://schemas.microsoft.com/office/drawing/2014/main" id="{E1B3D26C-DE74-0E24-FC2C-D4E105EF27B6}"/>
+                <a16:creationId xmlns:a16="http://schemas.microsoft.com/office/drawing/2014/main" xmlns="" id="{E1B3D26C-DE74-0E24-FC2C-D4E105EF27B6}"/>
               </a:ext>
             </a:extLst>
           </p:cNvPr>
@@ -2801,7 +2823,7 @@
           <p:cNvPr id="3" name="Textplatzhalter 2">
             <a:extLst>
               <a:ext uri="{FF2B5EF4-FFF2-40B4-BE49-F238E27FC236}">
-                <a16:creationId xmlns:a16="http://schemas.microsoft.com/office/drawing/2014/main" id="{0A3802B1-A1C2-C9BB-13E8-0EC5B02C63CA}"/>
+                <a16:creationId xmlns:a16="http://schemas.microsoft.com/office/drawing/2014/main" xmlns="" id="{0A3802B1-A1C2-C9BB-13E8-0EC5B02C63CA}"/>
               </a:ext>
             </a:extLst>
           </p:cNvPr>
@@ -2868,7 +2890,7 @@
           <p:cNvPr id="4" name="Datumsplatzhalter 3">
             <a:extLst>
               <a:ext uri="{FF2B5EF4-FFF2-40B4-BE49-F238E27FC236}">
-                <a16:creationId xmlns:a16="http://schemas.microsoft.com/office/drawing/2014/main" id="{ACB25ADD-46F6-07A5-193F-182E5F4163D1}"/>
+                <a16:creationId xmlns:a16="http://schemas.microsoft.com/office/drawing/2014/main" xmlns="" id="{ACB25ADD-46F6-07A5-193F-182E5F4163D1}"/>
               </a:ext>
             </a:extLst>
           </p:cNvPr>
@@ -2904,6 +2926,7 @@
           <a:p>
             <a:fld id="{E5F54BAF-9E58-40B9-ADDC-0022BA13B894}" type="datetimeFigureOut">
               <a:rPr lang="de-DE" smtClean="0"/>
+              <a:pPr/>
               <a:t>08.11.2023</a:t>
             </a:fld>
             <a:endParaRPr lang="de-DE"/>
@@ -2915,7 +2938,7 @@
           <p:cNvPr id="5" name="Fußzeilenplatzhalter 4">
             <a:extLst>
               <a:ext uri="{FF2B5EF4-FFF2-40B4-BE49-F238E27FC236}">
-                <a16:creationId xmlns:a16="http://schemas.microsoft.com/office/drawing/2014/main" id="{2E658413-CE80-D33D-9692-98BD42D2902C}"/>
+                <a16:creationId xmlns:a16="http://schemas.microsoft.com/office/drawing/2014/main" xmlns="" id="{2E658413-CE80-D33D-9692-98BD42D2902C}"/>
               </a:ext>
             </a:extLst>
           </p:cNvPr>
@@ -2958,7 +2981,7 @@
           <p:cNvPr id="6" name="Foliennummernplatzhalter 5">
             <a:extLst>
               <a:ext uri="{FF2B5EF4-FFF2-40B4-BE49-F238E27FC236}">
-                <a16:creationId xmlns:a16="http://schemas.microsoft.com/office/drawing/2014/main" id="{AA0A50A9-0FE8-FF11-41EA-FD973CDF8EC9}"/>
+                <a16:creationId xmlns:a16="http://schemas.microsoft.com/office/drawing/2014/main" xmlns="" id="{AA0A50A9-0FE8-FF11-41EA-FD973CDF8EC9}"/>
               </a:ext>
             </a:extLst>
           </p:cNvPr>
@@ -2994,6 +3017,7 @@
           <a:p>
             <a:fld id="{495E8233-3489-41B6-97A2-856DBC1D1605}" type="slidenum">
               <a:rPr lang="de-DE" smtClean="0"/>
+              <a:pPr/>
               <a:t>‹Nr.›</a:t>
             </a:fld>
             <a:endParaRPr lang="de-DE"/>
@@ -3003,7 +3027,7 @@
     </p:spTree>
     <p:extLst>
       <p:ext uri="{BB962C8B-B14F-4D97-AF65-F5344CB8AC3E}">
-        <p14:creationId xmlns:p14="http://schemas.microsoft.com/office/powerpoint/2010/main" val="3884394943"/>
+        <p14:creationId xmlns:p14="http://schemas.microsoft.com/office/powerpoint/2010/main" xmlns="" val="3884394943"/>
       </p:ext>
     </p:extLst>
   </p:cSld>
@@ -3326,7 +3350,7 @@
           <p:cNvPr id="61" name="Gruppieren 60">
             <a:extLst>
               <a:ext uri="{FF2B5EF4-FFF2-40B4-BE49-F238E27FC236}">
-                <a16:creationId xmlns:a16="http://schemas.microsoft.com/office/drawing/2014/main" id="{4BE5F4D0-B999-05C4-C855-8A160C9229BD}"/>
+                <a16:creationId xmlns:a16="http://schemas.microsoft.com/office/drawing/2014/main" xmlns="" id="{4BE5F4D0-B999-05C4-C855-8A160C9229BD}"/>
               </a:ext>
             </a:extLst>
           </p:cNvPr>
@@ -3346,7 +3370,7 @@
             <p:cNvPr id="5" name="Grafik 4" descr="Volumen mit einfarbiger Füllung">
               <a:extLst>
                 <a:ext uri="{FF2B5EF4-FFF2-40B4-BE49-F238E27FC236}">
-                  <a16:creationId xmlns:a16="http://schemas.microsoft.com/office/drawing/2014/main" id="{551B0F16-016C-A6FF-B3B9-643A3D042A4F}"/>
+                  <a16:creationId xmlns:a16="http://schemas.microsoft.com/office/drawing/2014/main" xmlns="" id="{551B0F16-016C-A6FF-B3B9-643A3D042A4F}"/>
                 </a:ext>
               </a:extLst>
             </p:cNvPr>
@@ -3356,13 +3380,13 @@
             <p:nvPr/>
           </p:nvPicPr>
           <p:blipFill>
-            <a:blip r:embed="rId2">
+            <a:blip r:embed="rId2" cstate="print">
               <a:extLst>
                 <a:ext uri="{28A0092B-C50C-407E-A947-70E740481C1C}">
-                  <a14:useLocalDpi xmlns:a14="http://schemas.microsoft.com/office/drawing/2010/main" val="0"/>
+                  <a14:useLocalDpi xmlns:a14="http://schemas.microsoft.com/office/drawing/2010/main" xmlns="" val="0"/>
                 </a:ext>
                 <a:ext uri="{96DAC541-7B7A-43D3-8B79-37D633B846F1}">
-                  <asvg:svgBlip xmlns:asvg="http://schemas.microsoft.com/office/drawing/2016/SVG/main" r:embed="rId3"/>
+                  <asvg:svgBlip xmlns:asvg="http://schemas.microsoft.com/office/drawing/2016/SVG/main" xmlns="" r:embed="rId3"/>
                 </a:ext>
               </a:extLst>
             </a:blip>
@@ -3385,7 +3409,7 @@
             <p:cNvPr id="7" name="Grafik 6" descr="Radiomikrofon mit einfarbiger Füllung">
               <a:extLst>
                 <a:ext uri="{FF2B5EF4-FFF2-40B4-BE49-F238E27FC236}">
-                  <a16:creationId xmlns:a16="http://schemas.microsoft.com/office/drawing/2014/main" id="{3760C04C-D5D1-9F92-15FD-03CA88CCC834}"/>
+                  <a16:creationId xmlns:a16="http://schemas.microsoft.com/office/drawing/2014/main" xmlns="" id="{3760C04C-D5D1-9F92-15FD-03CA88CCC834}"/>
                 </a:ext>
               </a:extLst>
             </p:cNvPr>
@@ -3395,13 +3419,13 @@
             <p:nvPr/>
           </p:nvPicPr>
           <p:blipFill>
-            <a:blip r:embed="rId4">
+            <a:blip r:embed="rId4" cstate="print">
               <a:extLst>
                 <a:ext uri="{28A0092B-C50C-407E-A947-70E740481C1C}">
-                  <a14:useLocalDpi xmlns:a14="http://schemas.microsoft.com/office/drawing/2010/main" val="0"/>
+                  <a14:useLocalDpi xmlns:a14="http://schemas.microsoft.com/office/drawing/2010/main" xmlns="" val="0"/>
                 </a:ext>
                 <a:ext uri="{96DAC541-7B7A-43D3-8B79-37D633B846F1}">
-                  <asvg:svgBlip xmlns:asvg="http://schemas.microsoft.com/office/drawing/2016/SVG/main" r:embed="rId5"/>
+                  <asvg:svgBlip xmlns:asvg="http://schemas.microsoft.com/office/drawing/2016/SVG/main" xmlns="" r:embed="rId5"/>
                 </a:ext>
               </a:extLst>
             </a:blip>
@@ -3424,7 +3448,7 @@
             <p:cNvPr id="9" name="Gerade Verbindung mit Pfeil 8">
               <a:extLst>
                 <a:ext uri="{FF2B5EF4-FFF2-40B4-BE49-F238E27FC236}">
-                  <a16:creationId xmlns:a16="http://schemas.microsoft.com/office/drawing/2014/main" id="{0D7BC79C-1BA1-D72E-D380-AA37EE738E4F}"/>
+                  <a16:creationId xmlns:a16="http://schemas.microsoft.com/office/drawing/2014/main" xmlns="" id="{0D7BC79C-1BA1-D72E-D380-AA37EE738E4F}"/>
                 </a:ext>
               </a:extLst>
             </p:cNvPr>
@@ -3469,7 +3493,7 @@
             <p:cNvPr id="10" name="Rechteck 9">
               <a:extLst>
                 <a:ext uri="{FF2B5EF4-FFF2-40B4-BE49-F238E27FC236}">
-                  <a16:creationId xmlns:a16="http://schemas.microsoft.com/office/drawing/2014/main" id="{77890C79-70F7-8F58-D3A8-1ADB7BF8669C}"/>
+                  <a16:creationId xmlns:a16="http://schemas.microsoft.com/office/drawing/2014/main" xmlns="" id="{77890C79-70F7-8F58-D3A8-1ADB7BF8669C}"/>
                 </a:ext>
               </a:extLst>
             </p:cNvPr>
@@ -3549,7 +3573,7 @@
             <p:cNvPr id="12" name="Gerade Verbindung mit Pfeil 11">
               <a:extLst>
                 <a:ext uri="{FF2B5EF4-FFF2-40B4-BE49-F238E27FC236}">
-                  <a16:creationId xmlns:a16="http://schemas.microsoft.com/office/drawing/2014/main" id="{E709824F-BE4A-ABAE-EE91-F2F330E9405C}"/>
+                  <a16:creationId xmlns:a16="http://schemas.microsoft.com/office/drawing/2014/main" xmlns="" id="{E709824F-BE4A-ABAE-EE91-F2F330E9405C}"/>
                 </a:ext>
               </a:extLst>
             </p:cNvPr>
@@ -3594,7 +3618,7 @@
             <p:cNvPr id="15" name="Ellipse 14">
               <a:extLst>
                 <a:ext uri="{FF2B5EF4-FFF2-40B4-BE49-F238E27FC236}">
-                  <a16:creationId xmlns:a16="http://schemas.microsoft.com/office/drawing/2014/main" id="{C0B3AFA4-6A8A-F078-FE1E-4181BEED91C4}"/>
+                  <a16:creationId xmlns:a16="http://schemas.microsoft.com/office/drawing/2014/main" xmlns="" id="{C0B3AFA4-6A8A-F078-FE1E-4181BEED91C4}"/>
                 </a:ext>
               </a:extLst>
             </p:cNvPr>
@@ -3648,7 +3672,7 @@
             <p:cNvPr id="16" name="Gerade Verbindung mit Pfeil 15">
               <a:extLst>
                 <a:ext uri="{FF2B5EF4-FFF2-40B4-BE49-F238E27FC236}">
-                  <a16:creationId xmlns:a16="http://schemas.microsoft.com/office/drawing/2014/main" id="{3098C320-B0E0-80D3-C891-D883758C1726}"/>
+                  <a16:creationId xmlns:a16="http://schemas.microsoft.com/office/drawing/2014/main" xmlns="" id="{3098C320-B0E0-80D3-C891-D883758C1726}"/>
                 </a:ext>
               </a:extLst>
             </p:cNvPr>
@@ -3692,7 +3716,7 @@
             <p:cNvPr id="19" name="Gerade Verbindung mit Pfeil 18">
               <a:extLst>
                 <a:ext uri="{FF2B5EF4-FFF2-40B4-BE49-F238E27FC236}">
-                  <a16:creationId xmlns:a16="http://schemas.microsoft.com/office/drawing/2014/main" id="{6F376301-2D84-692E-E6ED-80D38D5B423C}"/>
+                  <a16:creationId xmlns:a16="http://schemas.microsoft.com/office/drawing/2014/main" xmlns="" id="{6F376301-2D84-692E-E6ED-80D38D5B423C}"/>
                 </a:ext>
               </a:extLst>
             </p:cNvPr>
@@ -3738,7 +3762,7 @@
             <p:cNvPr id="22" name="Gerade Verbindung mit Pfeil 21">
               <a:extLst>
                 <a:ext uri="{FF2B5EF4-FFF2-40B4-BE49-F238E27FC236}">
-                  <a16:creationId xmlns:a16="http://schemas.microsoft.com/office/drawing/2014/main" id="{FF6C6623-CBA4-2B1D-E073-ED2F57422FBC}"/>
+                  <a16:creationId xmlns:a16="http://schemas.microsoft.com/office/drawing/2014/main" xmlns="" id="{FF6C6623-CBA4-2B1D-E073-ED2F57422FBC}"/>
                 </a:ext>
               </a:extLst>
             </p:cNvPr>
@@ -3783,7 +3807,7 @@
             <p:cNvPr id="31" name="Verbinder: gewinkelt 30">
               <a:extLst>
                 <a:ext uri="{FF2B5EF4-FFF2-40B4-BE49-F238E27FC236}">
-                  <a16:creationId xmlns:a16="http://schemas.microsoft.com/office/drawing/2014/main" id="{9B42DC58-6201-57DB-639F-6E6AE3C5CA4B}"/>
+                  <a16:creationId xmlns:a16="http://schemas.microsoft.com/office/drawing/2014/main" xmlns="" id="{9B42DC58-6201-57DB-639F-6E6AE3C5CA4B}"/>
                 </a:ext>
               </a:extLst>
             </p:cNvPr>
@@ -3828,7 +3852,7 @@
             <p:cNvPr id="44" name="Bogen 43">
               <a:extLst>
                 <a:ext uri="{FF2B5EF4-FFF2-40B4-BE49-F238E27FC236}">
-                  <a16:creationId xmlns:a16="http://schemas.microsoft.com/office/drawing/2014/main" id="{4CCAAFA4-404E-702C-EFEE-E703A545C8C8}"/>
+                  <a16:creationId xmlns:a16="http://schemas.microsoft.com/office/drawing/2014/main" xmlns="" id="{4CCAAFA4-404E-702C-EFEE-E703A545C8C8}"/>
                 </a:ext>
               </a:extLst>
             </p:cNvPr>
@@ -3883,7 +3907,7 @@
             <p:cNvPr id="53" name="Textfeld 52">
               <a:extLst>
                 <a:ext uri="{FF2B5EF4-FFF2-40B4-BE49-F238E27FC236}">
-                  <a16:creationId xmlns:a16="http://schemas.microsoft.com/office/drawing/2014/main" id="{690370DA-8D63-48AC-0EE1-04E73F5450D7}"/>
+                  <a16:creationId xmlns:a16="http://schemas.microsoft.com/office/drawing/2014/main" xmlns="" id="{690370DA-8D63-48AC-0EE1-04E73F5450D7}"/>
                 </a:ext>
               </a:extLst>
             </p:cNvPr>
@@ -3892,7 +3916,7 @@
           </p:nvSpPr>
           <p:spPr>
             <a:xfrm>
-              <a:off x="5250341" y="3985336"/>
+              <a:off x="5242028" y="3968710"/>
               <a:ext cx="261610" cy="276999"/>
             </a:xfrm>
             <a:prstGeom prst="rect">
@@ -3914,7 +3938,7 @@
           </p:txBody>
         </p:sp>
         <mc:AlternateContent xmlns:mc="http://schemas.openxmlformats.org/markup-compatibility/2006">
-          <mc:Choice xmlns:a14="http://schemas.microsoft.com/office/drawing/2010/main" Requires="a14">
+          <mc:Choice xmlns:a14="http://schemas.microsoft.com/office/drawing/2010/main" xmlns="" Requires="a14">
             <p:sp>
               <p:nvSpPr>
                 <p:cNvPr id="56" name="Textfeld 55">
@@ -4006,7 +4030,7 @@
                 <p:cNvPr id="56" name="Textfeld 55">
                   <a:extLst>
                     <a:ext uri="{FF2B5EF4-FFF2-40B4-BE49-F238E27FC236}">
-                      <a16:creationId xmlns:a16="http://schemas.microsoft.com/office/drawing/2014/main" id="{ED3C6559-470E-A303-2C96-9DBE3456190D}"/>
+                      <a16:creationId xmlns:a16="http://schemas.microsoft.com/office/drawing/2014/main" xmlns="" id="{ED3C6559-470E-A303-2C96-9DBE3456190D}"/>
                     </a:ext>
                   </a:extLst>
                 </p:cNvPr>
@@ -4024,7 +4048,7 @@
                   <a:avLst/>
                 </a:prstGeom>
                 <a:blipFill>
-                  <a:blip r:embed="rId6"/>
+                  <a:blip r:embed="rId6" cstate="print"/>
                   <a:stretch>
                     <a:fillRect l="-1961" t="-26667" r="-56863" b="-13333"/>
                   </a:stretch>
@@ -4046,7 +4070,7 @@
           </mc:Fallback>
         </mc:AlternateContent>
         <mc:AlternateContent xmlns:mc="http://schemas.openxmlformats.org/markup-compatibility/2006">
-          <mc:Choice xmlns:a14="http://schemas.microsoft.com/office/drawing/2010/main" Requires="a14">
+          <mc:Choice xmlns:a14="http://schemas.microsoft.com/office/drawing/2010/main" xmlns="" Requires="a14">
             <p:sp>
               <p:nvSpPr>
                 <p:cNvPr id="57" name="Textfeld 56">
@@ -4120,7 +4144,7 @@
                 <p:cNvPr id="57" name="Textfeld 56">
                   <a:extLst>
                     <a:ext uri="{FF2B5EF4-FFF2-40B4-BE49-F238E27FC236}">
-                      <a16:creationId xmlns:a16="http://schemas.microsoft.com/office/drawing/2014/main" id="{3685EC7A-4101-B11D-473B-7B0FFEC10B17}"/>
+                      <a16:creationId xmlns:a16="http://schemas.microsoft.com/office/drawing/2014/main" xmlns="" id="{3685EC7A-4101-B11D-473B-7B0FFEC10B17}"/>
                     </a:ext>
                   </a:extLst>
                 </p:cNvPr>
@@ -4138,7 +4162,7 @@
                   <a:avLst/>
                 </a:prstGeom>
                 <a:blipFill>
-                  <a:blip r:embed="rId7"/>
+                  <a:blip r:embed="rId7" cstate="print"/>
                   <a:stretch>
                     <a:fillRect l="-9375" r="-6250" b="-13333"/>
                   </a:stretch>
@@ -4160,7 +4184,7 @@
           </mc:Fallback>
         </mc:AlternateContent>
         <mc:AlternateContent xmlns:mc="http://schemas.openxmlformats.org/markup-compatibility/2006">
-          <mc:Choice xmlns:a14="http://schemas.microsoft.com/office/drawing/2010/main" Requires="a14">
+          <mc:Choice xmlns:a14="http://schemas.microsoft.com/office/drawing/2010/main" xmlns="" Requires="a14">
             <p:sp>
               <p:nvSpPr>
                 <p:cNvPr id="59" name="Textfeld 58">
@@ -4234,7 +4258,7 @@
                 <p:cNvPr id="59" name="Textfeld 58">
                   <a:extLst>
                     <a:ext uri="{FF2B5EF4-FFF2-40B4-BE49-F238E27FC236}">
-                      <a16:creationId xmlns:a16="http://schemas.microsoft.com/office/drawing/2014/main" id="{F0D44A5D-1901-B142-DBD5-E93061F7E58B}"/>
+                      <a16:creationId xmlns:a16="http://schemas.microsoft.com/office/drawing/2014/main" xmlns="" id="{F0D44A5D-1901-B142-DBD5-E93061F7E58B}"/>
                     </a:ext>
                   </a:extLst>
                 </p:cNvPr>
@@ -4252,7 +4276,7 @@
                   <a:avLst/>
                 </a:prstGeom>
                 <a:blipFill>
-                  <a:blip r:embed="rId8"/>
+                  <a:blip r:embed="rId8" cstate="print"/>
                   <a:stretch>
                     <a:fillRect l="-10000" r="-3333" b="-13333"/>
                   </a:stretch>
@@ -4274,7 +4298,7 @@
           </mc:Fallback>
         </mc:AlternateContent>
         <mc:AlternateContent xmlns:mc="http://schemas.openxmlformats.org/markup-compatibility/2006">
-          <mc:Choice xmlns:a14="http://schemas.microsoft.com/office/drawing/2010/main" Requires="a14">
+          <mc:Choice xmlns:a14="http://schemas.microsoft.com/office/drawing/2010/main" xmlns="" Requires="a14">
             <p:sp>
               <p:nvSpPr>
                 <p:cNvPr id="60" name="Textfeld 59">
@@ -4348,7 +4372,7 @@
                 <p:cNvPr id="60" name="Textfeld 59">
                   <a:extLst>
                     <a:ext uri="{FF2B5EF4-FFF2-40B4-BE49-F238E27FC236}">
-                      <a16:creationId xmlns:a16="http://schemas.microsoft.com/office/drawing/2014/main" id="{7BB94F52-DD2B-21A0-1D84-743439CB0CE1}"/>
+                      <a16:creationId xmlns:a16="http://schemas.microsoft.com/office/drawing/2014/main" xmlns="" id="{7BB94F52-DD2B-21A0-1D84-743439CB0CE1}"/>
                     </a:ext>
                   </a:extLst>
                 </p:cNvPr>
@@ -4366,7 +4390,7 @@
                   <a:avLst/>
                 </a:prstGeom>
                 <a:blipFill>
-                  <a:blip r:embed="rId9"/>
+                  <a:blip r:embed="rId9" cstate="print"/>
                   <a:stretch>
                     <a:fillRect l="-21212" r="-3030" b="-13333"/>
                   </a:stretch>
@@ -4391,7 +4415,7 @@
     </p:spTree>
     <p:extLst>
       <p:ext uri="{BB962C8B-B14F-4D97-AF65-F5344CB8AC3E}">
-        <p14:creationId xmlns:p14="http://schemas.microsoft.com/office/powerpoint/2010/main" val="3910585026"/>
+        <p14:creationId xmlns:p14="http://schemas.microsoft.com/office/powerpoint/2010/main" xmlns="" val="3910585026"/>
       </p:ext>
     </p:extLst>
   </p:cSld>
@@ -4444,7 +4468,7 @@
     </a:clrScheme>
     <a:fontScheme name="Office">
       <a:majorFont>
-        <a:latin typeface="Calibri Light" panose="020F0302020204030204"/>
+        <a:latin typeface="Calibri Light"/>
         <a:ea typeface=""/>
         <a:cs typeface=""/>
         <a:font script="Jpan" typeface="游ゴシック Light"/>
@@ -4496,7 +4520,7 @@
         <a:font script="Tfng" typeface="Ebrima"/>
       </a:majorFont>
       <a:minorFont>
-        <a:latin typeface="Calibri" panose="020F0502020204030204"/>
+        <a:latin typeface="Calibri"/>
         <a:ea typeface=""/>
         <a:cs typeface=""/>
         <a:font script="Jpan" typeface="游ゴシック"/>
@@ -4690,7 +4714,7 @@
   <a:extraClrSchemeLst/>
   <a:extLst>
     <a:ext uri="{05A4C25C-085E-4340-85A3-A5531E510DB2}">
-      <thm15:themeFamily xmlns:thm15="http://schemas.microsoft.com/office/thememl/2012/main" name="Office Theme" id="{62F939B6-93AF-4DB8-9C6B-D6C7DFDC589F}" vid="{4A3C46E8-61CC-4603-A589-7422A47A8E4A}"/>
+      <thm15:themeFamily xmlns:thm15="http://schemas.microsoft.com/office/thememl/2012/main" xmlns="" name="Office Theme" id="{62F939B6-93AF-4DB8-9C6B-D6C7DFDC589F}" vid="{4A3C46E8-61CC-4603-A589-7422A47A8E4A}"/>
     </a:ext>
   </a:extLst>
 </a:theme>

</xml_diff>

<commit_message>
Delay introduced. Images updated
</commit_message>
<xml_diff>
--- a/Images/Echo_Noise_Cancellation.pptx
+++ b/Images/Echo_Noise_Cancellation.pptx
@@ -6,6 +6,7 @@
   </p:sldMasterIdLst>
   <p:sldIdLst>
     <p:sldId id="256" r:id="rId2"/>
+    <p:sldId id="257" r:id="rId3"/>
   </p:sldIdLst>
   <p:sldSz cx="12192000" cy="6858000"/>
   <p:notesSz cx="6858000" cy="9144000"/>
@@ -129,7 +130,7 @@
           <p:cNvPr id="2" name="Titel 1">
             <a:extLst>
               <a:ext uri="{FF2B5EF4-FFF2-40B4-BE49-F238E27FC236}">
-                <a16:creationId xmlns:a16="http://schemas.microsoft.com/office/drawing/2014/main" xmlns="" id="{2B506413-A10A-DCE7-BDB2-72B776CDBF9E}"/>
+                <a16:creationId xmlns="" xmlns:a16="http://schemas.microsoft.com/office/drawing/2014/main" id="{2B506413-A10A-DCE7-BDB2-72B776CDBF9E}"/>
               </a:ext>
             </a:extLst>
           </p:cNvPr>
@@ -166,7 +167,7 @@
           <p:cNvPr id="3" name="Untertitel 2">
             <a:extLst>
               <a:ext uri="{FF2B5EF4-FFF2-40B4-BE49-F238E27FC236}">
-                <a16:creationId xmlns:a16="http://schemas.microsoft.com/office/drawing/2014/main" xmlns="" id="{E3C52979-2251-B899-EF30-2A19438575D8}"/>
+                <a16:creationId xmlns="" xmlns:a16="http://schemas.microsoft.com/office/drawing/2014/main" id="{E3C52979-2251-B899-EF30-2A19438575D8}"/>
               </a:ext>
             </a:extLst>
           </p:cNvPr>
@@ -236,7 +237,7 @@
           <p:cNvPr id="4" name="Datumsplatzhalter 3">
             <a:extLst>
               <a:ext uri="{FF2B5EF4-FFF2-40B4-BE49-F238E27FC236}">
-                <a16:creationId xmlns:a16="http://schemas.microsoft.com/office/drawing/2014/main" xmlns="" id="{4659B1BE-F6BC-9E84-C540-ECF05CC37ABE}"/>
+                <a16:creationId xmlns="" xmlns:a16="http://schemas.microsoft.com/office/drawing/2014/main" id="{4659B1BE-F6BC-9E84-C540-ECF05CC37ABE}"/>
               </a:ext>
             </a:extLst>
           </p:cNvPr>
@@ -255,7 +256,7 @@
             <a:fld id="{E5F54BAF-9E58-40B9-ADDC-0022BA13B894}" type="datetimeFigureOut">
               <a:rPr lang="de-DE" smtClean="0"/>
               <a:pPr/>
-              <a:t>08.11.2023</a:t>
+              <a:t>12.11.2023</a:t>
             </a:fld>
             <a:endParaRPr lang="de-DE"/>
           </a:p>
@@ -266,7 +267,7 @@
           <p:cNvPr id="5" name="Fußzeilenplatzhalter 4">
             <a:extLst>
               <a:ext uri="{FF2B5EF4-FFF2-40B4-BE49-F238E27FC236}">
-                <a16:creationId xmlns:a16="http://schemas.microsoft.com/office/drawing/2014/main" xmlns="" id="{F00A5C17-5C97-6BFA-FA25-D601AD8C26E7}"/>
+                <a16:creationId xmlns="" xmlns:a16="http://schemas.microsoft.com/office/drawing/2014/main" id="{F00A5C17-5C97-6BFA-FA25-D601AD8C26E7}"/>
               </a:ext>
             </a:extLst>
           </p:cNvPr>
@@ -291,7 +292,7 @@
           <p:cNvPr id="6" name="Foliennummernplatzhalter 5">
             <a:extLst>
               <a:ext uri="{FF2B5EF4-FFF2-40B4-BE49-F238E27FC236}">
-                <a16:creationId xmlns:a16="http://schemas.microsoft.com/office/drawing/2014/main" xmlns="" id="{A6792619-4C74-9FA2-C330-0BA28679E865}"/>
+                <a16:creationId xmlns="" xmlns:a16="http://schemas.microsoft.com/office/drawing/2014/main" id="{A6792619-4C74-9FA2-C330-0BA28679E865}"/>
               </a:ext>
             </a:extLst>
           </p:cNvPr>
@@ -319,7 +320,7 @@
     </p:spTree>
     <p:extLst>
       <p:ext uri="{BB962C8B-B14F-4D97-AF65-F5344CB8AC3E}">
-        <p14:creationId xmlns:p14="http://schemas.microsoft.com/office/powerpoint/2010/main" xmlns="" val="2757137543"/>
+        <p14:creationId xmlns="" xmlns:p14="http://schemas.microsoft.com/office/powerpoint/2010/main" val="2757137543"/>
       </p:ext>
     </p:extLst>
   </p:cSld>
@@ -351,7 +352,7 @@
           <p:cNvPr id="2" name="Titel 1">
             <a:extLst>
               <a:ext uri="{FF2B5EF4-FFF2-40B4-BE49-F238E27FC236}">
-                <a16:creationId xmlns:a16="http://schemas.microsoft.com/office/drawing/2014/main" xmlns="" id="{6FD33A35-6585-63F4-7744-6EC57C2D5B20}"/>
+                <a16:creationId xmlns="" xmlns:a16="http://schemas.microsoft.com/office/drawing/2014/main" id="{6FD33A35-6585-63F4-7744-6EC57C2D5B20}"/>
               </a:ext>
             </a:extLst>
           </p:cNvPr>
@@ -379,7 +380,7 @@
           <p:cNvPr id="3" name="Vertikaler Textplatzhalter 2">
             <a:extLst>
               <a:ext uri="{FF2B5EF4-FFF2-40B4-BE49-F238E27FC236}">
-                <a16:creationId xmlns:a16="http://schemas.microsoft.com/office/drawing/2014/main" xmlns="" id="{0819AAC6-7176-AE02-C1EE-7BAFE066FDC2}"/>
+                <a16:creationId xmlns="" xmlns:a16="http://schemas.microsoft.com/office/drawing/2014/main" id="{0819AAC6-7176-AE02-C1EE-7BAFE066FDC2}"/>
               </a:ext>
             </a:extLst>
           </p:cNvPr>
@@ -436,7 +437,7 @@
           <p:cNvPr id="4" name="Datumsplatzhalter 3">
             <a:extLst>
               <a:ext uri="{FF2B5EF4-FFF2-40B4-BE49-F238E27FC236}">
-                <a16:creationId xmlns:a16="http://schemas.microsoft.com/office/drawing/2014/main" xmlns="" id="{CBFBF88C-2E06-6739-B558-4D1F225D6BE0}"/>
+                <a16:creationId xmlns="" xmlns:a16="http://schemas.microsoft.com/office/drawing/2014/main" id="{CBFBF88C-2E06-6739-B558-4D1F225D6BE0}"/>
               </a:ext>
             </a:extLst>
           </p:cNvPr>
@@ -455,7 +456,7 @@
             <a:fld id="{E5F54BAF-9E58-40B9-ADDC-0022BA13B894}" type="datetimeFigureOut">
               <a:rPr lang="de-DE" smtClean="0"/>
               <a:pPr/>
-              <a:t>08.11.2023</a:t>
+              <a:t>12.11.2023</a:t>
             </a:fld>
             <a:endParaRPr lang="de-DE"/>
           </a:p>
@@ -466,7 +467,7 @@
           <p:cNvPr id="5" name="Fußzeilenplatzhalter 4">
             <a:extLst>
               <a:ext uri="{FF2B5EF4-FFF2-40B4-BE49-F238E27FC236}">
-                <a16:creationId xmlns:a16="http://schemas.microsoft.com/office/drawing/2014/main" xmlns="" id="{ED6A594A-C831-7E42-55A4-AA31FA5B5383}"/>
+                <a16:creationId xmlns="" xmlns:a16="http://schemas.microsoft.com/office/drawing/2014/main" id="{ED6A594A-C831-7E42-55A4-AA31FA5B5383}"/>
               </a:ext>
             </a:extLst>
           </p:cNvPr>
@@ -491,7 +492,7 @@
           <p:cNvPr id="6" name="Foliennummernplatzhalter 5">
             <a:extLst>
               <a:ext uri="{FF2B5EF4-FFF2-40B4-BE49-F238E27FC236}">
-                <a16:creationId xmlns:a16="http://schemas.microsoft.com/office/drawing/2014/main" xmlns="" id="{EE8816EF-A6DB-04B6-071C-3BD5572AA18C}"/>
+                <a16:creationId xmlns="" xmlns:a16="http://schemas.microsoft.com/office/drawing/2014/main" id="{EE8816EF-A6DB-04B6-071C-3BD5572AA18C}"/>
               </a:ext>
             </a:extLst>
           </p:cNvPr>
@@ -519,7 +520,7 @@
     </p:spTree>
     <p:extLst>
       <p:ext uri="{BB962C8B-B14F-4D97-AF65-F5344CB8AC3E}">
-        <p14:creationId xmlns:p14="http://schemas.microsoft.com/office/powerpoint/2010/main" xmlns="" val="727986866"/>
+        <p14:creationId xmlns="" xmlns:p14="http://schemas.microsoft.com/office/powerpoint/2010/main" val="727986866"/>
       </p:ext>
     </p:extLst>
   </p:cSld>
@@ -551,7 +552,7 @@
           <p:cNvPr id="2" name="Vertikaler Titel 1">
             <a:extLst>
               <a:ext uri="{FF2B5EF4-FFF2-40B4-BE49-F238E27FC236}">
-                <a16:creationId xmlns:a16="http://schemas.microsoft.com/office/drawing/2014/main" xmlns="" id="{94BAAACE-3B96-9A30-A13F-9EDEE7195661}"/>
+                <a16:creationId xmlns="" xmlns:a16="http://schemas.microsoft.com/office/drawing/2014/main" id="{94BAAACE-3B96-9A30-A13F-9EDEE7195661}"/>
               </a:ext>
             </a:extLst>
           </p:cNvPr>
@@ -584,7 +585,7 @@
           <p:cNvPr id="3" name="Vertikaler Textplatzhalter 2">
             <a:extLst>
               <a:ext uri="{FF2B5EF4-FFF2-40B4-BE49-F238E27FC236}">
-                <a16:creationId xmlns:a16="http://schemas.microsoft.com/office/drawing/2014/main" xmlns="" id="{FF8DDDC7-B222-C412-E11A-3354B007D707}"/>
+                <a16:creationId xmlns="" xmlns:a16="http://schemas.microsoft.com/office/drawing/2014/main" id="{FF8DDDC7-B222-C412-E11A-3354B007D707}"/>
               </a:ext>
             </a:extLst>
           </p:cNvPr>
@@ -646,7 +647,7 @@
           <p:cNvPr id="4" name="Datumsplatzhalter 3">
             <a:extLst>
               <a:ext uri="{FF2B5EF4-FFF2-40B4-BE49-F238E27FC236}">
-                <a16:creationId xmlns:a16="http://schemas.microsoft.com/office/drawing/2014/main" xmlns="" id="{FD727CDA-4CE2-E47C-28CE-B2E472C5749F}"/>
+                <a16:creationId xmlns="" xmlns:a16="http://schemas.microsoft.com/office/drawing/2014/main" id="{FD727CDA-4CE2-E47C-28CE-B2E472C5749F}"/>
               </a:ext>
             </a:extLst>
           </p:cNvPr>
@@ -665,7 +666,7 @@
             <a:fld id="{E5F54BAF-9E58-40B9-ADDC-0022BA13B894}" type="datetimeFigureOut">
               <a:rPr lang="de-DE" smtClean="0"/>
               <a:pPr/>
-              <a:t>08.11.2023</a:t>
+              <a:t>12.11.2023</a:t>
             </a:fld>
             <a:endParaRPr lang="de-DE"/>
           </a:p>
@@ -676,7 +677,7 @@
           <p:cNvPr id="5" name="Fußzeilenplatzhalter 4">
             <a:extLst>
               <a:ext uri="{FF2B5EF4-FFF2-40B4-BE49-F238E27FC236}">
-                <a16:creationId xmlns:a16="http://schemas.microsoft.com/office/drawing/2014/main" xmlns="" id="{2C8C4806-A129-0DFC-820C-E0C7BF462C4B}"/>
+                <a16:creationId xmlns="" xmlns:a16="http://schemas.microsoft.com/office/drawing/2014/main" id="{2C8C4806-A129-0DFC-820C-E0C7BF462C4B}"/>
               </a:ext>
             </a:extLst>
           </p:cNvPr>
@@ -701,7 +702,7 @@
           <p:cNvPr id="6" name="Foliennummernplatzhalter 5">
             <a:extLst>
               <a:ext uri="{FF2B5EF4-FFF2-40B4-BE49-F238E27FC236}">
-                <a16:creationId xmlns:a16="http://schemas.microsoft.com/office/drawing/2014/main" xmlns="" id="{FFF6B6F1-83C8-CC25-8870-3AC6FC708C0B}"/>
+                <a16:creationId xmlns="" xmlns:a16="http://schemas.microsoft.com/office/drawing/2014/main" id="{FFF6B6F1-83C8-CC25-8870-3AC6FC708C0B}"/>
               </a:ext>
             </a:extLst>
           </p:cNvPr>
@@ -729,7 +730,7 @@
     </p:spTree>
     <p:extLst>
       <p:ext uri="{BB962C8B-B14F-4D97-AF65-F5344CB8AC3E}">
-        <p14:creationId xmlns:p14="http://schemas.microsoft.com/office/powerpoint/2010/main" xmlns="" val="907489754"/>
+        <p14:creationId xmlns="" xmlns:p14="http://schemas.microsoft.com/office/powerpoint/2010/main" val="907489754"/>
       </p:ext>
     </p:extLst>
   </p:cSld>
@@ -761,7 +762,7 @@
           <p:cNvPr id="2" name="Titel 1">
             <a:extLst>
               <a:ext uri="{FF2B5EF4-FFF2-40B4-BE49-F238E27FC236}">
-                <a16:creationId xmlns:a16="http://schemas.microsoft.com/office/drawing/2014/main" xmlns="" id="{686FBC05-951B-0E27-C994-A191CC85D9C3}"/>
+                <a16:creationId xmlns="" xmlns:a16="http://schemas.microsoft.com/office/drawing/2014/main" id="{686FBC05-951B-0E27-C994-A191CC85D9C3}"/>
               </a:ext>
             </a:extLst>
           </p:cNvPr>
@@ -789,7 +790,7 @@
           <p:cNvPr id="3" name="Inhaltsplatzhalter 2">
             <a:extLst>
               <a:ext uri="{FF2B5EF4-FFF2-40B4-BE49-F238E27FC236}">
-                <a16:creationId xmlns:a16="http://schemas.microsoft.com/office/drawing/2014/main" xmlns="" id="{8BC6EC5C-D251-7265-0932-90E22A239694}"/>
+                <a16:creationId xmlns="" xmlns:a16="http://schemas.microsoft.com/office/drawing/2014/main" id="{8BC6EC5C-D251-7265-0932-90E22A239694}"/>
               </a:ext>
             </a:extLst>
           </p:cNvPr>
@@ -846,7 +847,7 @@
           <p:cNvPr id="4" name="Datumsplatzhalter 3">
             <a:extLst>
               <a:ext uri="{FF2B5EF4-FFF2-40B4-BE49-F238E27FC236}">
-                <a16:creationId xmlns:a16="http://schemas.microsoft.com/office/drawing/2014/main" xmlns="" id="{B37FB6D4-F508-0985-5DFB-513640AFEFB3}"/>
+                <a16:creationId xmlns="" xmlns:a16="http://schemas.microsoft.com/office/drawing/2014/main" id="{B37FB6D4-F508-0985-5DFB-513640AFEFB3}"/>
               </a:ext>
             </a:extLst>
           </p:cNvPr>
@@ -865,7 +866,7 @@
             <a:fld id="{E5F54BAF-9E58-40B9-ADDC-0022BA13B894}" type="datetimeFigureOut">
               <a:rPr lang="de-DE" smtClean="0"/>
               <a:pPr/>
-              <a:t>08.11.2023</a:t>
+              <a:t>12.11.2023</a:t>
             </a:fld>
             <a:endParaRPr lang="de-DE"/>
           </a:p>
@@ -876,7 +877,7 @@
           <p:cNvPr id="5" name="Fußzeilenplatzhalter 4">
             <a:extLst>
               <a:ext uri="{FF2B5EF4-FFF2-40B4-BE49-F238E27FC236}">
-                <a16:creationId xmlns:a16="http://schemas.microsoft.com/office/drawing/2014/main" xmlns="" id="{90126931-990B-3F61-3E0A-1CCF1A555217}"/>
+                <a16:creationId xmlns="" xmlns:a16="http://schemas.microsoft.com/office/drawing/2014/main" id="{90126931-990B-3F61-3E0A-1CCF1A555217}"/>
               </a:ext>
             </a:extLst>
           </p:cNvPr>
@@ -901,7 +902,7 @@
           <p:cNvPr id="6" name="Foliennummernplatzhalter 5">
             <a:extLst>
               <a:ext uri="{FF2B5EF4-FFF2-40B4-BE49-F238E27FC236}">
-                <a16:creationId xmlns:a16="http://schemas.microsoft.com/office/drawing/2014/main" xmlns="" id="{5E5D99CB-2F84-0CFE-67E2-9AD189E53EEF}"/>
+                <a16:creationId xmlns="" xmlns:a16="http://schemas.microsoft.com/office/drawing/2014/main" id="{5E5D99CB-2F84-0CFE-67E2-9AD189E53EEF}"/>
               </a:ext>
             </a:extLst>
           </p:cNvPr>
@@ -929,7 +930,7 @@
     </p:spTree>
     <p:extLst>
       <p:ext uri="{BB962C8B-B14F-4D97-AF65-F5344CB8AC3E}">
-        <p14:creationId xmlns:p14="http://schemas.microsoft.com/office/powerpoint/2010/main" xmlns="" val="1380450370"/>
+        <p14:creationId xmlns="" xmlns:p14="http://schemas.microsoft.com/office/powerpoint/2010/main" val="1380450370"/>
       </p:ext>
     </p:extLst>
   </p:cSld>
@@ -961,7 +962,7 @@
           <p:cNvPr id="2" name="Titel 1">
             <a:extLst>
               <a:ext uri="{FF2B5EF4-FFF2-40B4-BE49-F238E27FC236}">
-                <a16:creationId xmlns:a16="http://schemas.microsoft.com/office/drawing/2014/main" xmlns="" id="{C00C1B22-0EDC-5433-9C7A-C2E607665E71}"/>
+                <a16:creationId xmlns="" xmlns:a16="http://schemas.microsoft.com/office/drawing/2014/main" id="{C00C1B22-0EDC-5433-9C7A-C2E607665E71}"/>
               </a:ext>
             </a:extLst>
           </p:cNvPr>
@@ -998,7 +999,7 @@
           <p:cNvPr id="3" name="Textplatzhalter 2">
             <a:extLst>
               <a:ext uri="{FF2B5EF4-FFF2-40B4-BE49-F238E27FC236}">
-                <a16:creationId xmlns:a16="http://schemas.microsoft.com/office/drawing/2014/main" xmlns="" id="{52FD2E27-E87B-2E60-2679-6D6CF043E4FF}"/>
+                <a16:creationId xmlns="" xmlns:a16="http://schemas.microsoft.com/office/drawing/2014/main" id="{52FD2E27-E87B-2E60-2679-6D6CF043E4FF}"/>
               </a:ext>
             </a:extLst>
           </p:cNvPr>
@@ -1123,7 +1124,7 @@
           <p:cNvPr id="4" name="Datumsplatzhalter 3">
             <a:extLst>
               <a:ext uri="{FF2B5EF4-FFF2-40B4-BE49-F238E27FC236}">
-                <a16:creationId xmlns:a16="http://schemas.microsoft.com/office/drawing/2014/main" xmlns="" id="{8CB4B802-A55D-05DF-7877-5D41A73360B2}"/>
+                <a16:creationId xmlns="" xmlns:a16="http://schemas.microsoft.com/office/drawing/2014/main" id="{8CB4B802-A55D-05DF-7877-5D41A73360B2}"/>
               </a:ext>
             </a:extLst>
           </p:cNvPr>
@@ -1142,7 +1143,7 @@
             <a:fld id="{E5F54BAF-9E58-40B9-ADDC-0022BA13B894}" type="datetimeFigureOut">
               <a:rPr lang="de-DE" smtClean="0"/>
               <a:pPr/>
-              <a:t>08.11.2023</a:t>
+              <a:t>12.11.2023</a:t>
             </a:fld>
             <a:endParaRPr lang="de-DE"/>
           </a:p>
@@ -1153,7 +1154,7 @@
           <p:cNvPr id="5" name="Fußzeilenplatzhalter 4">
             <a:extLst>
               <a:ext uri="{FF2B5EF4-FFF2-40B4-BE49-F238E27FC236}">
-                <a16:creationId xmlns:a16="http://schemas.microsoft.com/office/drawing/2014/main" xmlns="" id="{26B98E3B-85A4-888A-604B-F4FEFD9BB3E2}"/>
+                <a16:creationId xmlns="" xmlns:a16="http://schemas.microsoft.com/office/drawing/2014/main" id="{26B98E3B-85A4-888A-604B-F4FEFD9BB3E2}"/>
               </a:ext>
             </a:extLst>
           </p:cNvPr>
@@ -1178,7 +1179,7 @@
           <p:cNvPr id="6" name="Foliennummernplatzhalter 5">
             <a:extLst>
               <a:ext uri="{FF2B5EF4-FFF2-40B4-BE49-F238E27FC236}">
-                <a16:creationId xmlns:a16="http://schemas.microsoft.com/office/drawing/2014/main" xmlns="" id="{B366262E-8C02-E0D5-2C52-BC6C12E6886E}"/>
+                <a16:creationId xmlns="" xmlns:a16="http://schemas.microsoft.com/office/drawing/2014/main" id="{B366262E-8C02-E0D5-2C52-BC6C12E6886E}"/>
               </a:ext>
             </a:extLst>
           </p:cNvPr>
@@ -1206,7 +1207,7 @@
     </p:spTree>
     <p:extLst>
       <p:ext uri="{BB962C8B-B14F-4D97-AF65-F5344CB8AC3E}">
-        <p14:creationId xmlns:p14="http://schemas.microsoft.com/office/powerpoint/2010/main" xmlns="" val="3681091544"/>
+        <p14:creationId xmlns="" xmlns:p14="http://schemas.microsoft.com/office/powerpoint/2010/main" val="3681091544"/>
       </p:ext>
     </p:extLst>
   </p:cSld>
@@ -1238,7 +1239,7 @@
           <p:cNvPr id="2" name="Titel 1">
             <a:extLst>
               <a:ext uri="{FF2B5EF4-FFF2-40B4-BE49-F238E27FC236}">
-                <a16:creationId xmlns:a16="http://schemas.microsoft.com/office/drawing/2014/main" xmlns="" id="{47640113-A8ED-3F82-8492-AE616B6B2D15}"/>
+                <a16:creationId xmlns="" xmlns:a16="http://schemas.microsoft.com/office/drawing/2014/main" id="{47640113-A8ED-3F82-8492-AE616B6B2D15}"/>
               </a:ext>
             </a:extLst>
           </p:cNvPr>
@@ -1266,7 +1267,7 @@
           <p:cNvPr id="3" name="Inhaltsplatzhalter 2">
             <a:extLst>
               <a:ext uri="{FF2B5EF4-FFF2-40B4-BE49-F238E27FC236}">
-                <a16:creationId xmlns:a16="http://schemas.microsoft.com/office/drawing/2014/main" xmlns="" id="{E777AC79-EFDA-D98B-3926-F4D8EC8F1E9D}"/>
+                <a16:creationId xmlns="" xmlns:a16="http://schemas.microsoft.com/office/drawing/2014/main" id="{E777AC79-EFDA-D98B-3926-F4D8EC8F1E9D}"/>
               </a:ext>
             </a:extLst>
           </p:cNvPr>
@@ -1328,7 +1329,7 @@
           <p:cNvPr id="4" name="Inhaltsplatzhalter 3">
             <a:extLst>
               <a:ext uri="{FF2B5EF4-FFF2-40B4-BE49-F238E27FC236}">
-                <a16:creationId xmlns:a16="http://schemas.microsoft.com/office/drawing/2014/main" xmlns="" id="{1F350547-F73D-319E-08AA-847DB3652433}"/>
+                <a16:creationId xmlns="" xmlns:a16="http://schemas.microsoft.com/office/drawing/2014/main" id="{1F350547-F73D-319E-08AA-847DB3652433}"/>
               </a:ext>
             </a:extLst>
           </p:cNvPr>
@@ -1390,7 +1391,7 @@
           <p:cNvPr id="5" name="Datumsplatzhalter 4">
             <a:extLst>
               <a:ext uri="{FF2B5EF4-FFF2-40B4-BE49-F238E27FC236}">
-                <a16:creationId xmlns:a16="http://schemas.microsoft.com/office/drawing/2014/main" xmlns="" id="{F4DB2E3C-FFBD-9DA6-8DAB-40F21B4D03B3}"/>
+                <a16:creationId xmlns="" xmlns:a16="http://schemas.microsoft.com/office/drawing/2014/main" id="{F4DB2E3C-FFBD-9DA6-8DAB-40F21B4D03B3}"/>
               </a:ext>
             </a:extLst>
           </p:cNvPr>
@@ -1409,7 +1410,7 @@
             <a:fld id="{E5F54BAF-9E58-40B9-ADDC-0022BA13B894}" type="datetimeFigureOut">
               <a:rPr lang="de-DE" smtClean="0"/>
               <a:pPr/>
-              <a:t>08.11.2023</a:t>
+              <a:t>12.11.2023</a:t>
             </a:fld>
             <a:endParaRPr lang="de-DE"/>
           </a:p>
@@ -1420,7 +1421,7 @@
           <p:cNvPr id="6" name="Fußzeilenplatzhalter 5">
             <a:extLst>
               <a:ext uri="{FF2B5EF4-FFF2-40B4-BE49-F238E27FC236}">
-                <a16:creationId xmlns:a16="http://schemas.microsoft.com/office/drawing/2014/main" xmlns="" id="{1C6BBAD9-DF75-13C7-9D1A-1B77C1C5F629}"/>
+                <a16:creationId xmlns="" xmlns:a16="http://schemas.microsoft.com/office/drawing/2014/main" id="{1C6BBAD9-DF75-13C7-9D1A-1B77C1C5F629}"/>
               </a:ext>
             </a:extLst>
           </p:cNvPr>
@@ -1445,7 +1446,7 @@
           <p:cNvPr id="7" name="Foliennummernplatzhalter 6">
             <a:extLst>
               <a:ext uri="{FF2B5EF4-FFF2-40B4-BE49-F238E27FC236}">
-                <a16:creationId xmlns:a16="http://schemas.microsoft.com/office/drawing/2014/main" xmlns="" id="{584B0844-1AE9-3281-ED32-602C54F6E429}"/>
+                <a16:creationId xmlns="" xmlns:a16="http://schemas.microsoft.com/office/drawing/2014/main" id="{584B0844-1AE9-3281-ED32-602C54F6E429}"/>
               </a:ext>
             </a:extLst>
           </p:cNvPr>
@@ -1473,7 +1474,7 @@
     </p:spTree>
     <p:extLst>
       <p:ext uri="{BB962C8B-B14F-4D97-AF65-F5344CB8AC3E}">
-        <p14:creationId xmlns:p14="http://schemas.microsoft.com/office/powerpoint/2010/main" xmlns="" val="1285953335"/>
+        <p14:creationId xmlns="" xmlns:p14="http://schemas.microsoft.com/office/powerpoint/2010/main" val="1285953335"/>
       </p:ext>
     </p:extLst>
   </p:cSld>
@@ -1505,7 +1506,7 @@
           <p:cNvPr id="2" name="Titel 1">
             <a:extLst>
               <a:ext uri="{FF2B5EF4-FFF2-40B4-BE49-F238E27FC236}">
-                <a16:creationId xmlns:a16="http://schemas.microsoft.com/office/drawing/2014/main" xmlns="" id="{A1FB4549-7970-D2BE-3E87-D6CF63157FA0}"/>
+                <a16:creationId xmlns="" xmlns:a16="http://schemas.microsoft.com/office/drawing/2014/main" id="{A1FB4549-7970-D2BE-3E87-D6CF63157FA0}"/>
               </a:ext>
             </a:extLst>
           </p:cNvPr>
@@ -1538,7 +1539,7 @@
           <p:cNvPr id="3" name="Textplatzhalter 2">
             <a:extLst>
               <a:ext uri="{FF2B5EF4-FFF2-40B4-BE49-F238E27FC236}">
-                <a16:creationId xmlns:a16="http://schemas.microsoft.com/office/drawing/2014/main" xmlns="" id="{26687EDF-F1E6-B632-EF40-5CA736C6F9BB}"/>
+                <a16:creationId xmlns="" xmlns:a16="http://schemas.microsoft.com/office/drawing/2014/main" id="{26687EDF-F1E6-B632-EF40-5CA736C6F9BB}"/>
               </a:ext>
             </a:extLst>
           </p:cNvPr>
@@ -1609,7 +1610,7 @@
           <p:cNvPr id="4" name="Inhaltsplatzhalter 3">
             <a:extLst>
               <a:ext uri="{FF2B5EF4-FFF2-40B4-BE49-F238E27FC236}">
-                <a16:creationId xmlns:a16="http://schemas.microsoft.com/office/drawing/2014/main" xmlns="" id="{C63AA7DE-19A7-A094-B69C-4579C2322299}"/>
+                <a16:creationId xmlns="" xmlns:a16="http://schemas.microsoft.com/office/drawing/2014/main" id="{C63AA7DE-19A7-A094-B69C-4579C2322299}"/>
               </a:ext>
             </a:extLst>
           </p:cNvPr>
@@ -1671,7 +1672,7 @@
           <p:cNvPr id="5" name="Textplatzhalter 4">
             <a:extLst>
               <a:ext uri="{FF2B5EF4-FFF2-40B4-BE49-F238E27FC236}">
-                <a16:creationId xmlns:a16="http://schemas.microsoft.com/office/drawing/2014/main" xmlns="" id="{E60C441E-8B9F-5AEC-B887-1AF4E7761DF1}"/>
+                <a16:creationId xmlns="" xmlns:a16="http://schemas.microsoft.com/office/drawing/2014/main" id="{E60C441E-8B9F-5AEC-B887-1AF4E7761DF1}"/>
               </a:ext>
             </a:extLst>
           </p:cNvPr>
@@ -1742,7 +1743,7 @@
           <p:cNvPr id="6" name="Inhaltsplatzhalter 5">
             <a:extLst>
               <a:ext uri="{FF2B5EF4-FFF2-40B4-BE49-F238E27FC236}">
-                <a16:creationId xmlns:a16="http://schemas.microsoft.com/office/drawing/2014/main" xmlns="" id="{54E3EA2F-BE0B-2029-9B88-12AD882D8434}"/>
+                <a16:creationId xmlns="" xmlns:a16="http://schemas.microsoft.com/office/drawing/2014/main" id="{54E3EA2F-BE0B-2029-9B88-12AD882D8434}"/>
               </a:ext>
             </a:extLst>
           </p:cNvPr>
@@ -1804,7 +1805,7 @@
           <p:cNvPr id="7" name="Datumsplatzhalter 6">
             <a:extLst>
               <a:ext uri="{FF2B5EF4-FFF2-40B4-BE49-F238E27FC236}">
-                <a16:creationId xmlns:a16="http://schemas.microsoft.com/office/drawing/2014/main" xmlns="" id="{C8CEC4A3-FDA4-D3FE-1909-9BB0046D707D}"/>
+                <a16:creationId xmlns="" xmlns:a16="http://schemas.microsoft.com/office/drawing/2014/main" id="{C8CEC4A3-FDA4-D3FE-1909-9BB0046D707D}"/>
               </a:ext>
             </a:extLst>
           </p:cNvPr>
@@ -1823,7 +1824,7 @@
             <a:fld id="{E5F54BAF-9E58-40B9-ADDC-0022BA13B894}" type="datetimeFigureOut">
               <a:rPr lang="de-DE" smtClean="0"/>
               <a:pPr/>
-              <a:t>08.11.2023</a:t>
+              <a:t>12.11.2023</a:t>
             </a:fld>
             <a:endParaRPr lang="de-DE"/>
           </a:p>
@@ -1834,7 +1835,7 @@
           <p:cNvPr id="8" name="Fußzeilenplatzhalter 7">
             <a:extLst>
               <a:ext uri="{FF2B5EF4-FFF2-40B4-BE49-F238E27FC236}">
-                <a16:creationId xmlns:a16="http://schemas.microsoft.com/office/drawing/2014/main" xmlns="" id="{072A6F86-A52F-87E0-2648-81C9D5E98254}"/>
+                <a16:creationId xmlns="" xmlns:a16="http://schemas.microsoft.com/office/drawing/2014/main" id="{072A6F86-A52F-87E0-2648-81C9D5E98254}"/>
               </a:ext>
             </a:extLst>
           </p:cNvPr>
@@ -1859,7 +1860,7 @@
           <p:cNvPr id="9" name="Foliennummernplatzhalter 8">
             <a:extLst>
               <a:ext uri="{FF2B5EF4-FFF2-40B4-BE49-F238E27FC236}">
-                <a16:creationId xmlns:a16="http://schemas.microsoft.com/office/drawing/2014/main" xmlns="" id="{4BC16D6B-9AED-4971-7B51-42D6CCDD4530}"/>
+                <a16:creationId xmlns="" xmlns:a16="http://schemas.microsoft.com/office/drawing/2014/main" id="{4BC16D6B-9AED-4971-7B51-42D6CCDD4530}"/>
               </a:ext>
             </a:extLst>
           </p:cNvPr>
@@ -1887,7 +1888,7 @@
     </p:spTree>
     <p:extLst>
       <p:ext uri="{BB962C8B-B14F-4D97-AF65-F5344CB8AC3E}">
-        <p14:creationId xmlns:p14="http://schemas.microsoft.com/office/powerpoint/2010/main" xmlns="" val="1194677618"/>
+        <p14:creationId xmlns="" xmlns:p14="http://schemas.microsoft.com/office/powerpoint/2010/main" val="1194677618"/>
       </p:ext>
     </p:extLst>
   </p:cSld>
@@ -1919,7 +1920,7 @@
           <p:cNvPr id="2" name="Titel 1">
             <a:extLst>
               <a:ext uri="{FF2B5EF4-FFF2-40B4-BE49-F238E27FC236}">
-                <a16:creationId xmlns:a16="http://schemas.microsoft.com/office/drawing/2014/main" xmlns="" id="{CDC98F07-569C-97AA-4106-5BA0119300AC}"/>
+                <a16:creationId xmlns="" xmlns:a16="http://schemas.microsoft.com/office/drawing/2014/main" id="{CDC98F07-569C-97AA-4106-5BA0119300AC}"/>
               </a:ext>
             </a:extLst>
           </p:cNvPr>
@@ -1947,7 +1948,7 @@
           <p:cNvPr id="3" name="Datumsplatzhalter 2">
             <a:extLst>
               <a:ext uri="{FF2B5EF4-FFF2-40B4-BE49-F238E27FC236}">
-                <a16:creationId xmlns:a16="http://schemas.microsoft.com/office/drawing/2014/main" xmlns="" id="{0C819654-8727-7DC7-01D9-F999805CC61C}"/>
+                <a16:creationId xmlns="" xmlns:a16="http://schemas.microsoft.com/office/drawing/2014/main" id="{0C819654-8727-7DC7-01D9-F999805CC61C}"/>
               </a:ext>
             </a:extLst>
           </p:cNvPr>
@@ -1966,7 +1967,7 @@
             <a:fld id="{E5F54BAF-9E58-40B9-ADDC-0022BA13B894}" type="datetimeFigureOut">
               <a:rPr lang="de-DE" smtClean="0"/>
               <a:pPr/>
-              <a:t>08.11.2023</a:t>
+              <a:t>12.11.2023</a:t>
             </a:fld>
             <a:endParaRPr lang="de-DE"/>
           </a:p>
@@ -1977,7 +1978,7 @@
           <p:cNvPr id="4" name="Fußzeilenplatzhalter 3">
             <a:extLst>
               <a:ext uri="{FF2B5EF4-FFF2-40B4-BE49-F238E27FC236}">
-                <a16:creationId xmlns:a16="http://schemas.microsoft.com/office/drawing/2014/main" xmlns="" id="{DF645A51-A9B8-2BC9-3E7F-E715E066D818}"/>
+                <a16:creationId xmlns="" xmlns:a16="http://schemas.microsoft.com/office/drawing/2014/main" id="{DF645A51-A9B8-2BC9-3E7F-E715E066D818}"/>
               </a:ext>
             </a:extLst>
           </p:cNvPr>
@@ -2002,7 +2003,7 @@
           <p:cNvPr id="5" name="Foliennummernplatzhalter 4">
             <a:extLst>
               <a:ext uri="{FF2B5EF4-FFF2-40B4-BE49-F238E27FC236}">
-                <a16:creationId xmlns:a16="http://schemas.microsoft.com/office/drawing/2014/main" xmlns="" id="{89B6C067-3A46-5D40-047D-9357DBD510F8}"/>
+                <a16:creationId xmlns="" xmlns:a16="http://schemas.microsoft.com/office/drawing/2014/main" id="{89B6C067-3A46-5D40-047D-9357DBD510F8}"/>
               </a:ext>
             </a:extLst>
           </p:cNvPr>
@@ -2030,7 +2031,7 @@
     </p:spTree>
     <p:extLst>
       <p:ext uri="{BB962C8B-B14F-4D97-AF65-F5344CB8AC3E}">
-        <p14:creationId xmlns:p14="http://schemas.microsoft.com/office/powerpoint/2010/main" xmlns="" val="2385503430"/>
+        <p14:creationId xmlns="" xmlns:p14="http://schemas.microsoft.com/office/powerpoint/2010/main" val="2385503430"/>
       </p:ext>
     </p:extLst>
   </p:cSld>
@@ -2062,7 +2063,7 @@
           <p:cNvPr id="2" name="Datumsplatzhalter 1">
             <a:extLst>
               <a:ext uri="{FF2B5EF4-FFF2-40B4-BE49-F238E27FC236}">
-                <a16:creationId xmlns:a16="http://schemas.microsoft.com/office/drawing/2014/main" xmlns="" id="{FF2AB35B-C184-F4D8-5153-6BCAE5BBB36B}"/>
+                <a16:creationId xmlns="" xmlns:a16="http://schemas.microsoft.com/office/drawing/2014/main" id="{FF2AB35B-C184-F4D8-5153-6BCAE5BBB36B}"/>
               </a:ext>
             </a:extLst>
           </p:cNvPr>
@@ -2081,7 +2082,7 @@
             <a:fld id="{E5F54BAF-9E58-40B9-ADDC-0022BA13B894}" type="datetimeFigureOut">
               <a:rPr lang="de-DE" smtClean="0"/>
               <a:pPr/>
-              <a:t>08.11.2023</a:t>
+              <a:t>12.11.2023</a:t>
             </a:fld>
             <a:endParaRPr lang="de-DE"/>
           </a:p>
@@ -2092,7 +2093,7 @@
           <p:cNvPr id="3" name="Fußzeilenplatzhalter 2">
             <a:extLst>
               <a:ext uri="{FF2B5EF4-FFF2-40B4-BE49-F238E27FC236}">
-                <a16:creationId xmlns:a16="http://schemas.microsoft.com/office/drawing/2014/main" xmlns="" id="{52D3D9FC-F92E-27CA-EE08-9F763583548C}"/>
+                <a16:creationId xmlns="" xmlns:a16="http://schemas.microsoft.com/office/drawing/2014/main" id="{52D3D9FC-F92E-27CA-EE08-9F763583548C}"/>
               </a:ext>
             </a:extLst>
           </p:cNvPr>
@@ -2117,7 +2118,7 @@
           <p:cNvPr id="4" name="Foliennummernplatzhalter 3">
             <a:extLst>
               <a:ext uri="{FF2B5EF4-FFF2-40B4-BE49-F238E27FC236}">
-                <a16:creationId xmlns:a16="http://schemas.microsoft.com/office/drawing/2014/main" xmlns="" id="{E7E76A25-7905-B8E1-43D6-4402B3641D31}"/>
+                <a16:creationId xmlns="" xmlns:a16="http://schemas.microsoft.com/office/drawing/2014/main" id="{E7E76A25-7905-B8E1-43D6-4402B3641D31}"/>
               </a:ext>
             </a:extLst>
           </p:cNvPr>
@@ -2145,7 +2146,7 @@
     </p:spTree>
     <p:extLst>
       <p:ext uri="{BB962C8B-B14F-4D97-AF65-F5344CB8AC3E}">
-        <p14:creationId xmlns:p14="http://schemas.microsoft.com/office/powerpoint/2010/main" xmlns="" val="4180400202"/>
+        <p14:creationId xmlns="" xmlns:p14="http://schemas.microsoft.com/office/powerpoint/2010/main" val="4180400202"/>
       </p:ext>
     </p:extLst>
   </p:cSld>
@@ -2177,7 +2178,7 @@
           <p:cNvPr id="2" name="Titel 1">
             <a:extLst>
               <a:ext uri="{FF2B5EF4-FFF2-40B4-BE49-F238E27FC236}">
-                <a16:creationId xmlns:a16="http://schemas.microsoft.com/office/drawing/2014/main" xmlns="" id="{D84CA98A-BDCD-351C-66DC-9B948DCA8EF6}"/>
+                <a16:creationId xmlns="" xmlns:a16="http://schemas.microsoft.com/office/drawing/2014/main" id="{D84CA98A-BDCD-351C-66DC-9B948DCA8EF6}"/>
               </a:ext>
             </a:extLst>
           </p:cNvPr>
@@ -2214,7 +2215,7 @@
           <p:cNvPr id="3" name="Inhaltsplatzhalter 2">
             <a:extLst>
               <a:ext uri="{FF2B5EF4-FFF2-40B4-BE49-F238E27FC236}">
-                <a16:creationId xmlns:a16="http://schemas.microsoft.com/office/drawing/2014/main" xmlns="" id="{1BC6AC52-50E8-0735-F444-7F9321EFED82}"/>
+                <a16:creationId xmlns="" xmlns:a16="http://schemas.microsoft.com/office/drawing/2014/main" id="{1BC6AC52-50E8-0735-F444-7F9321EFED82}"/>
               </a:ext>
             </a:extLst>
           </p:cNvPr>
@@ -2304,7 +2305,7 @@
           <p:cNvPr id="4" name="Textplatzhalter 3">
             <a:extLst>
               <a:ext uri="{FF2B5EF4-FFF2-40B4-BE49-F238E27FC236}">
-                <a16:creationId xmlns:a16="http://schemas.microsoft.com/office/drawing/2014/main" xmlns="" id="{CBA0D2D8-90C5-77E3-22BA-21734261403A}"/>
+                <a16:creationId xmlns="" xmlns:a16="http://schemas.microsoft.com/office/drawing/2014/main" id="{CBA0D2D8-90C5-77E3-22BA-21734261403A}"/>
               </a:ext>
             </a:extLst>
           </p:cNvPr>
@@ -2375,7 +2376,7 @@
           <p:cNvPr id="5" name="Datumsplatzhalter 4">
             <a:extLst>
               <a:ext uri="{FF2B5EF4-FFF2-40B4-BE49-F238E27FC236}">
-                <a16:creationId xmlns:a16="http://schemas.microsoft.com/office/drawing/2014/main" xmlns="" id="{4DD81BF4-9A67-322D-DF21-E7EEB4E50A35}"/>
+                <a16:creationId xmlns="" xmlns:a16="http://schemas.microsoft.com/office/drawing/2014/main" id="{4DD81BF4-9A67-322D-DF21-E7EEB4E50A35}"/>
               </a:ext>
             </a:extLst>
           </p:cNvPr>
@@ -2394,7 +2395,7 @@
             <a:fld id="{E5F54BAF-9E58-40B9-ADDC-0022BA13B894}" type="datetimeFigureOut">
               <a:rPr lang="de-DE" smtClean="0"/>
               <a:pPr/>
-              <a:t>08.11.2023</a:t>
+              <a:t>12.11.2023</a:t>
             </a:fld>
             <a:endParaRPr lang="de-DE"/>
           </a:p>
@@ -2405,7 +2406,7 @@
           <p:cNvPr id="6" name="Fußzeilenplatzhalter 5">
             <a:extLst>
               <a:ext uri="{FF2B5EF4-FFF2-40B4-BE49-F238E27FC236}">
-                <a16:creationId xmlns:a16="http://schemas.microsoft.com/office/drawing/2014/main" xmlns="" id="{370347E8-E79F-5687-86BF-AA9C53121CC6}"/>
+                <a16:creationId xmlns="" xmlns:a16="http://schemas.microsoft.com/office/drawing/2014/main" id="{370347E8-E79F-5687-86BF-AA9C53121CC6}"/>
               </a:ext>
             </a:extLst>
           </p:cNvPr>
@@ -2430,7 +2431,7 @@
           <p:cNvPr id="7" name="Foliennummernplatzhalter 6">
             <a:extLst>
               <a:ext uri="{FF2B5EF4-FFF2-40B4-BE49-F238E27FC236}">
-                <a16:creationId xmlns:a16="http://schemas.microsoft.com/office/drawing/2014/main" xmlns="" id="{1FDF37B6-771E-FF71-EAD9-B17FA51BE36F}"/>
+                <a16:creationId xmlns="" xmlns:a16="http://schemas.microsoft.com/office/drawing/2014/main" id="{1FDF37B6-771E-FF71-EAD9-B17FA51BE36F}"/>
               </a:ext>
             </a:extLst>
           </p:cNvPr>
@@ -2458,7 +2459,7 @@
     </p:spTree>
     <p:extLst>
       <p:ext uri="{BB962C8B-B14F-4D97-AF65-F5344CB8AC3E}">
-        <p14:creationId xmlns:p14="http://schemas.microsoft.com/office/powerpoint/2010/main" xmlns="" val="948628103"/>
+        <p14:creationId xmlns="" xmlns:p14="http://schemas.microsoft.com/office/powerpoint/2010/main" val="948628103"/>
       </p:ext>
     </p:extLst>
   </p:cSld>
@@ -2490,7 +2491,7 @@
           <p:cNvPr id="2" name="Titel 1">
             <a:extLst>
               <a:ext uri="{FF2B5EF4-FFF2-40B4-BE49-F238E27FC236}">
-                <a16:creationId xmlns:a16="http://schemas.microsoft.com/office/drawing/2014/main" xmlns="" id="{09153D9E-959E-B1E1-4573-F82979953906}"/>
+                <a16:creationId xmlns="" xmlns:a16="http://schemas.microsoft.com/office/drawing/2014/main" id="{09153D9E-959E-B1E1-4573-F82979953906}"/>
               </a:ext>
             </a:extLst>
           </p:cNvPr>
@@ -2527,7 +2528,7 @@
           <p:cNvPr id="3" name="Bildplatzhalter 2">
             <a:extLst>
               <a:ext uri="{FF2B5EF4-FFF2-40B4-BE49-F238E27FC236}">
-                <a16:creationId xmlns:a16="http://schemas.microsoft.com/office/drawing/2014/main" xmlns="" id="{EE5610E2-475C-F372-A2AE-6FE621E7C6E0}"/>
+                <a16:creationId xmlns="" xmlns:a16="http://schemas.microsoft.com/office/drawing/2014/main" id="{EE5610E2-475C-F372-A2AE-6FE621E7C6E0}"/>
               </a:ext>
             </a:extLst>
           </p:cNvPr>
@@ -2594,7 +2595,7 @@
           <p:cNvPr id="4" name="Textplatzhalter 3">
             <a:extLst>
               <a:ext uri="{FF2B5EF4-FFF2-40B4-BE49-F238E27FC236}">
-                <a16:creationId xmlns:a16="http://schemas.microsoft.com/office/drawing/2014/main" xmlns="" id="{C7255B95-02DF-6C3A-DE78-BA7D3DD17080}"/>
+                <a16:creationId xmlns="" xmlns:a16="http://schemas.microsoft.com/office/drawing/2014/main" id="{C7255B95-02DF-6C3A-DE78-BA7D3DD17080}"/>
               </a:ext>
             </a:extLst>
           </p:cNvPr>
@@ -2665,7 +2666,7 @@
           <p:cNvPr id="5" name="Datumsplatzhalter 4">
             <a:extLst>
               <a:ext uri="{FF2B5EF4-FFF2-40B4-BE49-F238E27FC236}">
-                <a16:creationId xmlns:a16="http://schemas.microsoft.com/office/drawing/2014/main" xmlns="" id="{01609C02-3E6F-3BDF-FCC6-046A33305A91}"/>
+                <a16:creationId xmlns="" xmlns:a16="http://schemas.microsoft.com/office/drawing/2014/main" id="{01609C02-3E6F-3BDF-FCC6-046A33305A91}"/>
               </a:ext>
             </a:extLst>
           </p:cNvPr>
@@ -2684,7 +2685,7 @@
             <a:fld id="{E5F54BAF-9E58-40B9-ADDC-0022BA13B894}" type="datetimeFigureOut">
               <a:rPr lang="de-DE" smtClean="0"/>
               <a:pPr/>
-              <a:t>08.11.2023</a:t>
+              <a:t>12.11.2023</a:t>
             </a:fld>
             <a:endParaRPr lang="de-DE"/>
           </a:p>
@@ -2695,7 +2696,7 @@
           <p:cNvPr id="6" name="Fußzeilenplatzhalter 5">
             <a:extLst>
               <a:ext uri="{FF2B5EF4-FFF2-40B4-BE49-F238E27FC236}">
-                <a16:creationId xmlns:a16="http://schemas.microsoft.com/office/drawing/2014/main" xmlns="" id="{835A6352-2F53-7071-2F9B-0F0176A7F7D9}"/>
+                <a16:creationId xmlns="" xmlns:a16="http://schemas.microsoft.com/office/drawing/2014/main" id="{835A6352-2F53-7071-2F9B-0F0176A7F7D9}"/>
               </a:ext>
             </a:extLst>
           </p:cNvPr>
@@ -2720,7 +2721,7 @@
           <p:cNvPr id="7" name="Foliennummernplatzhalter 6">
             <a:extLst>
               <a:ext uri="{FF2B5EF4-FFF2-40B4-BE49-F238E27FC236}">
-                <a16:creationId xmlns:a16="http://schemas.microsoft.com/office/drawing/2014/main" xmlns="" id="{8ACE2366-6CF7-A792-F595-A4FD3A7CF27D}"/>
+                <a16:creationId xmlns="" xmlns:a16="http://schemas.microsoft.com/office/drawing/2014/main" id="{8ACE2366-6CF7-A792-F595-A4FD3A7CF27D}"/>
               </a:ext>
             </a:extLst>
           </p:cNvPr>
@@ -2748,7 +2749,7 @@
     </p:spTree>
     <p:extLst>
       <p:ext uri="{BB962C8B-B14F-4D97-AF65-F5344CB8AC3E}">
-        <p14:creationId xmlns:p14="http://schemas.microsoft.com/office/powerpoint/2010/main" xmlns="" val="4117060318"/>
+        <p14:creationId xmlns="" xmlns:p14="http://schemas.microsoft.com/office/powerpoint/2010/main" val="4117060318"/>
       </p:ext>
     </p:extLst>
   </p:cSld>
@@ -2785,7 +2786,7 @@
           <p:cNvPr id="2" name="Titelplatzhalter 1">
             <a:extLst>
               <a:ext uri="{FF2B5EF4-FFF2-40B4-BE49-F238E27FC236}">
-                <a16:creationId xmlns:a16="http://schemas.microsoft.com/office/drawing/2014/main" xmlns="" id="{E1B3D26C-DE74-0E24-FC2C-D4E105EF27B6}"/>
+                <a16:creationId xmlns="" xmlns:a16="http://schemas.microsoft.com/office/drawing/2014/main" id="{E1B3D26C-DE74-0E24-FC2C-D4E105EF27B6}"/>
               </a:ext>
             </a:extLst>
           </p:cNvPr>
@@ -2823,7 +2824,7 @@
           <p:cNvPr id="3" name="Textplatzhalter 2">
             <a:extLst>
               <a:ext uri="{FF2B5EF4-FFF2-40B4-BE49-F238E27FC236}">
-                <a16:creationId xmlns:a16="http://schemas.microsoft.com/office/drawing/2014/main" xmlns="" id="{0A3802B1-A1C2-C9BB-13E8-0EC5B02C63CA}"/>
+                <a16:creationId xmlns="" xmlns:a16="http://schemas.microsoft.com/office/drawing/2014/main" id="{0A3802B1-A1C2-C9BB-13E8-0EC5B02C63CA}"/>
               </a:ext>
             </a:extLst>
           </p:cNvPr>
@@ -2890,7 +2891,7 @@
           <p:cNvPr id="4" name="Datumsplatzhalter 3">
             <a:extLst>
               <a:ext uri="{FF2B5EF4-FFF2-40B4-BE49-F238E27FC236}">
-                <a16:creationId xmlns:a16="http://schemas.microsoft.com/office/drawing/2014/main" xmlns="" id="{ACB25ADD-46F6-07A5-193F-182E5F4163D1}"/>
+                <a16:creationId xmlns="" xmlns:a16="http://schemas.microsoft.com/office/drawing/2014/main" id="{ACB25ADD-46F6-07A5-193F-182E5F4163D1}"/>
               </a:ext>
             </a:extLst>
           </p:cNvPr>
@@ -2927,7 +2928,7 @@
             <a:fld id="{E5F54BAF-9E58-40B9-ADDC-0022BA13B894}" type="datetimeFigureOut">
               <a:rPr lang="de-DE" smtClean="0"/>
               <a:pPr/>
-              <a:t>08.11.2023</a:t>
+              <a:t>12.11.2023</a:t>
             </a:fld>
             <a:endParaRPr lang="de-DE"/>
           </a:p>
@@ -2938,7 +2939,7 @@
           <p:cNvPr id="5" name="Fußzeilenplatzhalter 4">
             <a:extLst>
               <a:ext uri="{FF2B5EF4-FFF2-40B4-BE49-F238E27FC236}">
-                <a16:creationId xmlns:a16="http://schemas.microsoft.com/office/drawing/2014/main" xmlns="" id="{2E658413-CE80-D33D-9692-98BD42D2902C}"/>
+                <a16:creationId xmlns="" xmlns:a16="http://schemas.microsoft.com/office/drawing/2014/main" id="{2E658413-CE80-D33D-9692-98BD42D2902C}"/>
               </a:ext>
             </a:extLst>
           </p:cNvPr>
@@ -2981,7 +2982,7 @@
           <p:cNvPr id="6" name="Foliennummernplatzhalter 5">
             <a:extLst>
               <a:ext uri="{FF2B5EF4-FFF2-40B4-BE49-F238E27FC236}">
-                <a16:creationId xmlns:a16="http://schemas.microsoft.com/office/drawing/2014/main" xmlns="" id="{AA0A50A9-0FE8-FF11-41EA-FD973CDF8EC9}"/>
+                <a16:creationId xmlns="" xmlns:a16="http://schemas.microsoft.com/office/drawing/2014/main" id="{AA0A50A9-0FE8-FF11-41EA-FD973CDF8EC9}"/>
               </a:ext>
             </a:extLst>
           </p:cNvPr>
@@ -3027,7 +3028,7 @@
     </p:spTree>
     <p:extLst>
       <p:ext uri="{BB962C8B-B14F-4D97-AF65-F5344CB8AC3E}">
-        <p14:creationId xmlns:p14="http://schemas.microsoft.com/office/powerpoint/2010/main" xmlns="" val="3884394943"/>
+        <p14:creationId xmlns="" xmlns:p14="http://schemas.microsoft.com/office/powerpoint/2010/main" val="3884394943"/>
       </p:ext>
     </p:extLst>
   </p:cSld>
@@ -3350,7 +3351,7 @@
           <p:cNvPr id="61" name="Gruppieren 60">
             <a:extLst>
               <a:ext uri="{FF2B5EF4-FFF2-40B4-BE49-F238E27FC236}">
-                <a16:creationId xmlns:a16="http://schemas.microsoft.com/office/drawing/2014/main" xmlns="" id="{4BE5F4D0-B999-05C4-C855-8A160C9229BD}"/>
+                <a16:creationId xmlns="" xmlns:a16="http://schemas.microsoft.com/office/drawing/2014/main" id="{4BE5F4D0-B999-05C4-C855-8A160C9229BD}"/>
               </a:ext>
             </a:extLst>
           </p:cNvPr>
@@ -3370,7 +3371,7 @@
             <p:cNvPr id="5" name="Grafik 4" descr="Volumen mit einfarbiger Füllung">
               <a:extLst>
                 <a:ext uri="{FF2B5EF4-FFF2-40B4-BE49-F238E27FC236}">
-                  <a16:creationId xmlns:a16="http://schemas.microsoft.com/office/drawing/2014/main" xmlns="" id="{551B0F16-016C-A6FF-B3B9-643A3D042A4F}"/>
+                  <a16:creationId xmlns="" xmlns:a16="http://schemas.microsoft.com/office/drawing/2014/main" id="{551B0F16-016C-A6FF-B3B9-643A3D042A4F}"/>
                 </a:ext>
               </a:extLst>
             </p:cNvPr>
@@ -3383,10 +3384,10 @@
             <a:blip r:embed="rId2" cstate="print">
               <a:extLst>
                 <a:ext uri="{28A0092B-C50C-407E-A947-70E740481C1C}">
-                  <a14:useLocalDpi xmlns:a14="http://schemas.microsoft.com/office/drawing/2010/main" xmlns="" val="0"/>
+                  <a14:useLocalDpi xmlns="" xmlns:a14="http://schemas.microsoft.com/office/drawing/2010/main" val="0"/>
                 </a:ext>
                 <a:ext uri="{96DAC541-7B7A-43D3-8B79-37D633B846F1}">
-                  <asvg:svgBlip xmlns:asvg="http://schemas.microsoft.com/office/drawing/2016/SVG/main" xmlns="" r:embed="rId3"/>
+                  <asvg:svgBlip xmlns="" xmlns:asvg="http://schemas.microsoft.com/office/drawing/2016/SVG/main" r:embed="rId3"/>
                 </a:ext>
               </a:extLst>
             </a:blip>
@@ -3409,7 +3410,7 @@
             <p:cNvPr id="7" name="Grafik 6" descr="Radiomikrofon mit einfarbiger Füllung">
               <a:extLst>
                 <a:ext uri="{FF2B5EF4-FFF2-40B4-BE49-F238E27FC236}">
-                  <a16:creationId xmlns:a16="http://schemas.microsoft.com/office/drawing/2014/main" xmlns="" id="{3760C04C-D5D1-9F92-15FD-03CA88CCC834}"/>
+                  <a16:creationId xmlns="" xmlns:a16="http://schemas.microsoft.com/office/drawing/2014/main" id="{3760C04C-D5D1-9F92-15FD-03CA88CCC834}"/>
                 </a:ext>
               </a:extLst>
             </p:cNvPr>
@@ -3422,10 +3423,10 @@
             <a:blip r:embed="rId4" cstate="print">
               <a:extLst>
                 <a:ext uri="{28A0092B-C50C-407E-A947-70E740481C1C}">
-                  <a14:useLocalDpi xmlns:a14="http://schemas.microsoft.com/office/drawing/2010/main" xmlns="" val="0"/>
+                  <a14:useLocalDpi xmlns="" xmlns:a14="http://schemas.microsoft.com/office/drawing/2010/main" val="0"/>
                 </a:ext>
                 <a:ext uri="{96DAC541-7B7A-43D3-8B79-37D633B846F1}">
-                  <asvg:svgBlip xmlns:asvg="http://schemas.microsoft.com/office/drawing/2016/SVG/main" xmlns="" r:embed="rId5"/>
+                  <asvg:svgBlip xmlns="" xmlns:asvg="http://schemas.microsoft.com/office/drawing/2016/SVG/main" r:embed="rId5"/>
                 </a:ext>
               </a:extLst>
             </a:blip>
@@ -3448,7 +3449,7 @@
             <p:cNvPr id="9" name="Gerade Verbindung mit Pfeil 8">
               <a:extLst>
                 <a:ext uri="{FF2B5EF4-FFF2-40B4-BE49-F238E27FC236}">
-                  <a16:creationId xmlns:a16="http://schemas.microsoft.com/office/drawing/2014/main" xmlns="" id="{0D7BC79C-1BA1-D72E-D380-AA37EE738E4F}"/>
+                  <a16:creationId xmlns="" xmlns:a16="http://schemas.microsoft.com/office/drawing/2014/main" id="{0D7BC79C-1BA1-D72E-D380-AA37EE738E4F}"/>
                 </a:ext>
               </a:extLst>
             </p:cNvPr>
@@ -3493,7 +3494,7 @@
             <p:cNvPr id="10" name="Rechteck 9">
               <a:extLst>
                 <a:ext uri="{FF2B5EF4-FFF2-40B4-BE49-F238E27FC236}">
-                  <a16:creationId xmlns:a16="http://schemas.microsoft.com/office/drawing/2014/main" xmlns="" id="{77890C79-70F7-8F58-D3A8-1ADB7BF8669C}"/>
+                  <a16:creationId xmlns="" xmlns:a16="http://schemas.microsoft.com/office/drawing/2014/main" id="{77890C79-70F7-8F58-D3A8-1ADB7BF8669C}"/>
                 </a:ext>
               </a:extLst>
             </p:cNvPr>
@@ -3573,7 +3574,7 @@
             <p:cNvPr id="12" name="Gerade Verbindung mit Pfeil 11">
               <a:extLst>
                 <a:ext uri="{FF2B5EF4-FFF2-40B4-BE49-F238E27FC236}">
-                  <a16:creationId xmlns:a16="http://schemas.microsoft.com/office/drawing/2014/main" xmlns="" id="{E709824F-BE4A-ABAE-EE91-F2F330E9405C}"/>
+                  <a16:creationId xmlns="" xmlns:a16="http://schemas.microsoft.com/office/drawing/2014/main" id="{E709824F-BE4A-ABAE-EE91-F2F330E9405C}"/>
                 </a:ext>
               </a:extLst>
             </p:cNvPr>
@@ -3618,7 +3619,7 @@
             <p:cNvPr id="15" name="Ellipse 14">
               <a:extLst>
                 <a:ext uri="{FF2B5EF4-FFF2-40B4-BE49-F238E27FC236}">
-                  <a16:creationId xmlns:a16="http://schemas.microsoft.com/office/drawing/2014/main" xmlns="" id="{C0B3AFA4-6A8A-F078-FE1E-4181BEED91C4}"/>
+                  <a16:creationId xmlns="" xmlns:a16="http://schemas.microsoft.com/office/drawing/2014/main" id="{C0B3AFA4-6A8A-F078-FE1E-4181BEED91C4}"/>
                 </a:ext>
               </a:extLst>
             </p:cNvPr>
@@ -3672,7 +3673,7 @@
             <p:cNvPr id="16" name="Gerade Verbindung mit Pfeil 15">
               <a:extLst>
                 <a:ext uri="{FF2B5EF4-FFF2-40B4-BE49-F238E27FC236}">
-                  <a16:creationId xmlns:a16="http://schemas.microsoft.com/office/drawing/2014/main" xmlns="" id="{3098C320-B0E0-80D3-C891-D883758C1726}"/>
+                  <a16:creationId xmlns="" xmlns:a16="http://schemas.microsoft.com/office/drawing/2014/main" id="{3098C320-B0E0-80D3-C891-D883758C1726}"/>
                 </a:ext>
               </a:extLst>
             </p:cNvPr>
@@ -3716,7 +3717,7 @@
             <p:cNvPr id="19" name="Gerade Verbindung mit Pfeil 18">
               <a:extLst>
                 <a:ext uri="{FF2B5EF4-FFF2-40B4-BE49-F238E27FC236}">
-                  <a16:creationId xmlns:a16="http://schemas.microsoft.com/office/drawing/2014/main" xmlns="" id="{6F376301-2D84-692E-E6ED-80D38D5B423C}"/>
+                  <a16:creationId xmlns="" xmlns:a16="http://schemas.microsoft.com/office/drawing/2014/main" id="{6F376301-2D84-692E-E6ED-80D38D5B423C}"/>
                 </a:ext>
               </a:extLst>
             </p:cNvPr>
@@ -3762,7 +3763,7 @@
             <p:cNvPr id="22" name="Gerade Verbindung mit Pfeil 21">
               <a:extLst>
                 <a:ext uri="{FF2B5EF4-FFF2-40B4-BE49-F238E27FC236}">
-                  <a16:creationId xmlns:a16="http://schemas.microsoft.com/office/drawing/2014/main" xmlns="" id="{FF6C6623-CBA4-2B1D-E073-ED2F57422FBC}"/>
+                  <a16:creationId xmlns="" xmlns:a16="http://schemas.microsoft.com/office/drawing/2014/main" id="{FF6C6623-CBA4-2B1D-E073-ED2F57422FBC}"/>
                 </a:ext>
               </a:extLst>
             </p:cNvPr>
@@ -3807,7 +3808,7 @@
             <p:cNvPr id="31" name="Verbinder: gewinkelt 30">
               <a:extLst>
                 <a:ext uri="{FF2B5EF4-FFF2-40B4-BE49-F238E27FC236}">
-                  <a16:creationId xmlns:a16="http://schemas.microsoft.com/office/drawing/2014/main" xmlns="" id="{9B42DC58-6201-57DB-639F-6E6AE3C5CA4B}"/>
+                  <a16:creationId xmlns="" xmlns:a16="http://schemas.microsoft.com/office/drawing/2014/main" id="{9B42DC58-6201-57DB-639F-6E6AE3C5CA4B}"/>
                 </a:ext>
               </a:extLst>
             </p:cNvPr>
@@ -3852,7 +3853,7 @@
             <p:cNvPr id="44" name="Bogen 43">
               <a:extLst>
                 <a:ext uri="{FF2B5EF4-FFF2-40B4-BE49-F238E27FC236}">
-                  <a16:creationId xmlns:a16="http://schemas.microsoft.com/office/drawing/2014/main" xmlns="" id="{4CCAAFA4-404E-702C-EFEE-E703A545C8C8}"/>
+                  <a16:creationId xmlns="" xmlns:a16="http://schemas.microsoft.com/office/drawing/2014/main" id="{4CCAAFA4-404E-702C-EFEE-E703A545C8C8}"/>
                 </a:ext>
               </a:extLst>
             </p:cNvPr>
@@ -3907,7 +3908,7 @@
             <p:cNvPr id="53" name="Textfeld 52">
               <a:extLst>
                 <a:ext uri="{FF2B5EF4-FFF2-40B4-BE49-F238E27FC236}">
-                  <a16:creationId xmlns:a16="http://schemas.microsoft.com/office/drawing/2014/main" xmlns="" id="{690370DA-8D63-48AC-0EE1-04E73F5450D7}"/>
+                  <a16:creationId xmlns="" xmlns:a16="http://schemas.microsoft.com/office/drawing/2014/main" id="{690370DA-8D63-48AC-0EE1-04E73F5450D7}"/>
                 </a:ext>
               </a:extLst>
             </p:cNvPr>
@@ -3938,7 +3939,7 @@
           </p:txBody>
         </p:sp>
         <mc:AlternateContent xmlns:mc="http://schemas.openxmlformats.org/markup-compatibility/2006">
-          <mc:Choice xmlns:a14="http://schemas.microsoft.com/office/drawing/2010/main" xmlns="" Requires="a14">
+          <mc:Choice xmlns="" xmlns:a14="http://schemas.microsoft.com/office/drawing/2010/main" Requires="a14">
             <p:sp>
               <p:nvSpPr>
                 <p:cNvPr id="56" name="Textfeld 55">
@@ -4030,7 +4031,7 @@
                 <p:cNvPr id="56" name="Textfeld 55">
                   <a:extLst>
                     <a:ext uri="{FF2B5EF4-FFF2-40B4-BE49-F238E27FC236}">
-                      <a16:creationId xmlns:a16="http://schemas.microsoft.com/office/drawing/2014/main" xmlns="" id="{ED3C6559-470E-A303-2C96-9DBE3456190D}"/>
+                      <a16:creationId xmlns="" xmlns:a16="http://schemas.microsoft.com/office/drawing/2014/main" id="{ED3C6559-470E-A303-2C96-9DBE3456190D}"/>
                     </a:ext>
                   </a:extLst>
                 </p:cNvPr>
@@ -4070,7 +4071,7 @@
           </mc:Fallback>
         </mc:AlternateContent>
         <mc:AlternateContent xmlns:mc="http://schemas.openxmlformats.org/markup-compatibility/2006">
-          <mc:Choice xmlns:a14="http://schemas.microsoft.com/office/drawing/2010/main" xmlns="" Requires="a14">
+          <mc:Choice xmlns="" xmlns:a14="http://schemas.microsoft.com/office/drawing/2010/main" Requires="a14">
             <p:sp>
               <p:nvSpPr>
                 <p:cNvPr id="57" name="Textfeld 56">
@@ -4144,7 +4145,7 @@
                 <p:cNvPr id="57" name="Textfeld 56">
                   <a:extLst>
                     <a:ext uri="{FF2B5EF4-FFF2-40B4-BE49-F238E27FC236}">
-                      <a16:creationId xmlns:a16="http://schemas.microsoft.com/office/drawing/2014/main" xmlns="" id="{3685EC7A-4101-B11D-473B-7B0FFEC10B17}"/>
+                      <a16:creationId xmlns="" xmlns:a16="http://schemas.microsoft.com/office/drawing/2014/main" id="{3685EC7A-4101-B11D-473B-7B0FFEC10B17}"/>
                     </a:ext>
                   </a:extLst>
                 </p:cNvPr>
@@ -4184,7 +4185,7 @@
           </mc:Fallback>
         </mc:AlternateContent>
         <mc:AlternateContent xmlns:mc="http://schemas.openxmlformats.org/markup-compatibility/2006">
-          <mc:Choice xmlns:a14="http://schemas.microsoft.com/office/drawing/2010/main" xmlns="" Requires="a14">
+          <mc:Choice xmlns="" xmlns:a14="http://schemas.microsoft.com/office/drawing/2010/main" Requires="a14">
             <p:sp>
               <p:nvSpPr>
                 <p:cNvPr id="59" name="Textfeld 58">
@@ -4258,7 +4259,7 @@
                 <p:cNvPr id="59" name="Textfeld 58">
                   <a:extLst>
                     <a:ext uri="{FF2B5EF4-FFF2-40B4-BE49-F238E27FC236}">
-                      <a16:creationId xmlns:a16="http://schemas.microsoft.com/office/drawing/2014/main" xmlns="" id="{F0D44A5D-1901-B142-DBD5-E93061F7E58B}"/>
+                      <a16:creationId xmlns="" xmlns:a16="http://schemas.microsoft.com/office/drawing/2014/main" id="{F0D44A5D-1901-B142-DBD5-E93061F7E58B}"/>
                     </a:ext>
                   </a:extLst>
                 </p:cNvPr>
@@ -4298,7 +4299,7 @@
           </mc:Fallback>
         </mc:AlternateContent>
         <mc:AlternateContent xmlns:mc="http://schemas.openxmlformats.org/markup-compatibility/2006">
-          <mc:Choice xmlns:a14="http://schemas.microsoft.com/office/drawing/2010/main" xmlns="" Requires="a14">
+          <mc:Choice xmlns="" xmlns:a14="http://schemas.microsoft.com/office/drawing/2010/main" Requires="a14">
             <p:sp>
               <p:nvSpPr>
                 <p:cNvPr id="60" name="Textfeld 59">
@@ -4372,7 +4373,7 @@
                 <p:cNvPr id="60" name="Textfeld 59">
                   <a:extLst>
                     <a:ext uri="{FF2B5EF4-FFF2-40B4-BE49-F238E27FC236}">
-                      <a16:creationId xmlns:a16="http://schemas.microsoft.com/office/drawing/2014/main" xmlns="" id="{7BB94F52-DD2B-21A0-1D84-743439CB0CE1}"/>
+                      <a16:creationId xmlns="" xmlns:a16="http://schemas.microsoft.com/office/drawing/2014/main" id="{7BB94F52-DD2B-21A0-1D84-743439CB0CE1}"/>
                     </a:ext>
                   </a:extLst>
                 </p:cNvPr>
@@ -4415,7 +4416,1253 @@
     </p:spTree>
     <p:extLst>
       <p:ext uri="{BB962C8B-B14F-4D97-AF65-F5344CB8AC3E}">
-        <p14:creationId xmlns:p14="http://schemas.microsoft.com/office/powerpoint/2010/main" xmlns="" val="3910585026"/>
+        <p14:creationId xmlns="" xmlns:p14="http://schemas.microsoft.com/office/powerpoint/2010/main" val="3910585026"/>
+      </p:ext>
+    </p:extLst>
+  </p:cSld>
+  <p:clrMapOvr>
+    <a:masterClrMapping/>
+  </p:clrMapOvr>
+</p:sld>
+</file>
+
+<file path=ppt/slides/slide2.xml><?xml version="1.0" encoding="utf-8"?>
+<p:sld xmlns:a="http://schemas.openxmlformats.org/drawingml/2006/main" xmlns:r="http://schemas.openxmlformats.org/officeDocument/2006/relationships" xmlns:p="http://schemas.openxmlformats.org/presentationml/2006/main">
+  <p:cSld>
+    <p:spTree>
+      <p:nvGrpSpPr>
+        <p:cNvPr id="1" name=""/>
+        <p:cNvGrpSpPr/>
+        <p:nvPr/>
+      </p:nvGrpSpPr>
+      <p:grpSpPr>
+        <a:xfrm>
+          <a:off x="0" y="0"/>
+          <a:ext cx="0" cy="0"/>
+          <a:chOff x="0" y="0"/>
+          <a:chExt cx="0" cy="0"/>
+        </a:xfrm>
+      </p:grpSpPr>
+      <p:grpSp>
+        <p:nvGrpSpPr>
+          <p:cNvPr id="29" name="Gruppieren 28"/>
+          <p:cNvGrpSpPr/>
+          <p:nvPr/>
+        </p:nvGrpSpPr>
+        <p:grpSpPr>
+          <a:xfrm>
+            <a:off x="2261063" y="1477563"/>
+            <a:ext cx="7544467" cy="3874616"/>
+            <a:chOff x="2261063" y="1477563"/>
+            <a:chExt cx="7544467" cy="3874616"/>
+          </a:xfrm>
+        </p:grpSpPr>
+        <p:grpSp>
+          <p:nvGrpSpPr>
+            <p:cNvPr id="2" name="Gruppieren 60">
+              <a:extLst>
+                <a:ext uri="{FF2B5EF4-FFF2-40B4-BE49-F238E27FC236}">
+                  <a16:creationId xmlns="" xmlns:a16="http://schemas.microsoft.com/office/drawing/2014/main" id="{4BE5F4D0-B999-05C4-C855-8A160C9229BD}"/>
+                </a:ext>
+              </a:extLst>
+            </p:cNvPr>
+            <p:cNvGrpSpPr/>
+            <p:nvPr/>
+          </p:nvGrpSpPr>
+          <p:grpSpPr>
+            <a:xfrm>
+              <a:off x="3632523" y="1727081"/>
+              <a:ext cx="4664413" cy="2939845"/>
+              <a:chOff x="3529781" y="1634613"/>
+              <a:chExt cx="4664413" cy="2939845"/>
+            </a:xfrm>
+          </p:grpSpPr>
+          <p:pic>
+            <p:nvPicPr>
+              <p:cNvPr id="5" name="Grafik 4" descr="Volumen mit einfarbiger Füllung">
+                <a:extLst>
+                  <a:ext uri="{FF2B5EF4-FFF2-40B4-BE49-F238E27FC236}">
+                    <a16:creationId xmlns="" xmlns:a16="http://schemas.microsoft.com/office/drawing/2014/main" id="{551B0F16-016C-A6FF-B3B9-643A3D042A4F}"/>
+                  </a:ext>
+                </a:extLst>
+              </p:cNvPr>
+              <p:cNvPicPr>
+                <a:picLocks noChangeAspect="1"/>
+              </p:cNvPicPr>
+              <p:nvPr/>
+            </p:nvPicPr>
+            <p:blipFill>
+              <a:blip r:embed="rId2" cstate="print">
+                <a:extLst>
+                  <a:ext uri="{28A0092B-C50C-407E-A947-70E740481C1C}">
+                    <a14:useLocalDpi xmlns="" xmlns:a14="http://schemas.microsoft.com/office/drawing/2010/main" val="0"/>
+                  </a:ext>
+                  <a:ext uri="{96DAC541-7B7A-43D3-8B79-37D633B846F1}">
+                    <asvg:svgBlip xmlns="" xmlns:asvg="http://schemas.microsoft.com/office/drawing/2016/SVG/main" r:embed="rId3"/>
+                  </a:ext>
+                </a:extLst>
+              </a:blip>
+              <a:stretch>
+                <a:fillRect/>
+              </a:stretch>
+            </p:blipFill>
+            <p:spPr>
+              <a:xfrm>
+                <a:off x="6698589" y="1634613"/>
+                <a:ext cx="914400" cy="914400"/>
+              </a:xfrm>
+              <a:prstGeom prst="rect">
+                <a:avLst/>
+              </a:prstGeom>
+            </p:spPr>
+          </p:pic>
+          <p:pic>
+            <p:nvPicPr>
+              <p:cNvPr id="7" name="Grafik 6" descr="Radiomikrofon mit einfarbiger Füllung">
+                <a:extLst>
+                  <a:ext uri="{FF2B5EF4-FFF2-40B4-BE49-F238E27FC236}">
+                    <a16:creationId xmlns="" xmlns:a16="http://schemas.microsoft.com/office/drawing/2014/main" id="{3760C04C-D5D1-9F92-15FD-03CA88CCC834}"/>
+                  </a:ext>
+                </a:extLst>
+              </p:cNvPr>
+              <p:cNvPicPr>
+                <a:picLocks noChangeAspect="1"/>
+              </p:cNvPicPr>
+              <p:nvPr/>
+            </p:nvPicPr>
+            <p:blipFill>
+              <a:blip r:embed="rId4" cstate="print">
+                <a:extLst>
+                  <a:ext uri="{28A0092B-C50C-407E-A947-70E740481C1C}">
+                    <a14:useLocalDpi xmlns="" xmlns:a14="http://schemas.microsoft.com/office/drawing/2010/main" val="0"/>
+                  </a:ext>
+                  <a:ext uri="{96DAC541-7B7A-43D3-8B79-37D633B846F1}">
+                    <asvg:svgBlip xmlns="" xmlns:asvg="http://schemas.microsoft.com/office/drawing/2016/SVG/main" r:embed="rId5"/>
+                  </a:ext>
+                </a:extLst>
+              </a:blip>
+              <a:stretch>
+                <a:fillRect/>
+              </a:stretch>
+            </p:blipFill>
+            <p:spPr>
+              <a:xfrm>
+                <a:off x="6610099" y="3660058"/>
+                <a:ext cx="914400" cy="914400"/>
+              </a:xfrm>
+              <a:prstGeom prst="rect">
+                <a:avLst/>
+              </a:prstGeom>
+            </p:spPr>
+          </p:pic>
+          <p:cxnSp>
+            <p:nvCxnSpPr>
+              <p:cNvPr id="9" name="Gerade Verbindung mit Pfeil 8">
+                <a:extLst>
+                  <a:ext uri="{FF2B5EF4-FFF2-40B4-BE49-F238E27FC236}">
+                    <a16:creationId xmlns="" xmlns:a16="http://schemas.microsoft.com/office/drawing/2014/main" id="{0D7BC79C-1BA1-D72E-D380-AA37EE738E4F}"/>
+                  </a:ext>
+                </a:extLst>
+              </p:cNvPr>
+              <p:cNvCxnSpPr>
+                <a:cxnSpLocks/>
+                <a:endCxn id="5" idx="1"/>
+              </p:cNvCxnSpPr>
+              <p:nvPr/>
+            </p:nvCxnSpPr>
+            <p:spPr>
+              <a:xfrm>
+                <a:off x="3529781" y="2091813"/>
+                <a:ext cx="3168808" cy="0"/>
+              </a:xfrm>
+              <a:prstGeom prst="straightConnector1">
+                <a:avLst/>
+              </a:prstGeom>
+              <a:ln>
+                <a:solidFill>
+                  <a:schemeClr val="tx1"/>
+                </a:solidFill>
+                <a:tailEnd type="triangle"/>
+              </a:ln>
+            </p:spPr>
+            <p:style>
+              <a:lnRef idx="1">
+                <a:schemeClr val="accent1"/>
+              </a:lnRef>
+              <a:fillRef idx="0">
+                <a:schemeClr val="accent1"/>
+              </a:fillRef>
+              <a:effectRef idx="0">
+                <a:schemeClr val="accent1"/>
+              </a:effectRef>
+              <a:fontRef idx="minor">
+                <a:schemeClr val="tx1"/>
+              </a:fontRef>
+            </p:style>
+          </p:cxnSp>
+          <p:sp>
+            <p:nvSpPr>
+              <p:cNvPr id="10" name="Rechteck 9">
+                <a:extLst>
+                  <a:ext uri="{FF2B5EF4-FFF2-40B4-BE49-F238E27FC236}">
+                    <a16:creationId xmlns="" xmlns:a16="http://schemas.microsoft.com/office/drawing/2014/main" id="{77890C79-70F7-8F58-D3A8-1ADB7BF8669C}"/>
+                  </a:ext>
+                </a:extLst>
+              </p:cNvPr>
+              <p:cNvSpPr/>
+              <p:nvPr/>
+            </p:nvSpPr>
+            <p:spPr>
+              <a:xfrm>
+                <a:off x="4835014" y="2669457"/>
+                <a:ext cx="1071716" cy="867695"/>
+              </a:xfrm>
+              <a:prstGeom prst="rect">
+                <a:avLst/>
+              </a:prstGeom>
+              <a:solidFill>
+                <a:schemeClr val="bg1"/>
+              </a:solidFill>
+              <a:ln>
+                <a:solidFill>
+                  <a:schemeClr val="tx1"/>
+                </a:solidFill>
+              </a:ln>
+            </p:spPr>
+            <p:style>
+              <a:lnRef idx="2">
+                <a:schemeClr val="accent1">
+                  <a:shade val="50000"/>
+                </a:schemeClr>
+              </a:lnRef>
+              <a:fillRef idx="1">
+                <a:schemeClr val="accent1"/>
+              </a:fillRef>
+              <a:effectRef idx="0">
+                <a:schemeClr val="accent1"/>
+              </a:effectRef>
+              <a:fontRef idx="minor">
+                <a:schemeClr val="lt1"/>
+              </a:fontRef>
+            </p:style>
+            <p:txBody>
+              <a:bodyPr rtlCol="0" anchor="ctr"/>
+              <a:lstStyle/>
+              <a:p>
+                <a:pPr algn="ctr"/>
+                <a:r>
+                  <a:rPr lang="de-DE" sz="1200" dirty="0">
+                    <a:solidFill>
+                      <a:schemeClr val="tx1"/>
+                    </a:solidFill>
+                    <a:latin typeface="Arial" panose="020B0604020202020204" pitchFamily="34" charset="0"/>
+                    <a:cs typeface="Arial" panose="020B0604020202020204" pitchFamily="34" charset="0"/>
+                  </a:rPr>
+                  <a:t>Echo and Noise </a:t>
+                </a:r>
+                <a:r>
+                  <a:rPr lang="de-DE" sz="1200" dirty="0" err="1">
+                    <a:solidFill>
+                      <a:schemeClr val="tx1"/>
+                    </a:solidFill>
+                    <a:latin typeface="Arial" panose="020B0604020202020204" pitchFamily="34" charset="0"/>
+                    <a:cs typeface="Arial" panose="020B0604020202020204" pitchFamily="34" charset="0"/>
+                  </a:rPr>
+                  <a:t>Cancellation</a:t>
+                </a:r>
+                <a:endParaRPr lang="de-DE" sz="1200" dirty="0">
+                  <a:solidFill>
+                    <a:schemeClr val="tx1"/>
+                  </a:solidFill>
+                  <a:latin typeface="Arial" panose="020B0604020202020204" pitchFamily="34" charset="0"/>
+                  <a:cs typeface="Arial" panose="020B0604020202020204" pitchFamily="34" charset="0"/>
+                </a:endParaRPr>
+              </a:p>
+            </p:txBody>
+          </p:sp>
+          <p:cxnSp>
+            <p:nvCxnSpPr>
+              <p:cNvPr id="12" name="Gerade Verbindung mit Pfeil 11">
+                <a:extLst>
+                  <a:ext uri="{FF2B5EF4-FFF2-40B4-BE49-F238E27FC236}">
+                    <a16:creationId xmlns="" xmlns:a16="http://schemas.microsoft.com/office/drawing/2014/main" id="{E709824F-BE4A-ABAE-EE91-F2F330E9405C}"/>
+                  </a:ext>
+                </a:extLst>
+              </p:cNvPr>
+              <p:cNvCxnSpPr>
+                <a:cxnSpLocks/>
+                <a:stCxn id="15" idx="2"/>
+              </p:cNvCxnSpPr>
+              <p:nvPr/>
+            </p:nvCxnSpPr>
+            <p:spPr>
+              <a:xfrm flipH="1" flipV="1">
+                <a:off x="3529781" y="4114795"/>
+                <a:ext cx="1791930" cy="1230"/>
+              </a:xfrm>
+              <a:prstGeom prst="straightConnector1">
+                <a:avLst/>
+              </a:prstGeom>
+              <a:ln>
+                <a:solidFill>
+                  <a:schemeClr val="tx1"/>
+                </a:solidFill>
+                <a:tailEnd type="triangle"/>
+              </a:ln>
+            </p:spPr>
+            <p:style>
+              <a:lnRef idx="1">
+                <a:schemeClr val="accent1"/>
+              </a:lnRef>
+              <a:fillRef idx="0">
+                <a:schemeClr val="accent1"/>
+              </a:fillRef>
+              <a:effectRef idx="0">
+                <a:schemeClr val="accent1"/>
+              </a:effectRef>
+              <a:fontRef idx="minor">
+                <a:schemeClr val="tx1"/>
+              </a:fontRef>
+            </p:style>
+          </p:cxnSp>
+          <p:sp>
+            <p:nvSpPr>
+              <p:cNvPr id="15" name="Ellipse 14">
+                <a:extLst>
+                  <a:ext uri="{FF2B5EF4-FFF2-40B4-BE49-F238E27FC236}">
+                    <a16:creationId xmlns="" xmlns:a16="http://schemas.microsoft.com/office/drawing/2014/main" id="{C0B3AFA4-6A8A-F078-FE1E-4181BEED91C4}"/>
+                  </a:ext>
+                </a:extLst>
+              </p:cNvPr>
+              <p:cNvSpPr/>
+              <p:nvPr/>
+            </p:nvSpPr>
+            <p:spPr>
+              <a:xfrm>
+                <a:off x="5321711" y="4065633"/>
+                <a:ext cx="98322" cy="100784"/>
+              </a:xfrm>
+              <a:prstGeom prst="ellipse">
+                <a:avLst/>
+              </a:prstGeom>
+              <a:solidFill>
+                <a:schemeClr val="bg1"/>
+              </a:solidFill>
+              <a:ln>
+                <a:solidFill>
+                  <a:schemeClr val="tx1"/>
+                </a:solidFill>
+              </a:ln>
+            </p:spPr>
+            <p:style>
+              <a:lnRef idx="2">
+                <a:schemeClr val="accent1">
+                  <a:shade val="50000"/>
+                </a:schemeClr>
+              </a:lnRef>
+              <a:fillRef idx="1">
+                <a:schemeClr val="accent1"/>
+              </a:fillRef>
+              <a:effectRef idx="0">
+                <a:schemeClr val="accent1"/>
+              </a:effectRef>
+              <a:fontRef idx="minor">
+                <a:schemeClr val="lt1"/>
+              </a:fontRef>
+            </p:style>
+            <p:txBody>
+              <a:bodyPr rtlCol="0" anchor="ctr"/>
+              <a:lstStyle/>
+              <a:p>
+                <a:pPr algn="ctr"/>
+                <a:endParaRPr lang="de-DE"/>
+              </a:p>
+            </p:txBody>
+          </p:sp>
+          <p:cxnSp>
+            <p:nvCxnSpPr>
+              <p:cNvPr id="16" name="Gerade Verbindung mit Pfeil 15">
+                <a:extLst>
+                  <a:ext uri="{FF2B5EF4-FFF2-40B4-BE49-F238E27FC236}">
+                    <a16:creationId xmlns="" xmlns:a16="http://schemas.microsoft.com/office/drawing/2014/main" id="{3098C320-B0E0-80D3-C891-D883758C1726}"/>
+                  </a:ext>
+                </a:extLst>
+              </p:cNvPr>
+              <p:cNvCxnSpPr>
+                <a:cxnSpLocks/>
+              </p:cNvCxnSpPr>
+              <p:nvPr/>
+            </p:nvCxnSpPr>
+            <p:spPr>
+              <a:xfrm flipH="1" flipV="1">
+                <a:off x="5420033" y="4113562"/>
+                <a:ext cx="1190066" cy="1233"/>
+              </a:xfrm>
+              <a:prstGeom prst="straightConnector1">
+                <a:avLst/>
+              </a:prstGeom>
+              <a:ln>
+                <a:solidFill>
+                  <a:schemeClr val="tx1"/>
+                </a:solidFill>
+                <a:tailEnd type="triangle"/>
+              </a:ln>
+            </p:spPr>
+            <p:style>
+              <a:lnRef idx="1">
+                <a:schemeClr val="accent1"/>
+              </a:lnRef>
+              <a:fillRef idx="0">
+                <a:schemeClr val="accent1"/>
+              </a:fillRef>
+              <a:effectRef idx="0">
+                <a:schemeClr val="accent1"/>
+              </a:effectRef>
+              <a:fontRef idx="minor">
+                <a:schemeClr val="tx1"/>
+              </a:fontRef>
+            </p:style>
+          </p:cxnSp>
+          <p:cxnSp>
+            <p:nvCxnSpPr>
+              <p:cNvPr id="19" name="Gerade Verbindung mit Pfeil 18">
+                <a:extLst>
+                  <a:ext uri="{FF2B5EF4-FFF2-40B4-BE49-F238E27FC236}">
+                    <a16:creationId xmlns="" xmlns:a16="http://schemas.microsoft.com/office/drawing/2014/main" id="{6F376301-2D84-692E-E6ED-80D38D5B423C}"/>
+                  </a:ext>
+                </a:extLst>
+              </p:cNvPr>
+              <p:cNvCxnSpPr>
+                <a:cxnSpLocks/>
+                <a:stCxn id="10" idx="2"/>
+                <a:endCxn id="15" idx="0"/>
+              </p:cNvCxnSpPr>
+              <p:nvPr/>
+            </p:nvCxnSpPr>
+            <p:spPr>
+              <a:xfrm>
+                <a:off x="5370872" y="3537152"/>
+                <a:ext cx="0" cy="528481"/>
+              </a:xfrm>
+              <a:prstGeom prst="straightConnector1">
+                <a:avLst/>
+              </a:prstGeom>
+              <a:ln>
+                <a:solidFill>
+                  <a:schemeClr val="tx1"/>
+                </a:solidFill>
+                <a:tailEnd type="triangle"/>
+              </a:ln>
+            </p:spPr>
+            <p:style>
+              <a:lnRef idx="1">
+                <a:schemeClr val="accent1"/>
+              </a:lnRef>
+              <a:fillRef idx="0">
+                <a:schemeClr val="accent1"/>
+              </a:fillRef>
+              <a:effectRef idx="0">
+                <a:schemeClr val="accent1"/>
+              </a:effectRef>
+              <a:fontRef idx="minor">
+                <a:schemeClr val="tx1"/>
+              </a:fontRef>
+            </p:style>
+          </p:cxnSp>
+          <p:cxnSp>
+            <p:nvCxnSpPr>
+              <p:cNvPr id="22" name="Gerade Verbindung mit Pfeil 21">
+                <a:extLst>
+                  <a:ext uri="{FF2B5EF4-FFF2-40B4-BE49-F238E27FC236}">
+                    <a16:creationId xmlns="" xmlns:a16="http://schemas.microsoft.com/office/drawing/2014/main" id="{FF6C6623-CBA4-2B1D-E073-ED2F57422FBC}"/>
+                  </a:ext>
+                </a:extLst>
+              </p:cNvPr>
+              <p:cNvCxnSpPr>
+                <a:cxnSpLocks/>
+                <a:endCxn id="10" idx="0"/>
+              </p:cNvCxnSpPr>
+              <p:nvPr/>
+            </p:nvCxnSpPr>
+            <p:spPr>
+              <a:xfrm>
+                <a:off x="5370872" y="2091813"/>
+                <a:ext cx="0" cy="577644"/>
+              </a:xfrm>
+              <a:prstGeom prst="straightConnector1">
+                <a:avLst/>
+              </a:prstGeom>
+              <a:ln>
+                <a:solidFill>
+                  <a:schemeClr val="tx1"/>
+                </a:solidFill>
+                <a:tailEnd type="triangle"/>
+              </a:ln>
+            </p:spPr>
+            <p:style>
+              <a:lnRef idx="1">
+                <a:schemeClr val="accent1"/>
+              </a:lnRef>
+              <a:fillRef idx="0">
+                <a:schemeClr val="accent1"/>
+              </a:fillRef>
+              <a:effectRef idx="0">
+                <a:schemeClr val="accent1"/>
+              </a:effectRef>
+              <a:fontRef idx="minor">
+                <a:schemeClr val="tx1"/>
+              </a:fontRef>
+            </p:style>
+          </p:cxnSp>
+          <p:cxnSp>
+            <p:nvCxnSpPr>
+              <p:cNvPr id="31" name="Verbinder: gewinkelt 30">
+                <a:extLst>
+                  <a:ext uri="{FF2B5EF4-FFF2-40B4-BE49-F238E27FC236}">
+                    <a16:creationId xmlns="" xmlns:a16="http://schemas.microsoft.com/office/drawing/2014/main" id="{9B42DC58-6201-57DB-639F-6E6AE3C5CA4B}"/>
+                  </a:ext>
+                </a:extLst>
+              </p:cNvPr>
+              <p:cNvCxnSpPr>
+                <a:cxnSpLocks/>
+                <a:endCxn id="10" idx="1"/>
+              </p:cNvCxnSpPr>
+              <p:nvPr/>
+            </p:nvCxnSpPr>
+            <p:spPr>
+              <a:xfrm rot="5400000" flipH="1" flipV="1">
+                <a:off x="4111117" y="3390898"/>
+                <a:ext cx="1011490" cy="436304"/>
+              </a:xfrm>
+              <a:prstGeom prst="bentConnector2">
+                <a:avLst/>
+              </a:prstGeom>
+              <a:ln>
+                <a:solidFill>
+                  <a:schemeClr val="tx1"/>
+                </a:solidFill>
+                <a:tailEnd type="triangle"/>
+              </a:ln>
+            </p:spPr>
+            <p:style>
+              <a:lnRef idx="1">
+                <a:schemeClr val="accent1"/>
+              </a:lnRef>
+              <a:fillRef idx="0">
+                <a:schemeClr val="accent1"/>
+              </a:fillRef>
+              <a:effectRef idx="0">
+                <a:schemeClr val="accent1"/>
+              </a:effectRef>
+              <a:fontRef idx="minor">
+                <a:schemeClr val="tx1"/>
+              </a:fontRef>
+            </p:style>
+          </p:cxnSp>
+          <p:sp>
+            <p:nvSpPr>
+              <p:cNvPr id="44" name="Bogen 43">
+                <a:extLst>
+                  <a:ext uri="{FF2B5EF4-FFF2-40B4-BE49-F238E27FC236}">
+                    <a16:creationId xmlns="" xmlns:a16="http://schemas.microsoft.com/office/drawing/2014/main" id="{4CCAAFA4-404E-702C-EFEE-E703A545C8C8}"/>
+                  </a:ext>
+                </a:extLst>
+              </p:cNvPr>
+              <p:cNvSpPr/>
+              <p:nvPr/>
+            </p:nvSpPr>
+            <p:spPr>
+              <a:xfrm>
+                <a:off x="6842589" y="2071364"/>
+                <a:ext cx="1351605" cy="1994267"/>
+              </a:xfrm>
+              <a:prstGeom prst="arc">
+                <a:avLst>
+                  <a:gd name="adj1" fmla="val 16735583"/>
+                  <a:gd name="adj2" fmla="val 5303246"/>
+                </a:avLst>
+              </a:prstGeom>
+              <a:ln w="38100">
+                <a:solidFill>
+                  <a:schemeClr val="bg1">
+                    <a:lumMod val="75000"/>
+                  </a:schemeClr>
+                </a:solidFill>
+                <a:tailEnd type="triangle"/>
+              </a:ln>
+            </p:spPr>
+            <p:style>
+              <a:lnRef idx="1">
+                <a:schemeClr val="accent1"/>
+              </a:lnRef>
+              <a:fillRef idx="0">
+                <a:schemeClr val="accent1"/>
+              </a:fillRef>
+              <a:effectRef idx="0">
+                <a:schemeClr val="accent1"/>
+              </a:effectRef>
+              <a:fontRef idx="minor">
+                <a:schemeClr val="tx1"/>
+              </a:fontRef>
+            </p:style>
+            <p:txBody>
+              <a:bodyPr rtlCol="0" anchor="ctr"/>
+              <a:lstStyle/>
+              <a:p>
+                <a:pPr algn="ctr"/>
+                <a:endParaRPr lang="de-DE"/>
+              </a:p>
+            </p:txBody>
+          </p:sp>
+          <p:sp>
+            <p:nvSpPr>
+              <p:cNvPr id="53" name="Textfeld 52">
+                <a:extLst>
+                  <a:ext uri="{FF2B5EF4-FFF2-40B4-BE49-F238E27FC236}">
+                    <a16:creationId xmlns="" xmlns:a16="http://schemas.microsoft.com/office/drawing/2014/main" id="{690370DA-8D63-48AC-0EE1-04E73F5450D7}"/>
+                  </a:ext>
+                </a:extLst>
+              </p:cNvPr>
+              <p:cNvSpPr txBox="1"/>
+              <p:nvPr/>
+            </p:nvSpPr>
+            <p:spPr>
+              <a:xfrm>
+                <a:off x="5242028" y="3968710"/>
+                <a:ext cx="261610" cy="276999"/>
+              </a:xfrm>
+              <a:prstGeom prst="rect">
+                <a:avLst/>
+              </a:prstGeom>
+              <a:noFill/>
+            </p:spPr>
+            <p:txBody>
+              <a:bodyPr wrap="none" rtlCol="0">
+                <a:spAutoFit/>
+              </a:bodyPr>
+              <a:lstStyle/>
+              <a:p>
+                <a:r>
+                  <a:rPr lang="de-DE" sz="1200" dirty="0"/>
+                  <a:t>+</a:t>
+                </a:r>
+              </a:p>
+            </p:txBody>
+          </p:sp>
+          <mc:AlternateContent xmlns:mc="http://schemas.openxmlformats.org/markup-compatibility/2006">
+            <mc:Choice xmlns="" xmlns:a14="http://schemas.microsoft.com/office/drawing/2010/main" Requires="a14">
+              <p:sp>
+                <p:nvSpPr>
+                  <p:cNvPr id="56" name="Textfeld 55">
+                    <a:extLst>
+                      <a:ext uri="{FF2B5EF4-FFF2-40B4-BE49-F238E27FC236}">
+                        <a16:creationId xmlns:a16="http://schemas.microsoft.com/office/drawing/2014/main" id="{ED3C6559-470E-A303-2C96-9DBE3456190D}"/>
+                      </a:ext>
+                    </a:extLst>
+                  </p:cNvPr>
+                  <p:cNvSpPr txBox="1"/>
+                  <p:nvPr/>
+                </p:nvSpPr>
+                <p:spPr>
+                  <a:xfrm>
+                    <a:off x="5427918" y="3654215"/>
+                    <a:ext cx="307968" cy="184666"/>
+                  </a:xfrm>
+                  <a:prstGeom prst="rect">
+                    <a:avLst/>
+                  </a:prstGeom>
+                  <a:noFill/>
+                </p:spPr>
+                <p:txBody>
+                  <a:bodyPr wrap="none" lIns="0" tIns="0" rIns="0" bIns="0" rtlCol="0">
+                    <a:spAutoFit/>
+                  </a:bodyPr>
+                  <a:lstStyle/>
+                  <a:p>
+                    <a14:m>
+                      <m:oMathPara xmlns:m="http://schemas.openxmlformats.org/officeDocument/2006/math">
+                        <m:oMathParaPr>
+                          <m:jc m:val="centerGroup"/>
+                        </m:oMathParaPr>
+                        <m:oMath xmlns:m="http://schemas.openxmlformats.org/officeDocument/2006/math">
+                          <m:sSub>
+                            <m:sSubPr>
+                              <m:ctrlPr>
+                                <a:rPr lang="de-DE" sz="1200" i="1" smtClean="0">
+                                  <a:latin typeface="Cambria Math" panose="02040503050406030204" pitchFamily="18" charset="0"/>
+                                </a:rPr>
+                              </m:ctrlPr>
+                            </m:sSubPr>
+                            <m:e>
+                              <m:r>
+                                <a:rPr lang="de-DE" sz="1200" b="0" i="1" smtClean="0">
+                                  <a:latin typeface="Cambria Math" panose="02040503050406030204" pitchFamily="18" charset="0"/>
+                                </a:rPr>
+                                <m:t>−</m:t>
+                              </m:r>
+                              <m:acc>
+                                <m:accPr>
+                                  <m:chr m:val="̂"/>
+                                  <m:ctrlPr>
+                                    <a:rPr lang="de-DE" sz="1200" i="1" smtClean="0">
+                                      <a:latin typeface="Cambria Math" panose="02040503050406030204" pitchFamily="18" charset="0"/>
+                                    </a:rPr>
+                                  </m:ctrlPr>
+                                </m:accPr>
+                                <m:e>
+                                  <m:r>
+                                    <a:rPr lang="de-DE" sz="1200" b="0" i="1" smtClean="0">
+                                      <a:latin typeface="Cambria Math" panose="02040503050406030204" pitchFamily="18" charset="0"/>
+                                    </a:rPr>
+                                    <m:t>𝑥</m:t>
+                                  </m:r>
+                                </m:e>
+                              </m:acc>
+                            </m:e>
+                            <m:sub>
+                              <m:r>
+                                <a:rPr lang="de-DE" sz="1200" b="0" i="1" smtClean="0">
+                                  <a:latin typeface="Cambria Math" panose="02040503050406030204" pitchFamily="18" charset="0"/>
+                                </a:rPr>
+                                <m:t>𝑘</m:t>
+                              </m:r>
+                            </m:sub>
+                          </m:sSub>
+                        </m:oMath>
+                      </m:oMathPara>
+                    </a14:m>
+                    <a:endParaRPr lang="de-DE" sz="1200" dirty="0"/>
+                  </a:p>
+                </p:txBody>
+              </p:sp>
+            </mc:Choice>
+            <mc:Fallback>
+              <p:sp>
+                <p:nvSpPr>
+                  <p:cNvPr id="56" name="Textfeld 55">
+                    <a:extLst>
+                      <a:ext uri="{FF2B5EF4-FFF2-40B4-BE49-F238E27FC236}">
+                        <a16:creationId xmlns="" xmlns:a16="http://schemas.microsoft.com/office/drawing/2014/main" id="{ED3C6559-470E-A303-2C96-9DBE3456190D}"/>
+                      </a:ext>
+                    </a:extLst>
+                  </p:cNvPr>
+                  <p:cNvSpPr txBox="1">
+                    <a:spLocks noRot="1" noChangeAspect="1" noMove="1" noResize="1" noEditPoints="1" noAdjustHandles="1" noChangeArrowheads="1" noChangeShapeType="1" noTextEdit="1"/>
+                  </p:cNvSpPr>
+                  <p:nvPr/>
+                </p:nvSpPr>
+                <p:spPr>
+                  <a:xfrm>
+                    <a:off x="5427918" y="3654215"/>
+                    <a:ext cx="307968" cy="184666"/>
+                  </a:xfrm>
+                  <a:prstGeom prst="rect">
+                    <a:avLst/>
+                  </a:prstGeom>
+                  <a:blipFill>
+                    <a:blip r:embed="rId6" cstate="print"/>
+                    <a:stretch>
+                      <a:fillRect l="-1961" t="-26667" r="-56863" b="-13333"/>
+                    </a:stretch>
+                  </a:blipFill>
+                </p:spPr>
+                <p:txBody>
+                  <a:bodyPr/>
+                  <a:lstStyle/>
+                  <a:p>
+                    <a:r>
+                      <a:rPr lang="de-DE">
+                        <a:noFill/>
+                      </a:rPr>
+                      <a:t> </a:t>
+                    </a:r>
+                  </a:p>
+                </p:txBody>
+              </p:sp>
+            </mc:Fallback>
+          </mc:AlternateContent>
+          <mc:AlternateContent xmlns:mc="http://schemas.openxmlformats.org/markup-compatibility/2006">
+            <mc:Choice xmlns="" xmlns:a14="http://schemas.microsoft.com/office/drawing/2010/main" Requires="a14">
+              <p:sp>
+                <p:nvSpPr>
+                  <p:cNvPr id="57" name="Textfeld 56">
+                    <a:extLst>
+                      <a:ext uri="{FF2B5EF4-FFF2-40B4-BE49-F238E27FC236}">
+                        <a16:creationId xmlns:a16="http://schemas.microsoft.com/office/drawing/2014/main" id="{3685EC7A-4101-B11D-473B-7B0FFEC10B17}"/>
+                      </a:ext>
+                    </a:extLst>
+                  </p:cNvPr>
+                  <p:cNvSpPr txBox="1"/>
+                  <p:nvPr/>
+                </p:nvSpPr>
+                <p:spPr>
+                  <a:xfrm>
+                    <a:off x="3593916" y="2135747"/>
+                    <a:ext cx="192552" cy="184666"/>
+                  </a:xfrm>
+                  <a:prstGeom prst="rect">
+                    <a:avLst/>
+                  </a:prstGeom>
+                  <a:noFill/>
+                </p:spPr>
+                <p:txBody>
+                  <a:bodyPr wrap="none" lIns="0" tIns="0" rIns="0" bIns="0" rtlCol="0">
+                    <a:spAutoFit/>
+                  </a:bodyPr>
+                  <a:lstStyle/>
+                  <a:p>
+                    <a14:m>
+                      <m:oMathPara xmlns:m="http://schemas.openxmlformats.org/officeDocument/2006/math">
+                        <m:oMathParaPr>
+                          <m:jc m:val="centerGroup"/>
+                        </m:oMathParaPr>
+                        <m:oMath xmlns:m="http://schemas.openxmlformats.org/officeDocument/2006/math">
+                          <m:sSub>
+                            <m:sSubPr>
+                              <m:ctrlPr>
+                                <a:rPr lang="de-DE" sz="1200" i="1" smtClean="0">
+                                  <a:latin typeface="Cambria Math" panose="02040503050406030204" pitchFamily="18" charset="0"/>
+                                </a:rPr>
+                              </m:ctrlPr>
+                            </m:sSubPr>
+                            <m:e>
+                              <m:r>
+                                <a:rPr lang="de-DE" sz="1200" b="0" i="1" smtClean="0">
+                                  <a:latin typeface="Cambria Math" panose="02040503050406030204" pitchFamily="18" charset="0"/>
+                                </a:rPr>
+                                <m:t>𝑥</m:t>
+                              </m:r>
+                            </m:e>
+                            <m:sub>
+                              <m:r>
+                                <a:rPr lang="de-DE" sz="1200" b="0" i="1" smtClean="0">
+                                  <a:latin typeface="Cambria Math" panose="02040503050406030204" pitchFamily="18" charset="0"/>
+                                </a:rPr>
+                                <m:t>𝑘</m:t>
+                              </m:r>
+                            </m:sub>
+                          </m:sSub>
+                        </m:oMath>
+                      </m:oMathPara>
+                    </a14:m>
+                    <a:endParaRPr lang="de-DE" sz="1200" dirty="0"/>
+                  </a:p>
+                </p:txBody>
+              </p:sp>
+            </mc:Choice>
+            <mc:Fallback>
+              <p:sp>
+                <p:nvSpPr>
+                  <p:cNvPr id="57" name="Textfeld 56">
+                    <a:extLst>
+                      <a:ext uri="{FF2B5EF4-FFF2-40B4-BE49-F238E27FC236}">
+                        <a16:creationId xmlns="" xmlns:a16="http://schemas.microsoft.com/office/drawing/2014/main" id="{3685EC7A-4101-B11D-473B-7B0FFEC10B17}"/>
+                      </a:ext>
+                    </a:extLst>
+                  </p:cNvPr>
+                  <p:cNvSpPr txBox="1">
+                    <a:spLocks noRot="1" noChangeAspect="1" noMove="1" noResize="1" noEditPoints="1" noAdjustHandles="1" noChangeArrowheads="1" noChangeShapeType="1" noTextEdit="1"/>
+                  </p:cNvSpPr>
+                  <p:nvPr/>
+                </p:nvSpPr>
+                <p:spPr>
+                  <a:xfrm>
+                    <a:off x="3593916" y="2135747"/>
+                    <a:ext cx="192552" cy="184666"/>
+                  </a:xfrm>
+                  <a:prstGeom prst="rect">
+                    <a:avLst/>
+                  </a:prstGeom>
+                  <a:blipFill>
+                    <a:blip r:embed="rId7" cstate="print"/>
+                    <a:stretch>
+                      <a:fillRect l="-9375" r="-6250" b="-13333"/>
+                    </a:stretch>
+                  </a:blipFill>
+                </p:spPr>
+                <p:txBody>
+                  <a:bodyPr/>
+                  <a:lstStyle/>
+                  <a:p>
+                    <a:r>
+                      <a:rPr lang="de-DE">
+                        <a:noFill/>
+                      </a:rPr>
+                      <a:t> </a:t>
+                    </a:r>
+                  </a:p>
+                </p:txBody>
+              </p:sp>
+            </mc:Fallback>
+          </mc:AlternateContent>
+          <mc:AlternateContent xmlns:mc="http://schemas.openxmlformats.org/markup-compatibility/2006">
+            <mc:Choice xmlns="" xmlns:a14="http://schemas.microsoft.com/office/drawing/2010/main" Requires="a14">
+              <p:sp>
+                <p:nvSpPr>
+                  <p:cNvPr id="59" name="Textfeld 58">
+                    <a:extLst>
+                      <a:ext uri="{FF2B5EF4-FFF2-40B4-BE49-F238E27FC236}">
+                        <a16:creationId xmlns:a16="http://schemas.microsoft.com/office/drawing/2014/main" id="{F0D44A5D-1901-B142-DBD5-E93061F7E58B}"/>
+                      </a:ext>
+                    </a:extLst>
+                  </p:cNvPr>
+                  <p:cNvSpPr txBox="1"/>
+                  <p:nvPr/>
+                </p:nvSpPr>
+                <p:spPr>
+                  <a:xfrm>
+                    <a:off x="4835014" y="3893003"/>
+                    <a:ext cx="184731" cy="184666"/>
+                  </a:xfrm>
+                  <a:prstGeom prst="rect">
+                    <a:avLst/>
+                  </a:prstGeom>
+                  <a:noFill/>
+                </p:spPr>
+                <p:txBody>
+                  <a:bodyPr wrap="none" lIns="0" tIns="0" rIns="0" bIns="0" rtlCol="0">
+                    <a:spAutoFit/>
+                  </a:bodyPr>
+                  <a:lstStyle/>
+                  <a:p>
+                    <a14:m>
+                      <m:oMathPara xmlns:m="http://schemas.openxmlformats.org/officeDocument/2006/math">
+                        <m:oMathParaPr>
+                          <m:jc m:val="centerGroup"/>
+                        </m:oMathParaPr>
+                        <m:oMath xmlns:m="http://schemas.openxmlformats.org/officeDocument/2006/math">
+                          <m:sSub>
+                            <m:sSubPr>
+                              <m:ctrlPr>
+                                <a:rPr lang="de-DE" sz="1200" i="1" smtClean="0">
+                                  <a:latin typeface="Cambria Math" panose="02040503050406030204" pitchFamily="18" charset="0"/>
+                                </a:rPr>
+                              </m:ctrlPr>
+                            </m:sSubPr>
+                            <m:e>
+                              <m:r>
+                                <a:rPr lang="de-DE" sz="1200" b="0" i="1" smtClean="0">
+                                  <a:latin typeface="Cambria Math" panose="02040503050406030204" pitchFamily="18" charset="0"/>
+                                </a:rPr>
+                                <m:t>𝑒</m:t>
+                              </m:r>
+                            </m:e>
+                            <m:sub>
+                              <m:r>
+                                <a:rPr lang="de-DE" sz="1200" b="0" i="1" smtClean="0">
+                                  <a:latin typeface="Cambria Math" panose="02040503050406030204" pitchFamily="18" charset="0"/>
+                                </a:rPr>
+                                <m:t>𝑘</m:t>
+                              </m:r>
+                            </m:sub>
+                          </m:sSub>
+                        </m:oMath>
+                      </m:oMathPara>
+                    </a14:m>
+                    <a:endParaRPr lang="de-DE" sz="1200" dirty="0"/>
+                  </a:p>
+                </p:txBody>
+              </p:sp>
+            </mc:Choice>
+            <mc:Fallback>
+              <p:sp>
+                <p:nvSpPr>
+                  <p:cNvPr id="59" name="Textfeld 58">
+                    <a:extLst>
+                      <a:ext uri="{FF2B5EF4-FFF2-40B4-BE49-F238E27FC236}">
+                        <a16:creationId xmlns="" xmlns:a16="http://schemas.microsoft.com/office/drawing/2014/main" id="{F0D44A5D-1901-B142-DBD5-E93061F7E58B}"/>
+                      </a:ext>
+                    </a:extLst>
+                  </p:cNvPr>
+                  <p:cNvSpPr txBox="1">
+                    <a:spLocks noRot="1" noChangeAspect="1" noMove="1" noResize="1" noEditPoints="1" noAdjustHandles="1" noChangeArrowheads="1" noChangeShapeType="1" noTextEdit="1"/>
+                  </p:cNvSpPr>
+                  <p:nvPr/>
+                </p:nvSpPr>
+                <p:spPr>
+                  <a:xfrm>
+                    <a:off x="4835014" y="3893003"/>
+                    <a:ext cx="184731" cy="184666"/>
+                  </a:xfrm>
+                  <a:prstGeom prst="rect">
+                    <a:avLst/>
+                  </a:prstGeom>
+                  <a:blipFill>
+                    <a:blip r:embed="rId8" cstate="print"/>
+                    <a:stretch>
+                      <a:fillRect l="-10000" r="-3333" b="-13333"/>
+                    </a:stretch>
+                  </a:blipFill>
+                </p:spPr>
+                <p:txBody>
+                  <a:bodyPr/>
+                  <a:lstStyle/>
+                  <a:p>
+                    <a:r>
+                      <a:rPr lang="de-DE">
+                        <a:noFill/>
+                      </a:rPr>
+                      <a:t> </a:t>
+                    </a:r>
+                  </a:p>
+                </p:txBody>
+              </p:sp>
+            </mc:Fallback>
+          </mc:AlternateContent>
+          <mc:AlternateContent xmlns:mc="http://schemas.openxmlformats.org/markup-compatibility/2006">
+            <mc:Choice xmlns="" xmlns:a14="http://schemas.microsoft.com/office/drawing/2010/main" Requires="a14">
+              <p:sp>
+                <p:nvSpPr>
+                  <p:cNvPr id="60" name="Textfeld 59">
+                    <a:extLst>
+                      <a:ext uri="{FF2B5EF4-FFF2-40B4-BE49-F238E27FC236}">
+                        <a16:creationId xmlns:a16="http://schemas.microsoft.com/office/drawing/2014/main" id="{7BB94F52-DD2B-21A0-1D84-743439CB0CE1}"/>
+                      </a:ext>
+                    </a:extLst>
+                  </p:cNvPr>
+                  <p:cNvSpPr txBox="1"/>
+                  <p:nvPr/>
+                </p:nvSpPr>
+                <p:spPr>
+                  <a:xfrm>
+                    <a:off x="6217026" y="3893003"/>
+                    <a:ext cx="202042" cy="184666"/>
+                  </a:xfrm>
+                  <a:prstGeom prst="rect">
+                    <a:avLst/>
+                  </a:prstGeom>
+                  <a:noFill/>
+                </p:spPr>
+                <p:txBody>
+                  <a:bodyPr wrap="none" lIns="0" tIns="0" rIns="0" bIns="0" rtlCol="0">
+                    <a:spAutoFit/>
+                  </a:bodyPr>
+                  <a:lstStyle/>
+                  <a:p>
+                    <a14:m>
+                      <m:oMathPara xmlns:m="http://schemas.openxmlformats.org/officeDocument/2006/math">
+                        <m:oMathParaPr>
+                          <m:jc m:val="centerGroup"/>
+                        </m:oMathParaPr>
+                        <m:oMath xmlns:m="http://schemas.openxmlformats.org/officeDocument/2006/math">
+                          <m:sSub>
+                            <m:sSubPr>
+                              <m:ctrlPr>
+                                <a:rPr lang="de-DE" sz="1200" i="1" smtClean="0">
+                                  <a:latin typeface="Cambria Math" panose="02040503050406030204" pitchFamily="18" charset="0"/>
+                                </a:rPr>
+                              </m:ctrlPr>
+                            </m:sSubPr>
+                            <m:e>
+                              <m:r>
+                                <a:rPr lang="de-DE" sz="1200" b="0" i="1" smtClean="0">
+                                  <a:latin typeface="Cambria Math" panose="02040503050406030204" pitchFamily="18" charset="0"/>
+                                </a:rPr>
+                                <m:t>𝑑</m:t>
+                              </m:r>
+                            </m:e>
+                            <m:sub>
+                              <m:r>
+                                <a:rPr lang="de-DE" sz="1200" b="0" i="1" smtClean="0">
+                                  <a:latin typeface="Cambria Math" panose="02040503050406030204" pitchFamily="18" charset="0"/>
+                                </a:rPr>
+                                <m:t>𝑘</m:t>
+                              </m:r>
+                            </m:sub>
+                          </m:sSub>
+                        </m:oMath>
+                      </m:oMathPara>
+                    </a14:m>
+                    <a:endParaRPr lang="de-DE" sz="1200" dirty="0"/>
+                  </a:p>
+                </p:txBody>
+              </p:sp>
+            </mc:Choice>
+            <mc:Fallback>
+              <p:sp>
+                <p:nvSpPr>
+                  <p:cNvPr id="60" name="Textfeld 59">
+                    <a:extLst>
+                      <a:ext uri="{FF2B5EF4-FFF2-40B4-BE49-F238E27FC236}">
+                        <a16:creationId xmlns="" xmlns:a16="http://schemas.microsoft.com/office/drawing/2014/main" id="{7BB94F52-DD2B-21A0-1D84-743439CB0CE1}"/>
+                      </a:ext>
+                    </a:extLst>
+                  </p:cNvPr>
+                  <p:cNvSpPr txBox="1">
+                    <a:spLocks noRot="1" noChangeAspect="1" noMove="1" noResize="1" noEditPoints="1" noAdjustHandles="1" noChangeArrowheads="1" noChangeShapeType="1" noTextEdit="1"/>
+                  </p:cNvSpPr>
+                  <p:nvPr/>
+                </p:nvSpPr>
+                <p:spPr>
+                  <a:xfrm>
+                    <a:off x="6217026" y="3893003"/>
+                    <a:ext cx="202042" cy="184666"/>
+                  </a:xfrm>
+                  <a:prstGeom prst="rect">
+                    <a:avLst/>
+                  </a:prstGeom>
+                  <a:blipFill>
+                    <a:blip r:embed="rId9" cstate="print"/>
+                    <a:stretch>
+                      <a:fillRect l="-21212" r="-3030" b="-13333"/>
+                    </a:stretch>
+                  </a:blipFill>
+                </p:spPr>
+                <p:txBody>
+                  <a:bodyPr/>
+                  <a:lstStyle/>
+                  <a:p>
+                    <a:r>
+                      <a:rPr lang="de-DE">
+                        <a:noFill/>
+                      </a:rPr>
+                      <a:t> </a:t>
+                    </a:r>
+                  </a:p>
+                </p:txBody>
+              </p:sp>
+            </mc:Fallback>
+          </mc:AlternateContent>
+        </p:grpSp>
+        <p:pic>
+          <p:nvPicPr>
+            <p:cNvPr id="20" name="Grafik 19" descr="Loudspeaker_Signal.png"/>
+            <p:cNvPicPr>
+              <a:picLocks noChangeAspect="1"/>
+            </p:cNvPicPr>
+            <p:nvPr/>
+          </p:nvPicPr>
+          <p:blipFill>
+            <a:blip r:embed="rId10" cstate="print"/>
+            <a:stretch>
+              <a:fillRect/>
+            </a:stretch>
+          </p:blipFill>
+          <p:spPr>
+            <a:xfrm>
+              <a:off x="3647373" y="1477563"/>
+              <a:ext cx="3074852" cy="683747"/>
+            </a:xfrm>
+            <a:prstGeom prst="rect">
+              <a:avLst/>
+            </a:prstGeom>
+          </p:spPr>
+        </p:pic>
+        <p:pic>
+          <p:nvPicPr>
+            <p:cNvPr id="21" name="Grafik 20" descr="Loudspeaker_Signal_Coupled.png"/>
+            <p:cNvPicPr>
+              <a:picLocks noChangeAspect="1"/>
+            </p:cNvPicPr>
+            <p:nvPr/>
+          </p:nvPicPr>
+          <p:blipFill>
+            <a:blip r:embed="rId11" cstate="print"/>
+            <a:stretch>
+              <a:fillRect/>
+            </a:stretch>
+          </p:blipFill>
+          <p:spPr>
+            <a:xfrm>
+              <a:off x="6757149" y="2838085"/>
+              <a:ext cx="3048381" cy="682085"/>
+            </a:xfrm>
+            <a:prstGeom prst="rect">
+              <a:avLst/>
+            </a:prstGeom>
+          </p:spPr>
+        </p:pic>
+        <p:pic>
+          <p:nvPicPr>
+            <p:cNvPr id="24" name="Grafik 23" descr="Predictor_Output_Signal.png"/>
+            <p:cNvPicPr>
+              <a:picLocks noChangeAspect="1"/>
+            </p:cNvPicPr>
+            <p:nvPr/>
+          </p:nvPicPr>
+          <p:blipFill>
+            <a:blip r:embed="rId12" cstate="print"/>
+            <a:stretch>
+              <a:fillRect/>
+            </a:stretch>
+          </p:blipFill>
+          <p:spPr>
+            <a:xfrm>
+              <a:off x="5685906" y="4903786"/>
+              <a:ext cx="3056311" cy="448393"/>
+            </a:xfrm>
+            <a:prstGeom prst="rect">
+              <a:avLst/>
+            </a:prstGeom>
+          </p:spPr>
+        </p:pic>
+        <p:pic>
+          <p:nvPicPr>
+            <p:cNvPr id="25" name="Grafik 24" descr="Error_Output_Signal.png"/>
+            <p:cNvPicPr>
+              <a:picLocks noChangeAspect="1"/>
+            </p:cNvPicPr>
+            <p:nvPr/>
+          </p:nvPicPr>
+          <p:blipFill>
+            <a:blip r:embed="rId13" cstate="print"/>
+            <a:stretch>
+              <a:fillRect/>
+            </a:stretch>
+          </p:blipFill>
+          <p:spPr>
+            <a:xfrm>
+              <a:off x="2261063" y="4360862"/>
+              <a:ext cx="3048381" cy="436055"/>
+            </a:xfrm>
+            <a:prstGeom prst="rect">
+              <a:avLst/>
+            </a:prstGeom>
+          </p:spPr>
+        </p:pic>
+        <p:cxnSp>
+          <p:nvCxnSpPr>
+            <p:cNvPr id="27" name="Gerade Verbindung mit Pfeil 26"/>
+            <p:cNvCxnSpPr/>
+            <p:nvPr/>
+          </p:nvCxnSpPr>
+          <p:spPr>
+            <a:xfrm>
+              <a:off x="5777346" y="3973483"/>
+              <a:ext cx="573578" cy="856212"/>
+            </a:xfrm>
+            <a:prstGeom prst="straightConnector1">
+              <a:avLst/>
+            </a:prstGeom>
+            <a:ln>
+              <a:solidFill>
+                <a:schemeClr val="bg1">
+                  <a:lumMod val="75000"/>
+                </a:schemeClr>
+              </a:solidFill>
+              <a:tailEnd type="arrow"/>
+            </a:ln>
+          </p:spPr>
+          <p:style>
+            <a:lnRef idx="1">
+              <a:schemeClr val="accent1"/>
+            </a:lnRef>
+            <a:fillRef idx="0">
+              <a:schemeClr val="accent1"/>
+            </a:fillRef>
+            <a:effectRef idx="0">
+              <a:schemeClr val="accent1"/>
+            </a:effectRef>
+            <a:fontRef idx="minor">
+              <a:schemeClr val="tx1"/>
+            </a:fontRef>
+          </p:style>
+        </p:cxnSp>
+      </p:grpSp>
+    </p:spTree>
+    <p:extLst>
+      <p:ext uri="{BB962C8B-B14F-4D97-AF65-F5344CB8AC3E}">
+        <p14:creationId xmlns="" xmlns:p14="http://schemas.microsoft.com/office/powerpoint/2010/main" val="3910585026"/>
       </p:ext>
     </p:extLst>
   </p:cSld>
@@ -4714,7 +5961,7 @@
   <a:extraClrSchemeLst/>
   <a:extLst>
     <a:ext uri="{05A4C25C-085E-4340-85A3-A5531E510DB2}">
-      <thm15:themeFamily xmlns:thm15="http://schemas.microsoft.com/office/thememl/2012/main" xmlns="" name="Office Theme" id="{62F939B6-93AF-4DB8-9C6B-D6C7DFDC589F}" vid="{4A3C46E8-61CC-4603-A589-7422A47A8E4A}"/>
+      <thm15:themeFamily xmlns="" xmlns:thm15="http://schemas.microsoft.com/office/thememl/2012/main" name="Office Theme" id="{62F939B6-93AF-4DB8-9C6B-D6C7DFDC589F}" vid="{4A3C46E8-61CC-4603-A589-7422A47A8E4A}"/>
     </a:ext>
   </a:extLst>
 </a:theme>

</xml_diff>